<commit_message>
Nedaudz pievienota informacija pie macību materiala
</commit_message>
<xml_diff>
--- a/Pecnosacījumu_MācībuMaterials.pptx
+++ b/Pecnosacījumu_MācībuMaterials.pptx
@@ -827,7 +827,7 @@
       </p:grpSpPr>
       <p:sp>
         <p:nvSpPr>
-          <p:cNvPr id="114" name="Google Shape;114;g20a4e56f568_0_12:notes"/>
+          <p:cNvPr id="114" name="Google Shape;114;g20a4e56f568_0_24:notes"/>
           <p:cNvSpPr/>
           <p:nvPr>
             <p:ph idx="2" type="sldImg"/>
@@ -862,7 +862,7 @@
       </p:sp>
       <p:sp>
         <p:nvSpPr>
-          <p:cNvPr id="115" name="Google Shape;115;g20a4e56f568_0_12:notes"/>
+          <p:cNvPr id="115" name="Google Shape;115;g20a4e56f568_0_24:notes"/>
           <p:cNvSpPr txBox="1"/>
           <p:nvPr>
             <p:ph idx="1" type="body"/>
@@ -912,7 +912,7 @@
   <p:cSld>
     <p:spTree>
       <p:nvGrpSpPr>
-        <p:cNvPr id="130" name="Shape 130"/>
+        <p:cNvPr id="128" name="Shape 128"/>
         <p:cNvGrpSpPr/>
         <p:nvPr/>
       </p:nvGrpSpPr>
@@ -926,7 +926,7 @@
       </p:grpSpPr>
       <p:sp>
         <p:nvSpPr>
-          <p:cNvPr id="131" name="Google Shape;131;g20a4e56f568_0_24:notes"/>
+          <p:cNvPr id="129" name="Google Shape;129;g20a4e56f568_0_12:notes"/>
           <p:cNvSpPr/>
           <p:nvPr>
             <p:ph idx="2" type="sldImg"/>
@@ -961,7 +961,7 @@
       </p:sp>
       <p:sp>
         <p:nvSpPr>
-          <p:cNvPr id="132" name="Google Shape;132;g20a4e56f568_0_24:notes"/>
+          <p:cNvPr id="130" name="Google Shape;130;g20a4e56f568_0_12:notes"/>
           <p:cNvSpPr txBox="1"/>
           <p:nvPr>
             <p:ph idx="1" type="body"/>
@@ -1011,7 +1011,7 @@
   <p:cSld>
     <p:spTree>
       <p:nvGrpSpPr>
-        <p:cNvPr id="141" name="Shape 141"/>
+        <p:cNvPr id="149" name="Shape 149"/>
         <p:cNvGrpSpPr/>
         <p:nvPr/>
       </p:nvGrpSpPr>
@@ -1025,7 +1025,7 @@
       </p:grpSpPr>
       <p:sp>
         <p:nvSpPr>
-          <p:cNvPr id="142" name="Google Shape;142;g20a4e56f568_0_36:notes"/>
+          <p:cNvPr id="150" name="Google Shape;150;g20a4e56f568_0_36:notes"/>
           <p:cNvSpPr/>
           <p:nvPr>
             <p:ph idx="2" type="sldImg"/>
@@ -1060,7 +1060,7 @@
       </p:sp>
       <p:sp>
         <p:nvSpPr>
-          <p:cNvPr id="143" name="Google Shape;143;g20a4e56f568_0_36:notes"/>
+          <p:cNvPr id="151" name="Google Shape;151;g20a4e56f568_0_36:notes"/>
           <p:cNvSpPr txBox="1"/>
           <p:nvPr>
             <p:ph idx="1" type="body"/>
@@ -1110,7 +1110,7 @@
   <p:cSld>
     <p:spTree>
       <p:nvGrpSpPr>
-        <p:cNvPr id="146" name="Shape 146"/>
+        <p:cNvPr id="154" name="Shape 154"/>
         <p:cNvGrpSpPr/>
         <p:nvPr/>
       </p:nvGrpSpPr>
@@ -1124,7 +1124,7 @@
       </p:grpSpPr>
       <p:sp>
         <p:nvSpPr>
-          <p:cNvPr id="147" name="Google Shape;147;g20a4e56f568_0_44:notes"/>
+          <p:cNvPr id="155" name="Google Shape;155;g20a4e56f568_0_44:notes"/>
           <p:cNvSpPr/>
           <p:nvPr>
             <p:ph idx="2" type="sldImg"/>
@@ -1159,7 +1159,7 @@
       </p:sp>
       <p:sp>
         <p:nvSpPr>
-          <p:cNvPr id="148" name="Google Shape;148;g20a4e56f568_0_44:notes"/>
+          <p:cNvPr id="156" name="Google Shape;156;g20a4e56f568_0_44:notes"/>
           <p:cNvSpPr txBox="1"/>
           <p:nvPr>
             <p:ph idx="1" type="body"/>
@@ -1209,7 +1209,7 @@
   <p:cSld>
     <p:spTree>
       <p:nvGrpSpPr>
-        <p:cNvPr id="157" name="Shape 157"/>
+        <p:cNvPr id="165" name="Shape 165"/>
         <p:cNvGrpSpPr/>
         <p:nvPr/>
       </p:nvGrpSpPr>
@@ -1223,7 +1223,7 @@
       </p:grpSpPr>
       <p:sp>
         <p:nvSpPr>
-          <p:cNvPr id="158" name="Google Shape;158;g20a4e56f568_0_56:notes"/>
+          <p:cNvPr id="166" name="Google Shape;166;g20a4e56f568_0_56:notes"/>
           <p:cNvSpPr/>
           <p:nvPr>
             <p:ph idx="2" type="sldImg"/>
@@ -1258,7 +1258,7 @@
       </p:sp>
       <p:sp>
         <p:nvSpPr>
-          <p:cNvPr id="159" name="Google Shape;159;g20a4e56f568_0_56:notes"/>
+          <p:cNvPr id="167" name="Google Shape;167;g20a4e56f568_0_56:notes"/>
           <p:cNvSpPr txBox="1"/>
           <p:nvPr>
             <p:ph idx="1" type="body"/>
@@ -1308,7 +1308,7 @@
   <p:cSld>
     <p:spTree>
       <p:nvGrpSpPr>
-        <p:cNvPr id="168" name="Shape 168"/>
+        <p:cNvPr id="176" name="Shape 176"/>
         <p:cNvGrpSpPr/>
         <p:nvPr/>
       </p:nvGrpSpPr>
@@ -1322,7 +1322,7 @@
       </p:grpSpPr>
       <p:sp>
         <p:nvSpPr>
-          <p:cNvPr id="169" name="Google Shape;169;g20a4e56f568_0_69:notes"/>
+          <p:cNvPr id="177" name="Google Shape;177;g20a4e56f568_0_69:notes"/>
           <p:cNvSpPr/>
           <p:nvPr>
             <p:ph idx="2" type="sldImg"/>
@@ -1357,7 +1357,7 @@
       </p:sp>
       <p:sp>
         <p:nvSpPr>
-          <p:cNvPr id="170" name="Google Shape;170;g20a4e56f568_0_69:notes"/>
+          <p:cNvPr id="178" name="Google Shape;178;g20a4e56f568_0_69:notes"/>
           <p:cNvSpPr txBox="1"/>
           <p:nvPr>
             <p:ph idx="1" type="body"/>
@@ -1407,7 +1407,7 @@
   <p:cSld>
     <p:spTree>
       <p:nvGrpSpPr>
-        <p:cNvPr id="172" name="Shape 172"/>
+        <p:cNvPr id="180" name="Shape 180"/>
         <p:cNvGrpSpPr/>
         <p:nvPr/>
       </p:nvGrpSpPr>
@@ -1421,7 +1421,7 @@
       </p:grpSpPr>
       <p:sp>
         <p:nvSpPr>
-          <p:cNvPr id="173" name="Google Shape;173;g20a4e56f568_0_75:notes"/>
+          <p:cNvPr id="181" name="Google Shape;181;g20a4e56f568_0_75:notes"/>
           <p:cNvSpPr/>
           <p:nvPr>
             <p:ph idx="2" type="sldImg"/>
@@ -1456,7 +1456,7 @@
       </p:sp>
       <p:sp>
         <p:nvSpPr>
-          <p:cNvPr id="174" name="Google Shape;174;g20a4e56f568_0_75:notes"/>
+          <p:cNvPr id="182" name="Google Shape;182;g20a4e56f568_0_75:notes"/>
           <p:cNvSpPr txBox="1"/>
           <p:nvPr>
             <p:ph idx="1" type="body"/>
@@ -10114,9 +10114,476 @@
           <a:chExt cx="0" cy="0"/>
         </a:xfrm>
       </p:grpSpPr>
+      <p:grpSp>
+        <p:nvGrpSpPr>
+          <p:cNvPr id="117" name="Google Shape;117;p22"/>
+          <p:cNvGrpSpPr/>
+          <p:nvPr/>
+        </p:nvGrpSpPr>
+        <p:grpSpPr>
+          <a:xfrm>
+            <a:off x="-2937157" y="-1475066"/>
+            <a:ext cx="6224031" cy="3273578"/>
+            <a:chOff x="1215743" y="-1436966"/>
+            <a:chExt cx="6224031" cy="3273578"/>
+          </a:xfrm>
+        </p:grpSpPr>
+        <p:sp>
+          <p:nvSpPr>
+            <p:cNvPr id="118" name="Google Shape;118;p22"/>
+            <p:cNvSpPr/>
+            <p:nvPr/>
+          </p:nvSpPr>
+          <p:spPr>
+            <a:xfrm rot="-3602502">
+              <a:off x="2595911" y="-1763704"/>
+              <a:ext cx="1398563" cy="3994232"/>
+            </a:xfrm>
+            <a:prstGeom prst="ellipse">
+              <a:avLst/>
+            </a:prstGeom>
+            <a:noFill/>
+            <a:ln cap="flat" cmpd="sng" w="9525">
+              <a:solidFill>
+                <a:schemeClr val="dk1"/>
+              </a:solidFill>
+              <a:prstDash val="solid"/>
+              <a:round/>
+              <a:headEnd len="sm" w="sm" type="none"/>
+              <a:tailEnd len="sm" w="sm" type="none"/>
+            </a:ln>
+          </p:spPr>
+          <p:txBody>
+            <a:bodyPr anchorCtr="0" anchor="ctr" bIns="91425" lIns="91425" spcFirstLastPara="1" rIns="91425" wrap="square" tIns="91425">
+              <a:noAutofit/>
+            </a:bodyPr>
+            <a:lstStyle/>
+            <a:p>
+              <a:pPr indent="0" lvl="0" marL="0" rtl="0" algn="l">
+                <a:spcBef>
+                  <a:spcPts val="0"/>
+                </a:spcBef>
+                <a:spcAft>
+                  <a:spcPts val="0"/>
+                </a:spcAft>
+                <a:buNone/>
+              </a:pPr>
+              <a:r>
+                <a:t/>
+              </a:r>
+              <a:endParaRPr/>
+            </a:p>
+          </p:txBody>
+        </p:sp>
+        <p:sp>
+          <p:nvSpPr>
+            <p:cNvPr id="119" name="Google Shape;119;p22"/>
+            <p:cNvSpPr/>
+            <p:nvPr/>
+          </p:nvSpPr>
+          <p:spPr>
+            <a:xfrm rot="4160511">
+              <a:off x="4625052" y="-2075028"/>
+              <a:ext cx="1398843" cy="3993824"/>
+            </a:xfrm>
+            <a:prstGeom prst="ellipse">
+              <a:avLst/>
+            </a:prstGeom>
+            <a:noFill/>
+            <a:ln cap="flat" cmpd="sng" w="9525">
+              <a:solidFill>
+                <a:schemeClr val="dk1"/>
+              </a:solidFill>
+              <a:prstDash val="solid"/>
+              <a:round/>
+              <a:headEnd len="sm" w="sm" type="none"/>
+              <a:tailEnd len="sm" w="sm" type="none"/>
+            </a:ln>
+          </p:spPr>
+          <p:txBody>
+            <a:bodyPr anchorCtr="0" anchor="ctr" bIns="91425" lIns="91425" spcFirstLastPara="1" rIns="91425" wrap="square" tIns="91425">
+              <a:noAutofit/>
+            </a:bodyPr>
+            <a:lstStyle/>
+            <a:p>
+              <a:pPr indent="0" lvl="0" marL="0" rtl="0" algn="l">
+                <a:spcBef>
+                  <a:spcPts val="0"/>
+                </a:spcBef>
+                <a:spcAft>
+                  <a:spcPts val="0"/>
+                </a:spcAft>
+                <a:buNone/>
+              </a:pPr>
+              <a:r>
+                <a:t/>
+              </a:r>
+              <a:endParaRPr/>
+            </a:p>
+          </p:txBody>
+        </p:sp>
+        <p:sp>
+          <p:nvSpPr>
+            <p:cNvPr id="120" name="Google Shape;120;p22"/>
+            <p:cNvSpPr/>
+            <p:nvPr/>
+          </p:nvSpPr>
+          <p:spPr>
+            <a:xfrm>
+              <a:off x="2120936" y="265242"/>
+              <a:ext cx="790800" cy="790800"/>
+            </a:xfrm>
+            <a:prstGeom prst="ellipse">
+              <a:avLst/>
+            </a:prstGeom>
+            <a:noFill/>
+            <a:ln cap="flat" cmpd="sng" w="9525">
+              <a:solidFill>
+                <a:schemeClr val="dk1"/>
+              </a:solidFill>
+              <a:prstDash val="solid"/>
+              <a:round/>
+              <a:headEnd len="sm" w="sm" type="none"/>
+              <a:tailEnd len="sm" w="sm" type="none"/>
+            </a:ln>
+          </p:spPr>
+          <p:txBody>
+            <a:bodyPr anchorCtr="0" anchor="ctr" bIns="91425" lIns="91425" spcFirstLastPara="1" rIns="91425" wrap="square" tIns="91425">
+              <a:noAutofit/>
+            </a:bodyPr>
+            <a:lstStyle/>
+            <a:p>
+              <a:pPr indent="0" lvl="0" marL="0" rtl="0" algn="l">
+                <a:spcBef>
+                  <a:spcPts val="0"/>
+                </a:spcBef>
+                <a:spcAft>
+                  <a:spcPts val="0"/>
+                </a:spcAft>
+                <a:buNone/>
+              </a:pPr>
+              <a:r>
+                <a:t/>
+              </a:r>
+              <a:endParaRPr/>
+            </a:p>
+          </p:txBody>
+        </p:sp>
+      </p:grpSp>
+      <p:grpSp>
+        <p:nvGrpSpPr>
+          <p:cNvPr id="121" name="Google Shape;121;p22"/>
+          <p:cNvGrpSpPr/>
+          <p:nvPr/>
+        </p:nvGrpSpPr>
+        <p:grpSpPr>
+          <a:xfrm rot="-1635104">
+            <a:off x="7551518" y="466610"/>
+            <a:ext cx="1249106" cy="790907"/>
+            <a:chOff x="2358150" y="204975"/>
+            <a:chExt cx="937650" cy="593700"/>
+          </a:xfrm>
+        </p:grpSpPr>
+        <p:sp>
+          <p:nvSpPr>
+            <p:cNvPr id="122" name="Google Shape;122;p22"/>
+            <p:cNvSpPr/>
+            <p:nvPr/>
+          </p:nvSpPr>
+          <p:spPr>
+            <a:xfrm>
+              <a:off x="2358150" y="204975"/>
+              <a:ext cx="593700" cy="593700"/>
+            </a:xfrm>
+            <a:prstGeom prst="ellipse">
+              <a:avLst/>
+            </a:prstGeom>
+            <a:noFill/>
+            <a:ln cap="flat" cmpd="sng" w="9525">
+              <a:solidFill>
+                <a:schemeClr val="dk1"/>
+              </a:solidFill>
+              <a:prstDash val="solid"/>
+              <a:round/>
+              <a:headEnd len="sm" w="sm" type="none"/>
+              <a:tailEnd len="sm" w="sm" type="none"/>
+            </a:ln>
+          </p:spPr>
+          <p:txBody>
+            <a:bodyPr anchorCtr="0" anchor="ctr" bIns="91425" lIns="91425" spcFirstLastPara="1" rIns="91425" wrap="square" tIns="91425">
+              <a:noAutofit/>
+            </a:bodyPr>
+            <a:lstStyle/>
+            <a:p>
+              <a:pPr indent="0" lvl="0" marL="0" rtl="0" algn="l">
+                <a:spcBef>
+                  <a:spcPts val="0"/>
+                </a:spcBef>
+                <a:spcAft>
+                  <a:spcPts val="0"/>
+                </a:spcAft>
+                <a:buNone/>
+              </a:pPr>
+              <a:r>
+                <a:t/>
+              </a:r>
+              <a:endParaRPr/>
+            </a:p>
+          </p:txBody>
+        </p:sp>
+        <p:sp>
+          <p:nvSpPr>
+            <p:cNvPr id="123" name="Google Shape;123;p22"/>
+            <p:cNvSpPr/>
+            <p:nvPr/>
+          </p:nvSpPr>
+          <p:spPr>
+            <a:xfrm>
+              <a:off x="2702100" y="204975"/>
+              <a:ext cx="593700" cy="593700"/>
+            </a:xfrm>
+            <a:prstGeom prst="ellipse">
+              <a:avLst/>
+            </a:prstGeom>
+            <a:noFill/>
+            <a:ln cap="flat" cmpd="sng" w="9525">
+              <a:solidFill>
+                <a:schemeClr val="dk1"/>
+              </a:solidFill>
+              <a:prstDash val="solid"/>
+              <a:round/>
+              <a:headEnd len="sm" w="sm" type="none"/>
+              <a:tailEnd len="sm" w="sm" type="none"/>
+            </a:ln>
+          </p:spPr>
+          <p:txBody>
+            <a:bodyPr anchorCtr="0" anchor="ctr" bIns="91425" lIns="91425" spcFirstLastPara="1" rIns="91425" wrap="square" tIns="91425">
+              <a:noAutofit/>
+            </a:bodyPr>
+            <a:lstStyle/>
+            <a:p>
+              <a:pPr indent="0" lvl="0" marL="0" rtl="0" algn="l">
+                <a:spcBef>
+                  <a:spcPts val="0"/>
+                </a:spcBef>
+                <a:spcAft>
+                  <a:spcPts val="0"/>
+                </a:spcAft>
+                <a:buNone/>
+              </a:pPr>
+              <a:r>
+                <a:t/>
+              </a:r>
+              <a:endParaRPr/>
+            </a:p>
+          </p:txBody>
+        </p:sp>
+      </p:grpSp>
       <p:sp>
         <p:nvSpPr>
-          <p:cNvPr id="117" name="Google Shape;117;p22"/>
+          <p:cNvPr id="124" name="Google Shape;124;p22"/>
+          <p:cNvSpPr txBox="1"/>
+          <p:nvPr/>
+        </p:nvSpPr>
+        <p:spPr>
+          <a:xfrm>
+            <a:off x="373950" y="1347250"/>
+            <a:ext cx="3657600" cy="400200"/>
+          </a:xfrm>
+          <a:prstGeom prst="rect">
+            <a:avLst/>
+          </a:prstGeom>
+          <a:noFill/>
+          <a:ln>
+            <a:noFill/>
+          </a:ln>
+        </p:spPr>
+        <p:txBody>
+          <a:bodyPr anchorCtr="0" anchor="t" bIns="91425" lIns="91425" spcFirstLastPara="1" rIns="91425" wrap="square" tIns="91425">
+            <a:spAutoFit/>
+          </a:bodyPr>
+          <a:lstStyle/>
+          <a:p>
+            <a:pPr indent="0" lvl="0" marL="0" rtl="0" algn="l">
+              <a:spcBef>
+                <a:spcPts val="0"/>
+              </a:spcBef>
+              <a:spcAft>
+                <a:spcPts val="0"/>
+              </a:spcAft>
+              <a:buNone/>
+            </a:pPr>
+            <a:r>
+              <a:t/>
+            </a:r>
+            <a:endParaRPr/>
+          </a:p>
+        </p:txBody>
+      </p:sp>
+      <p:sp>
+        <p:nvSpPr>
+          <p:cNvPr id="125" name="Google Shape;125;p22"/>
+          <p:cNvSpPr txBox="1"/>
+          <p:nvPr>
+            <p:ph idx="4294967295" type="subTitle"/>
+          </p:nvPr>
+        </p:nvSpPr>
+        <p:spPr>
+          <a:xfrm>
+            <a:off x="560763" y="1546700"/>
+            <a:ext cx="8092800" cy="1576500"/>
+          </a:xfrm>
+          <a:prstGeom prst="rect">
+            <a:avLst/>
+          </a:prstGeom>
+        </p:spPr>
+        <p:txBody>
+          <a:bodyPr anchorCtr="0" anchor="t" bIns="91425" lIns="91425" spcFirstLastPara="1" rIns="91425" wrap="square" tIns="91425">
+            <a:normAutofit/>
+          </a:bodyPr>
+          <a:lstStyle/>
+          <a:p>
+            <a:pPr indent="0" lvl="0" marL="0" rtl="0" algn="l">
+              <a:spcBef>
+                <a:spcPts val="0"/>
+              </a:spcBef>
+              <a:spcAft>
+                <a:spcPts val="1200"/>
+              </a:spcAft>
+              <a:buNone/>
+            </a:pPr>
+            <a:r>
+              <a:rPr lang="en-GB"/>
+              <a:t>Cikls ar pēcnosacījumu dod iespēju atkārtoti veikt vienu un to pašu darbību, kautvai pēc katras darbības ir citas vērtības, līdz kamēr to atkārtošanas reižu daudzumu kritērijs ir sasniegts</a:t>
+            </a:r>
+            <a:endParaRPr/>
+          </a:p>
+        </p:txBody>
+      </p:sp>
+      <p:sp>
+        <p:nvSpPr>
+          <p:cNvPr id="126" name="Google Shape;126;p22"/>
+          <p:cNvSpPr txBox="1"/>
+          <p:nvPr>
+            <p:ph type="title"/>
+          </p:nvPr>
+        </p:nvSpPr>
+        <p:spPr>
+          <a:xfrm>
+            <a:off x="713700" y="895200"/>
+            <a:ext cx="7716600" cy="572700"/>
+          </a:xfrm>
+          <a:prstGeom prst="rect">
+            <a:avLst/>
+          </a:prstGeom>
+        </p:spPr>
+        <p:txBody>
+          <a:bodyPr anchorCtr="0" anchor="b" bIns="91425" lIns="91425" spcFirstLastPara="1" rIns="91425" wrap="square" tIns="91425">
+            <a:normAutofit fontScale="90000"/>
+          </a:bodyPr>
+          <a:lstStyle/>
+          <a:p>
+            <a:pPr indent="0" lvl="0" marL="0" rtl="0" algn="ctr">
+              <a:spcBef>
+                <a:spcPts val="0"/>
+              </a:spcBef>
+              <a:spcAft>
+                <a:spcPts val="0"/>
+              </a:spcAft>
+              <a:buNone/>
+            </a:pPr>
+            <a:r>
+              <a:rPr lang="en-GB"/>
+              <a:t>Cikls ar pēcnosacījumu</a:t>
+            </a:r>
+            <a:endParaRPr/>
+          </a:p>
+          <a:p>
+            <a:pPr indent="0" lvl="0" marL="0" rtl="0" algn="ctr">
+              <a:spcBef>
+                <a:spcPts val="0"/>
+              </a:spcBef>
+              <a:spcAft>
+                <a:spcPts val="0"/>
+              </a:spcAft>
+              <a:buNone/>
+            </a:pPr>
+            <a:r>
+              <a:rPr lang="en-GB"/>
+              <a:t>C++</a:t>
+            </a:r>
+            <a:endParaRPr/>
+          </a:p>
+        </p:txBody>
+      </p:sp>
+      <p:sp>
+        <p:nvSpPr>
+          <p:cNvPr id="127" name="Google Shape;127;p22"/>
+          <p:cNvSpPr txBox="1"/>
+          <p:nvPr>
+            <p:ph idx="4294967295" type="subTitle"/>
+          </p:nvPr>
+        </p:nvSpPr>
+        <p:spPr>
+          <a:xfrm>
+            <a:off x="525588" y="2829400"/>
+            <a:ext cx="8092800" cy="1576500"/>
+          </a:xfrm>
+          <a:prstGeom prst="rect">
+            <a:avLst/>
+          </a:prstGeom>
+        </p:spPr>
+        <p:txBody>
+          <a:bodyPr anchorCtr="0" anchor="t" bIns="91425" lIns="91425" spcFirstLastPara="1" rIns="91425" wrap="square" tIns="91425">
+            <a:normAutofit/>
+          </a:bodyPr>
+          <a:lstStyle/>
+          <a:p>
+            <a:pPr indent="0" lvl="0" marL="0" rtl="0" algn="l">
+              <a:spcBef>
+                <a:spcPts val="0"/>
+              </a:spcBef>
+              <a:spcAft>
+                <a:spcPts val="1200"/>
+              </a:spcAft>
+              <a:buNone/>
+            </a:pPr>
+            <a:r>
+              <a:rPr lang="en-GB"/>
+              <a:t>Pecnosacījuma ciklu izmanto, ja vēlas izpildīt tā darbības vismaz vienu vai vairākas reizes.</a:t>
+            </a:r>
+            <a:endParaRPr/>
+          </a:p>
+        </p:txBody>
+      </p:sp>
+    </p:spTree>
+  </p:cSld>
+  <p:clrMapOvr>
+    <a:masterClrMapping/>
+  </p:clrMapOvr>
+</p:sld>
+</file>
+
+<file path=ppt/slides/slide3.xml><?xml version="1.0" encoding="utf-8"?>
+<p:sld xmlns:a="http://schemas.openxmlformats.org/drawingml/2006/main" xmlns:r="http://schemas.openxmlformats.org/officeDocument/2006/relationships" xmlns:mc="http://schemas.openxmlformats.org/markup-compatibility/2006" xmlns:mv="urn:schemas-microsoft-com:mac:vml" xmlns:p="http://schemas.openxmlformats.org/presentationml/2006/main" xmlns:c="http://schemas.openxmlformats.org/drawingml/2006/chart" xmlns:dgm="http://schemas.openxmlformats.org/drawingml/2006/diagram" xmlns:o="urn:schemas-microsoft-com:office:office" xmlns:v="urn:schemas-microsoft-com:vml" xmlns:pvml="urn:schemas-microsoft-com:office:powerpoint" xmlns:com="http://schemas.openxmlformats.org/drawingml/2006/compatibility" xmlns:p14="http://schemas.microsoft.com/office/powerpoint/2010/main" xmlns:p15="http://schemas.microsoft.com/office/powerpoint/2012/main" xmlns:ahyp="http://schemas.microsoft.com/office/drawing/2018/hyperlinkcolor">
+  <p:cSld>
+    <p:spTree>
+      <p:nvGrpSpPr>
+        <p:cNvPr id="131" name="Shape 131"/>
+        <p:cNvGrpSpPr/>
+        <p:nvPr/>
+      </p:nvGrpSpPr>
+      <p:grpSpPr>
+        <a:xfrm>
+          <a:off x="0" y="0"/>
+          <a:ext cx="0" cy="0"/>
+          <a:chOff x="0" y="0"/>
+          <a:chExt cx="0" cy="0"/>
+        </a:xfrm>
+      </p:grpSpPr>
+      <p:sp>
+        <p:nvSpPr>
+          <p:cNvPr id="132" name="Google Shape;132;p23"/>
           <p:cNvSpPr txBox="1"/>
           <p:nvPr>
             <p:ph type="title"/>
@@ -10148,7 +10615,7 @@
             </a:pPr>
             <a:r>
               <a:rPr lang="en-GB"/>
-              <a:t>Pecnosacījuma un priekšnosacījuma atšķirības</a:t>
+              <a:t>Pecnosacījuma un priekšnosacījuma atšķirība</a:t>
             </a:r>
             <a:endParaRPr/>
           </a:p>
@@ -10156,7 +10623,7 @@
       </p:sp>
       <p:sp>
         <p:nvSpPr>
-          <p:cNvPr id="118" name="Google Shape;118;p22"/>
+          <p:cNvPr id="133" name="Google Shape;133;p23"/>
           <p:cNvSpPr txBox="1"/>
           <p:nvPr>
             <p:ph idx="1" type="subTitle"/>
@@ -10165,7 +10632,7 @@
         <p:spPr>
           <a:xfrm>
             <a:off x="275650" y="1476850"/>
-            <a:ext cx="4398000" cy="1576500"/>
+            <a:ext cx="8092800" cy="1576500"/>
           </a:xfrm>
           <a:prstGeom prst="rect">
             <a:avLst/>
@@ -10211,7 +10678,7 @@
       </p:sp>
       <p:grpSp>
         <p:nvGrpSpPr>
-          <p:cNvPr id="119" name="Google Shape;119;p22"/>
+          <p:cNvPr id="134" name="Google Shape;134;p23"/>
           <p:cNvGrpSpPr/>
           <p:nvPr/>
         </p:nvGrpSpPr>
@@ -10225,7 +10692,7 @@
         </p:grpSpPr>
         <p:sp>
           <p:nvSpPr>
-            <p:cNvPr id="120" name="Google Shape;120;p22"/>
+            <p:cNvPr id="135" name="Google Shape;135;p23"/>
             <p:cNvSpPr/>
             <p:nvPr/>
           </p:nvSpPr>
@@ -10272,7 +10739,7 @@
         </p:sp>
         <p:sp>
           <p:nvSpPr>
-            <p:cNvPr id="121" name="Google Shape;121;p22"/>
+            <p:cNvPr id="136" name="Google Shape;136;p23"/>
             <p:cNvSpPr/>
             <p:nvPr/>
           </p:nvSpPr>
@@ -10319,7 +10786,7 @@
         </p:sp>
         <p:sp>
           <p:nvSpPr>
-            <p:cNvPr id="122" name="Google Shape;122;p22"/>
+            <p:cNvPr id="137" name="Google Shape;137;p23"/>
             <p:cNvSpPr/>
             <p:nvPr/>
           </p:nvSpPr>
@@ -10367,7 +10834,7 @@
       </p:grpSp>
       <p:pic>
         <p:nvPicPr>
-          <p:cNvPr id="123" name="Google Shape;123;p22"/>
+          <p:cNvPr id="138" name="Google Shape;138;p23"/>
           <p:cNvPicPr preferRelativeResize="0"/>
           <p:nvPr/>
         </p:nvPicPr>
@@ -10381,7 +10848,7 @@
         </p:blipFill>
         <p:spPr>
           <a:xfrm>
-            <a:off x="444225" y="2755838"/>
+            <a:off x="444225" y="2689163"/>
             <a:ext cx="2628900" cy="1381125"/>
           </a:xfrm>
           <a:prstGeom prst="rect">
@@ -10395,13 +10862,13 @@
       </p:pic>
       <p:sp>
         <p:nvSpPr>
-          <p:cNvPr id="124" name="Google Shape;124;p22"/>
+          <p:cNvPr id="139" name="Google Shape;139;p23"/>
           <p:cNvSpPr txBox="1"/>
           <p:nvPr/>
         </p:nvSpPr>
         <p:spPr>
           <a:xfrm>
-            <a:off x="444225" y="2471400"/>
+            <a:off x="362150" y="2371650"/>
             <a:ext cx="2898900" cy="400200"/>
           </a:xfrm>
           <a:prstGeom prst="rect">
@@ -10437,7 +10904,7 @@
       </p:sp>
       <p:sp>
         <p:nvSpPr>
-          <p:cNvPr id="125" name="Google Shape;125;p22"/>
+          <p:cNvPr id="140" name="Google Shape;140;p23"/>
           <p:cNvSpPr txBox="1"/>
           <p:nvPr/>
         </p:nvSpPr>
@@ -10479,7 +10946,7 @@
       </p:sp>
       <p:pic>
         <p:nvPicPr>
-          <p:cNvPr id="126" name="Google Shape;126;p22"/>
+          <p:cNvPr id="141" name="Google Shape;141;p23"/>
           <p:cNvPicPr preferRelativeResize="0"/>
           <p:nvPr/>
         </p:nvPicPr>
@@ -10494,7 +10961,7 @@
         <p:spPr>
           <a:xfrm>
             <a:off x="4953600" y="2689175"/>
-            <a:ext cx="2628900" cy="1447800"/>
+            <a:ext cx="2628900" cy="1381125"/>
           </a:xfrm>
           <a:prstGeom prst="rect">
             <a:avLst/>
@@ -10507,14 +10974,14 @@
       </p:pic>
       <p:sp>
         <p:nvSpPr>
-          <p:cNvPr id="127" name="Google Shape;127;p22"/>
+          <p:cNvPr id="142" name="Google Shape;142;p23"/>
           <p:cNvSpPr txBox="1"/>
           <p:nvPr/>
         </p:nvSpPr>
         <p:spPr>
           <a:xfrm>
             <a:off x="444225" y="4188425"/>
-            <a:ext cx="3165600" cy="923400"/>
+            <a:ext cx="3543000" cy="923400"/>
           </a:xfrm>
           <a:prstGeom prst="rect">
             <a:avLst/>
@@ -10541,7 +11008,11 @@
             </a:pPr>
             <a:r>
               <a:rPr lang="en-GB" sz="1200"/>
-              <a:t>cikls nenostrādās, jo tajā mirklī, kad tiks pajautats vai i&lt;10, kas notiek pirms cikla koda darbibas, </a:t>
+              <a:t>C</a:t>
+            </a:r>
+            <a:r>
+              <a:rPr lang="en-GB" sz="1200"/>
+              <a:t>ikls nenostrādās, jo tajā mirklī, kad tiks pajautats vai i&lt;10, kas notiek pirms cikla koda darbibas, </a:t>
             </a:r>
             <a:r>
               <a:rPr lang="en-GB" sz="1200">
@@ -10565,14 +11036,14 @@
       </p:sp>
       <p:cxnSp>
         <p:nvCxnSpPr>
-          <p:cNvPr id="128" name="Google Shape;128;p22"/>
+          <p:cNvPr id="143" name="Google Shape;143;p23"/>
           <p:cNvCxnSpPr/>
           <p:nvPr/>
         </p:nvCxnSpPr>
         <p:spPr>
-          <a:xfrm flipH="1">
-            <a:off x="4623375" y="2464375"/>
-            <a:ext cx="5100" cy="2471100"/>
+          <a:xfrm>
+            <a:off x="4609400" y="2768925"/>
+            <a:ext cx="14100" cy="2166600"/>
           </a:xfrm>
           <a:prstGeom prst="straightConnector1">
             <a:avLst/>
@@ -10591,7 +11062,7 @@
       </p:cxnSp>
       <p:sp>
         <p:nvSpPr>
-          <p:cNvPr id="129" name="Google Shape;129;p22"/>
+          <p:cNvPr id="144" name="Google Shape;144;p23"/>
           <p:cNvSpPr txBox="1"/>
           <p:nvPr/>
         </p:nvSpPr>
@@ -10625,9 +11096,237 @@
             </a:pPr>
             <a:r>
               <a:rPr lang="en-GB" sz="1200"/>
-              <a:t>Cikls nostrādās vienu reizi, jo sākuma vērtiba j ir 11, tad sistēma izies cauri ciklam 1 reizi, j vertibai pieskaitīs 1, cikls pajautās vai j&lt;10 un par cik j=12 taja mirkli cikls vairs neatkartosies un izvadē būs: “11” </a:t>
+              <a:t>Cikls nostrādās vienu reizi, jo sākuma vērtiba j ir 11, tad sistēma izies cauri ciklam 1 reizi, j vertibai tiks pieskaitīs 1, cikls pajautās vai j&lt;10 un par cik j=12 tajā mirklī, cikls vairs neatkartosies un izvade būs: “11” </a:t>
             </a:r>
             <a:endParaRPr sz="1200"/>
+          </a:p>
+        </p:txBody>
+      </p:sp>
+      <p:cxnSp>
+        <p:nvCxnSpPr>
+          <p:cNvPr id="145" name="Google Shape;145;p23"/>
+          <p:cNvCxnSpPr>
+            <a:endCxn id="146" idx="3"/>
+          </p:cNvCxnSpPr>
+          <p:nvPr/>
+        </p:nvCxnSpPr>
+        <p:spPr>
+          <a:xfrm flipH="1" rot="10800000">
+            <a:off x="7593824" y="2940011"/>
+            <a:ext cx="386100" cy="952800"/>
+          </a:xfrm>
+          <a:prstGeom prst="straightConnector1">
+            <a:avLst/>
+          </a:prstGeom>
+          <a:noFill/>
+          <a:ln cap="flat" cmpd="sng" w="9525">
+            <a:solidFill>
+              <a:schemeClr val="dk2"/>
+            </a:solidFill>
+            <a:prstDash val="solid"/>
+            <a:round/>
+            <a:headEnd len="med" w="med" type="none"/>
+            <a:tailEnd len="med" w="med" type="none"/>
+          </a:ln>
+        </p:spPr>
+      </p:cxnSp>
+      <p:sp>
+        <p:nvSpPr>
+          <p:cNvPr id="146" name="Google Shape;146;p23"/>
+          <p:cNvSpPr/>
+          <p:nvPr/>
+        </p:nvSpPr>
+        <p:spPr>
+          <a:xfrm>
+            <a:off x="7780200" y="2050950"/>
+            <a:ext cx="1363800" cy="1041600"/>
+          </a:xfrm>
+          <a:prstGeom prst="ellipse">
+            <a:avLst/>
+          </a:prstGeom>
+          <a:solidFill>
+            <a:schemeClr val="lt2"/>
+          </a:solidFill>
+          <a:ln cap="flat" cmpd="sng" w="9525">
+            <a:solidFill>
+              <a:schemeClr val="dk2"/>
+            </a:solidFill>
+            <a:prstDash val="solid"/>
+            <a:round/>
+            <a:headEnd len="sm" w="sm" type="none"/>
+            <a:tailEnd len="sm" w="sm" type="none"/>
+          </a:ln>
+        </p:spPr>
+        <p:txBody>
+          <a:bodyPr anchorCtr="0" anchor="ctr" bIns="91425" lIns="91425" spcFirstLastPara="1" rIns="91425" wrap="square" tIns="91425">
+            <a:noAutofit/>
+          </a:bodyPr>
+          <a:lstStyle/>
+          <a:p>
+            <a:pPr indent="0" lvl="0" marL="0" rtl="0" algn="l">
+              <a:spcBef>
+                <a:spcPts val="0"/>
+              </a:spcBef>
+              <a:spcAft>
+                <a:spcPts val="0"/>
+              </a:spcAft>
+              <a:buNone/>
+            </a:pPr>
+            <a:r>
+              <a:rPr lang="en-GB" sz="800"/>
+              <a:t>Pēcnosacījuma cikls vienmer izies cauri vismaz 1 reizi</a:t>
+            </a:r>
+            <a:endParaRPr sz="800"/>
+          </a:p>
+        </p:txBody>
+      </p:sp>
+      <p:sp>
+        <p:nvSpPr>
+          <p:cNvPr id="147" name="Google Shape;147;p23"/>
+          <p:cNvSpPr/>
+          <p:nvPr/>
+        </p:nvSpPr>
+        <p:spPr>
+          <a:xfrm>
+            <a:off x="3002850" y="2050950"/>
+            <a:ext cx="1410600" cy="849000"/>
+          </a:xfrm>
+          <a:prstGeom prst="ellipse">
+            <a:avLst/>
+          </a:prstGeom>
+          <a:solidFill>
+            <a:schemeClr val="lt2"/>
+          </a:solidFill>
+          <a:ln cap="flat" cmpd="sng" w="9525">
+            <a:solidFill>
+              <a:schemeClr val="dk2"/>
+            </a:solidFill>
+            <a:prstDash val="solid"/>
+            <a:round/>
+            <a:headEnd len="sm" w="sm" type="none"/>
+            <a:tailEnd len="sm" w="sm" type="none"/>
+          </a:ln>
+        </p:spPr>
+        <p:txBody>
+          <a:bodyPr anchorCtr="0" anchor="ctr" bIns="91425" lIns="91425" spcFirstLastPara="1" rIns="91425" wrap="square" tIns="91425">
+            <a:noAutofit/>
+          </a:bodyPr>
+          <a:lstStyle/>
+          <a:p>
+            <a:pPr indent="0" lvl="0" marL="0" rtl="0" algn="l">
+              <a:spcBef>
+                <a:spcPts val="0"/>
+              </a:spcBef>
+              <a:spcAft>
+                <a:spcPts val="0"/>
+              </a:spcAft>
+              <a:buNone/>
+            </a:pPr>
+            <a:r>
+              <a:rPr lang="en-GB" sz="800"/>
+              <a:t>Nekad nenostrādās, ja cikls jau sākumā ir nepatiess</a:t>
+            </a:r>
+            <a:endParaRPr sz="800"/>
+          </a:p>
+        </p:txBody>
+      </p:sp>
+      <p:cxnSp>
+        <p:nvCxnSpPr>
+          <p:cNvPr id="148" name="Google Shape;148;p23"/>
+          <p:cNvCxnSpPr>
+            <a:stCxn id="147" idx="3"/>
+          </p:cNvCxnSpPr>
+          <p:nvPr/>
+        </p:nvCxnSpPr>
+        <p:spPr>
+          <a:xfrm flipH="1">
+            <a:off x="3103828" y="2775617"/>
+            <a:ext cx="105600" cy="460800"/>
+          </a:xfrm>
+          <a:prstGeom prst="straightConnector1">
+            <a:avLst/>
+          </a:prstGeom>
+          <a:noFill/>
+          <a:ln cap="flat" cmpd="sng" w="9525">
+            <a:solidFill>
+              <a:schemeClr val="dk2"/>
+            </a:solidFill>
+            <a:prstDash val="solid"/>
+            <a:round/>
+            <a:headEnd len="med" w="med" type="none"/>
+            <a:tailEnd len="med" w="med" type="none"/>
+          </a:ln>
+        </p:spPr>
+      </p:cxnSp>
+    </p:spTree>
+  </p:cSld>
+  <p:clrMapOvr>
+    <a:masterClrMapping/>
+  </p:clrMapOvr>
+</p:sld>
+</file>
+
+<file path=ppt/slides/slide4.xml><?xml version="1.0" encoding="utf-8"?>
+<p:sld xmlns:a="http://schemas.openxmlformats.org/drawingml/2006/main" xmlns:r="http://schemas.openxmlformats.org/officeDocument/2006/relationships" xmlns:mc="http://schemas.openxmlformats.org/markup-compatibility/2006" xmlns:mv="urn:schemas-microsoft-com:mac:vml" xmlns:p="http://schemas.openxmlformats.org/presentationml/2006/main" xmlns:c="http://schemas.openxmlformats.org/drawingml/2006/chart" xmlns:dgm="http://schemas.openxmlformats.org/drawingml/2006/diagram" xmlns:o="urn:schemas-microsoft-com:office:office" xmlns:v="urn:schemas-microsoft-com:vml" xmlns:pvml="urn:schemas-microsoft-com:office:powerpoint" xmlns:com="http://schemas.openxmlformats.org/drawingml/2006/compatibility" xmlns:p14="http://schemas.microsoft.com/office/powerpoint/2010/main" xmlns:p15="http://schemas.microsoft.com/office/powerpoint/2012/main" xmlns:ahyp="http://schemas.microsoft.com/office/drawing/2018/hyperlinkcolor">
+  <p:cSld>
+    <p:spTree>
+      <p:nvGrpSpPr>
+        <p:cNvPr id="152" name="Shape 152"/>
+        <p:cNvGrpSpPr/>
+        <p:nvPr/>
+      </p:nvGrpSpPr>
+      <p:grpSpPr>
+        <a:xfrm>
+          <a:off x="0" y="0"/>
+          <a:ext cx="0" cy="0"/>
+          <a:chOff x="0" y="0"/>
+          <a:chExt cx="0" cy="0"/>
+        </a:xfrm>
+      </p:grpSpPr>
+      <p:sp>
+        <p:nvSpPr>
+          <p:cNvPr id="153" name="Google Shape;153;p24"/>
+          <p:cNvSpPr/>
+          <p:nvPr/>
+        </p:nvSpPr>
+        <p:spPr>
+          <a:xfrm rot="3181171">
+            <a:off x="-699502" y="-1265664"/>
+            <a:ext cx="1398903" cy="3994087"/>
+          </a:xfrm>
+          <a:prstGeom prst="ellipse">
+            <a:avLst/>
+          </a:prstGeom>
+          <a:noFill/>
+          <a:ln cap="flat" cmpd="sng" w="9525">
+            <a:solidFill>
+              <a:schemeClr val="dk1"/>
+            </a:solidFill>
+            <a:prstDash val="solid"/>
+            <a:round/>
+            <a:headEnd len="sm" w="sm" type="none"/>
+            <a:tailEnd len="sm" w="sm" type="none"/>
+          </a:ln>
+        </p:spPr>
+        <p:txBody>
+          <a:bodyPr anchorCtr="0" anchor="ctr" bIns="91425" lIns="91425" spcFirstLastPara="1" rIns="91425" wrap="square" tIns="91425">
+            <a:noAutofit/>
+          </a:bodyPr>
+          <a:lstStyle/>
+          <a:p>
+            <a:pPr indent="0" lvl="0" marL="0" rtl="0" algn="l">
+              <a:spcBef>
+                <a:spcPts val="0"/>
+              </a:spcBef>
+              <a:spcAft>
+                <a:spcPts val="0"/>
+              </a:spcAft>
+              <a:buNone/>
+            </a:pPr>
+            <a:r>
+              <a:t/>
+            </a:r>
+            <a:endParaRPr/>
           </a:p>
         </p:txBody>
       </p:sp>
@@ -10639,12 +11338,12 @@
 </p:sld>
 </file>
 
-<file path=ppt/slides/slide3.xml><?xml version="1.0" encoding="utf-8"?>
+<file path=ppt/slides/slide5.xml><?xml version="1.0" encoding="utf-8"?>
 <p:sld xmlns:a="http://schemas.openxmlformats.org/drawingml/2006/main" xmlns:r="http://schemas.openxmlformats.org/officeDocument/2006/relationships" xmlns:mc="http://schemas.openxmlformats.org/markup-compatibility/2006" xmlns:mv="urn:schemas-microsoft-com:mac:vml" xmlns:p="http://schemas.openxmlformats.org/presentationml/2006/main" xmlns:c="http://schemas.openxmlformats.org/drawingml/2006/chart" xmlns:dgm="http://schemas.openxmlformats.org/drawingml/2006/diagram" xmlns:o="urn:schemas-microsoft-com:office:office" xmlns:v="urn:schemas-microsoft-com:vml" xmlns:pvml="urn:schemas-microsoft-com:office:powerpoint" xmlns:com="http://schemas.openxmlformats.org/drawingml/2006/compatibility" xmlns:p14="http://schemas.microsoft.com/office/powerpoint/2010/main" xmlns:p15="http://schemas.microsoft.com/office/powerpoint/2012/main" xmlns:ahyp="http://schemas.microsoft.com/office/drawing/2018/hyperlinkcolor">
   <p:cSld>
     <p:spTree>
       <p:nvGrpSpPr>
-        <p:cNvPr id="133" name="Shape 133"/>
+        <p:cNvPr id="157" name="Shape 157"/>
         <p:cNvGrpSpPr/>
         <p:nvPr/>
       </p:nvGrpSpPr>
@@ -10658,177 +11357,21 @@
       </p:grpSpPr>
       <p:grpSp>
         <p:nvGrpSpPr>
-          <p:cNvPr id="134" name="Google Shape;134;p23"/>
+          <p:cNvPr id="158" name="Google Shape;158;p25"/>
           <p:cNvGrpSpPr/>
           <p:nvPr/>
         </p:nvGrpSpPr>
         <p:grpSpPr>
-          <a:xfrm>
-            <a:off x="1215743" y="-1436966"/>
-            <a:ext cx="6224031" cy="3273578"/>
-            <a:chOff x="1215743" y="-1436966"/>
-            <a:chExt cx="6224031" cy="3273578"/>
-          </a:xfrm>
-        </p:grpSpPr>
-        <p:sp>
-          <p:nvSpPr>
-            <p:cNvPr id="135" name="Google Shape;135;p23"/>
-            <p:cNvSpPr/>
-            <p:nvPr/>
-          </p:nvSpPr>
-          <p:spPr>
-            <a:xfrm rot="-3602502">
-              <a:off x="2595911" y="-1763704"/>
-              <a:ext cx="1398563" cy="3994232"/>
-            </a:xfrm>
-            <a:prstGeom prst="ellipse">
-              <a:avLst/>
-            </a:prstGeom>
-            <a:noFill/>
-            <a:ln cap="flat" cmpd="sng" w="9525">
-              <a:solidFill>
-                <a:schemeClr val="dk1"/>
-              </a:solidFill>
-              <a:prstDash val="solid"/>
-              <a:round/>
-              <a:headEnd len="sm" w="sm" type="none"/>
-              <a:tailEnd len="sm" w="sm" type="none"/>
-            </a:ln>
-          </p:spPr>
-          <p:txBody>
-            <a:bodyPr anchorCtr="0" anchor="ctr" bIns="91425" lIns="91425" spcFirstLastPara="1" rIns="91425" wrap="square" tIns="91425">
-              <a:noAutofit/>
-            </a:bodyPr>
-            <a:lstStyle/>
-            <a:p>
-              <a:pPr indent="0" lvl="0" marL="0" rtl="0" algn="l">
-                <a:spcBef>
-                  <a:spcPts val="0"/>
-                </a:spcBef>
-                <a:spcAft>
-                  <a:spcPts val="0"/>
-                </a:spcAft>
-                <a:buNone/>
-              </a:pPr>
-              <a:r>
-                <a:t/>
-              </a:r>
-              <a:endParaRPr/>
-            </a:p>
-          </p:txBody>
-        </p:sp>
-        <p:sp>
-          <p:nvSpPr>
-            <p:cNvPr id="136" name="Google Shape;136;p23"/>
-            <p:cNvSpPr/>
-            <p:nvPr/>
-          </p:nvSpPr>
-          <p:spPr>
-            <a:xfrm rot="4160511">
-              <a:off x="4625052" y="-2075028"/>
-              <a:ext cx="1398843" cy="3993824"/>
-            </a:xfrm>
-            <a:prstGeom prst="ellipse">
-              <a:avLst/>
-            </a:prstGeom>
-            <a:noFill/>
-            <a:ln cap="flat" cmpd="sng" w="9525">
-              <a:solidFill>
-                <a:schemeClr val="dk1"/>
-              </a:solidFill>
-              <a:prstDash val="solid"/>
-              <a:round/>
-              <a:headEnd len="sm" w="sm" type="none"/>
-              <a:tailEnd len="sm" w="sm" type="none"/>
-            </a:ln>
-          </p:spPr>
-          <p:txBody>
-            <a:bodyPr anchorCtr="0" anchor="ctr" bIns="91425" lIns="91425" spcFirstLastPara="1" rIns="91425" wrap="square" tIns="91425">
-              <a:noAutofit/>
-            </a:bodyPr>
-            <a:lstStyle/>
-            <a:p>
-              <a:pPr indent="0" lvl="0" marL="0" rtl="0" algn="l">
-                <a:spcBef>
-                  <a:spcPts val="0"/>
-                </a:spcBef>
-                <a:spcAft>
-                  <a:spcPts val="0"/>
-                </a:spcAft>
-                <a:buNone/>
-              </a:pPr>
-              <a:r>
-                <a:t/>
-              </a:r>
-              <a:endParaRPr/>
-            </a:p>
-          </p:txBody>
-        </p:sp>
-        <p:sp>
-          <p:nvSpPr>
-            <p:cNvPr id="137" name="Google Shape;137;p23"/>
-            <p:cNvSpPr/>
-            <p:nvPr/>
-          </p:nvSpPr>
-          <p:spPr>
-            <a:xfrm>
-              <a:off x="2120936" y="265242"/>
-              <a:ext cx="790800" cy="790800"/>
-            </a:xfrm>
-            <a:prstGeom prst="ellipse">
-              <a:avLst/>
-            </a:prstGeom>
-            <a:noFill/>
-            <a:ln cap="flat" cmpd="sng" w="9525">
-              <a:solidFill>
-                <a:schemeClr val="dk1"/>
-              </a:solidFill>
-              <a:prstDash val="solid"/>
-              <a:round/>
-              <a:headEnd len="sm" w="sm" type="none"/>
-              <a:tailEnd len="sm" w="sm" type="none"/>
-            </a:ln>
-          </p:spPr>
-          <p:txBody>
-            <a:bodyPr anchorCtr="0" anchor="ctr" bIns="91425" lIns="91425" spcFirstLastPara="1" rIns="91425" wrap="square" tIns="91425">
-              <a:noAutofit/>
-            </a:bodyPr>
-            <a:lstStyle/>
-            <a:p>
-              <a:pPr indent="0" lvl="0" marL="0" rtl="0" algn="l">
-                <a:spcBef>
-                  <a:spcPts val="0"/>
-                </a:spcBef>
-                <a:spcAft>
-                  <a:spcPts val="0"/>
-                </a:spcAft>
-                <a:buNone/>
-              </a:pPr>
-              <a:r>
-                <a:t/>
-              </a:r>
-              <a:endParaRPr/>
-            </a:p>
-          </p:txBody>
-        </p:sp>
-      </p:grpSp>
-      <p:grpSp>
-        <p:nvGrpSpPr>
-          <p:cNvPr id="138" name="Google Shape;138;p23"/>
-          <p:cNvGrpSpPr/>
-          <p:nvPr/>
-        </p:nvGrpSpPr>
-        <p:grpSpPr>
-          <a:xfrm rot="-1635104">
-            <a:off x="7338818" y="1107960"/>
-            <a:ext cx="1249106" cy="790907"/>
+          <a:xfrm rot="969130">
+            <a:off x="1737359" y="3889651"/>
+            <a:ext cx="1249125" cy="790919"/>
             <a:chOff x="2358150" y="204975"/>
             <a:chExt cx="937650" cy="593700"/>
           </a:xfrm>
         </p:grpSpPr>
         <p:sp>
           <p:nvSpPr>
-            <p:cNvPr id="139" name="Google Shape;139;p23"/>
+            <p:cNvPr id="159" name="Google Shape;159;p25"/>
             <p:cNvSpPr/>
             <p:nvPr/>
           </p:nvSpPr>
@@ -10875,213 +11418,7 @@
         </p:sp>
         <p:sp>
           <p:nvSpPr>
-            <p:cNvPr id="140" name="Google Shape;140;p23"/>
-            <p:cNvSpPr/>
-            <p:nvPr/>
-          </p:nvSpPr>
-          <p:spPr>
-            <a:xfrm>
-              <a:off x="2702100" y="204975"/>
-              <a:ext cx="593700" cy="593700"/>
-            </a:xfrm>
-            <a:prstGeom prst="ellipse">
-              <a:avLst/>
-            </a:prstGeom>
-            <a:noFill/>
-            <a:ln cap="flat" cmpd="sng" w="9525">
-              <a:solidFill>
-                <a:schemeClr val="dk1"/>
-              </a:solidFill>
-              <a:prstDash val="solid"/>
-              <a:round/>
-              <a:headEnd len="sm" w="sm" type="none"/>
-              <a:tailEnd len="sm" w="sm" type="none"/>
-            </a:ln>
-          </p:spPr>
-          <p:txBody>
-            <a:bodyPr anchorCtr="0" anchor="ctr" bIns="91425" lIns="91425" spcFirstLastPara="1" rIns="91425" wrap="square" tIns="91425">
-              <a:noAutofit/>
-            </a:bodyPr>
-            <a:lstStyle/>
-            <a:p>
-              <a:pPr indent="0" lvl="0" marL="0" rtl="0" algn="l">
-                <a:spcBef>
-                  <a:spcPts val="0"/>
-                </a:spcBef>
-                <a:spcAft>
-                  <a:spcPts val="0"/>
-                </a:spcAft>
-                <a:buNone/>
-              </a:pPr>
-              <a:r>
-                <a:t/>
-              </a:r>
-              <a:endParaRPr/>
-            </a:p>
-          </p:txBody>
-        </p:sp>
-      </p:grpSp>
-    </p:spTree>
-  </p:cSld>
-  <p:clrMapOvr>
-    <a:masterClrMapping/>
-  </p:clrMapOvr>
-</p:sld>
-</file>
-
-<file path=ppt/slides/slide4.xml><?xml version="1.0" encoding="utf-8"?>
-<p:sld xmlns:a="http://schemas.openxmlformats.org/drawingml/2006/main" xmlns:r="http://schemas.openxmlformats.org/officeDocument/2006/relationships" xmlns:mc="http://schemas.openxmlformats.org/markup-compatibility/2006" xmlns:mv="urn:schemas-microsoft-com:mac:vml" xmlns:p="http://schemas.openxmlformats.org/presentationml/2006/main" xmlns:c="http://schemas.openxmlformats.org/drawingml/2006/chart" xmlns:dgm="http://schemas.openxmlformats.org/drawingml/2006/diagram" xmlns:o="urn:schemas-microsoft-com:office:office" xmlns:v="urn:schemas-microsoft-com:vml" xmlns:pvml="urn:schemas-microsoft-com:office:powerpoint" xmlns:com="http://schemas.openxmlformats.org/drawingml/2006/compatibility" xmlns:p14="http://schemas.microsoft.com/office/powerpoint/2010/main" xmlns:p15="http://schemas.microsoft.com/office/powerpoint/2012/main" xmlns:ahyp="http://schemas.microsoft.com/office/drawing/2018/hyperlinkcolor">
-  <p:cSld>
-    <p:spTree>
-      <p:nvGrpSpPr>
-        <p:cNvPr id="144" name="Shape 144"/>
-        <p:cNvGrpSpPr/>
-        <p:nvPr/>
-      </p:nvGrpSpPr>
-      <p:grpSpPr>
-        <a:xfrm>
-          <a:off x="0" y="0"/>
-          <a:ext cx="0" cy="0"/>
-          <a:chOff x="0" y="0"/>
-          <a:chExt cx="0" cy="0"/>
-        </a:xfrm>
-      </p:grpSpPr>
-      <p:sp>
-        <p:nvSpPr>
-          <p:cNvPr id="145" name="Google Shape;145;p24"/>
-          <p:cNvSpPr/>
-          <p:nvPr/>
-        </p:nvSpPr>
-        <p:spPr>
-          <a:xfrm rot="3181171">
-            <a:off x="-699502" y="-1265664"/>
-            <a:ext cx="1398903" cy="3994087"/>
-          </a:xfrm>
-          <a:prstGeom prst="ellipse">
-            <a:avLst/>
-          </a:prstGeom>
-          <a:noFill/>
-          <a:ln cap="flat" cmpd="sng" w="9525">
-            <a:solidFill>
-              <a:schemeClr val="dk1"/>
-            </a:solidFill>
-            <a:prstDash val="solid"/>
-            <a:round/>
-            <a:headEnd len="sm" w="sm" type="none"/>
-            <a:tailEnd len="sm" w="sm" type="none"/>
-          </a:ln>
-        </p:spPr>
-        <p:txBody>
-          <a:bodyPr anchorCtr="0" anchor="ctr" bIns="91425" lIns="91425" spcFirstLastPara="1" rIns="91425" wrap="square" tIns="91425">
-            <a:noAutofit/>
-          </a:bodyPr>
-          <a:lstStyle/>
-          <a:p>
-            <a:pPr indent="0" lvl="0" marL="0" rtl="0" algn="l">
-              <a:spcBef>
-                <a:spcPts val="0"/>
-              </a:spcBef>
-              <a:spcAft>
-                <a:spcPts val="0"/>
-              </a:spcAft>
-              <a:buNone/>
-            </a:pPr>
-            <a:r>
-              <a:t/>
-            </a:r>
-            <a:endParaRPr/>
-          </a:p>
-        </p:txBody>
-      </p:sp>
-    </p:spTree>
-  </p:cSld>
-  <p:clrMapOvr>
-    <a:masterClrMapping/>
-  </p:clrMapOvr>
-</p:sld>
-</file>
-
-<file path=ppt/slides/slide5.xml><?xml version="1.0" encoding="utf-8"?>
-<p:sld xmlns:a="http://schemas.openxmlformats.org/drawingml/2006/main" xmlns:r="http://schemas.openxmlformats.org/officeDocument/2006/relationships" xmlns:mc="http://schemas.openxmlformats.org/markup-compatibility/2006" xmlns:mv="urn:schemas-microsoft-com:mac:vml" xmlns:p="http://schemas.openxmlformats.org/presentationml/2006/main" xmlns:c="http://schemas.openxmlformats.org/drawingml/2006/chart" xmlns:dgm="http://schemas.openxmlformats.org/drawingml/2006/diagram" xmlns:o="urn:schemas-microsoft-com:office:office" xmlns:v="urn:schemas-microsoft-com:vml" xmlns:pvml="urn:schemas-microsoft-com:office:powerpoint" xmlns:com="http://schemas.openxmlformats.org/drawingml/2006/compatibility" xmlns:p14="http://schemas.microsoft.com/office/powerpoint/2010/main" xmlns:p15="http://schemas.microsoft.com/office/powerpoint/2012/main" xmlns:ahyp="http://schemas.microsoft.com/office/drawing/2018/hyperlinkcolor">
-  <p:cSld>
-    <p:spTree>
-      <p:nvGrpSpPr>
-        <p:cNvPr id="149" name="Shape 149"/>
-        <p:cNvGrpSpPr/>
-        <p:nvPr/>
-      </p:nvGrpSpPr>
-      <p:grpSpPr>
-        <a:xfrm>
-          <a:off x="0" y="0"/>
-          <a:ext cx="0" cy="0"/>
-          <a:chOff x="0" y="0"/>
-          <a:chExt cx="0" cy="0"/>
-        </a:xfrm>
-      </p:grpSpPr>
-      <p:grpSp>
-        <p:nvGrpSpPr>
-          <p:cNvPr id="150" name="Google Shape;150;p25"/>
-          <p:cNvGrpSpPr/>
-          <p:nvPr/>
-        </p:nvGrpSpPr>
-        <p:grpSpPr>
-          <a:xfrm rot="969130">
-            <a:off x="1737359" y="3889651"/>
-            <a:ext cx="1249125" cy="790919"/>
-            <a:chOff x="2358150" y="204975"/>
-            <a:chExt cx="937650" cy="593700"/>
-          </a:xfrm>
-        </p:grpSpPr>
-        <p:sp>
-          <p:nvSpPr>
-            <p:cNvPr id="151" name="Google Shape;151;p25"/>
-            <p:cNvSpPr/>
-            <p:nvPr/>
-          </p:nvSpPr>
-          <p:spPr>
-            <a:xfrm>
-              <a:off x="2358150" y="204975"/>
-              <a:ext cx="593700" cy="593700"/>
-            </a:xfrm>
-            <a:prstGeom prst="ellipse">
-              <a:avLst/>
-            </a:prstGeom>
-            <a:noFill/>
-            <a:ln cap="flat" cmpd="sng" w="9525">
-              <a:solidFill>
-                <a:schemeClr val="dk1"/>
-              </a:solidFill>
-              <a:prstDash val="solid"/>
-              <a:round/>
-              <a:headEnd len="sm" w="sm" type="none"/>
-              <a:tailEnd len="sm" w="sm" type="none"/>
-            </a:ln>
-          </p:spPr>
-          <p:txBody>
-            <a:bodyPr anchorCtr="0" anchor="ctr" bIns="91425" lIns="91425" spcFirstLastPara="1" rIns="91425" wrap="square" tIns="91425">
-              <a:noAutofit/>
-            </a:bodyPr>
-            <a:lstStyle/>
-            <a:p>
-              <a:pPr indent="0" lvl="0" marL="0" rtl="0" algn="l">
-                <a:spcBef>
-                  <a:spcPts val="0"/>
-                </a:spcBef>
-                <a:spcAft>
-                  <a:spcPts val="0"/>
-                </a:spcAft>
-                <a:buNone/>
-              </a:pPr>
-              <a:r>
-                <a:t/>
-              </a:r>
-              <a:endParaRPr/>
-            </a:p>
-          </p:txBody>
-        </p:sp>
-        <p:sp>
-          <p:nvSpPr>
-            <p:cNvPr id="152" name="Google Shape;152;p25"/>
+            <p:cNvPr id="160" name="Google Shape;160;p25"/>
             <p:cNvSpPr/>
             <p:nvPr/>
           </p:nvSpPr>
@@ -11129,7 +11466,7 @@
       </p:grpSp>
       <p:grpSp>
         <p:nvGrpSpPr>
-          <p:cNvPr id="153" name="Google Shape;153;p25"/>
+          <p:cNvPr id="161" name="Google Shape;161;p25"/>
           <p:cNvGrpSpPr/>
           <p:nvPr/>
         </p:nvGrpSpPr>
@@ -11143,7 +11480,7 @@
         </p:grpSpPr>
         <p:sp>
           <p:nvSpPr>
-            <p:cNvPr id="154" name="Google Shape;154;p25"/>
+            <p:cNvPr id="162" name="Google Shape;162;p25"/>
             <p:cNvSpPr/>
             <p:nvPr/>
           </p:nvSpPr>
@@ -11190,7 +11527,7 @@
         </p:sp>
         <p:sp>
           <p:nvSpPr>
-            <p:cNvPr id="155" name="Google Shape;155;p25"/>
+            <p:cNvPr id="163" name="Google Shape;163;p25"/>
             <p:cNvSpPr/>
             <p:nvPr/>
           </p:nvSpPr>
@@ -11237,7 +11574,7 @@
         </p:sp>
         <p:sp>
           <p:nvSpPr>
-            <p:cNvPr id="156" name="Google Shape;156;p25"/>
+            <p:cNvPr id="164" name="Google Shape;164;p25"/>
             <p:cNvSpPr/>
             <p:nvPr/>
           </p:nvSpPr>
@@ -11296,7 +11633,7 @@
   <p:cSld>
     <p:spTree>
       <p:nvGrpSpPr>
-        <p:cNvPr id="160" name="Shape 160"/>
+        <p:cNvPr id="168" name="Shape 168"/>
         <p:cNvGrpSpPr/>
         <p:nvPr/>
       </p:nvGrpSpPr>
@@ -11310,7 +11647,7 @@
       </p:grpSpPr>
       <p:grpSp>
         <p:nvGrpSpPr>
-          <p:cNvPr id="161" name="Google Shape;161;p26"/>
+          <p:cNvPr id="169" name="Google Shape;169;p26"/>
           <p:cNvGrpSpPr/>
           <p:nvPr/>
         </p:nvGrpSpPr>
@@ -11324,7 +11661,7 @@
         </p:grpSpPr>
         <p:sp>
           <p:nvSpPr>
-            <p:cNvPr id="162" name="Google Shape;162;p26"/>
+            <p:cNvPr id="170" name="Google Shape;170;p26"/>
             <p:cNvSpPr/>
             <p:nvPr/>
           </p:nvSpPr>
@@ -11371,7 +11708,7 @@
         </p:sp>
         <p:sp>
           <p:nvSpPr>
-            <p:cNvPr id="163" name="Google Shape;163;p26"/>
+            <p:cNvPr id="171" name="Google Shape;171;p26"/>
             <p:cNvSpPr/>
             <p:nvPr/>
           </p:nvSpPr>
@@ -11418,7 +11755,7 @@
         </p:sp>
         <p:sp>
           <p:nvSpPr>
-            <p:cNvPr id="164" name="Google Shape;164;p26"/>
+            <p:cNvPr id="172" name="Google Shape;172;p26"/>
             <p:cNvSpPr/>
             <p:nvPr/>
           </p:nvSpPr>
@@ -11466,7 +11803,7 @@
       </p:grpSp>
       <p:grpSp>
         <p:nvGrpSpPr>
-          <p:cNvPr id="165" name="Google Shape;165;p26"/>
+          <p:cNvPr id="173" name="Google Shape;173;p26"/>
           <p:cNvGrpSpPr/>
           <p:nvPr/>
         </p:nvGrpSpPr>
@@ -11480,7 +11817,7 @@
         </p:grpSpPr>
         <p:sp>
           <p:nvSpPr>
-            <p:cNvPr id="166" name="Google Shape;166;p26"/>
+            <p:cNvPr id="174" name="Google Shape;174;p26"/>
             <p:cNvSpPr/>
             <p:nvPr/>
           </p:nvSpPr>
@@ -11527,7 +11864,7 @@
         </p:sp>
         <p:sp>
           <p:nvSpPr>
-            <p:cNvPr id="167" name="Google Shape;167;p26"/>
+            <p:cNvPr id="175" name="Google Shape;175;p26"/>
             <p:cNvSpPr/>
             <p:nvPr/>
           </p:nvSpPr>
@@ -11586,7 +11923,7 @@
   <p:cSld>
     <p:spTree>
       <p:nvGrpSpPr>
-        <p:cNvPr id="171" name="Shape 171"/>
+        <p:cNvPr id="179" name="Shape 179"/>
         <p:cNvGrpSpPr/>
         <p:nvPr/>
       </p:nvGrpSpPr>
@@ -11611,7 +11948,7 @@
   <p:cSld>
     <p:spTree>
       <p:nvGrpSpPr>
-        <p:cNvPr id="175" name="Shape 175"/>
+        <p:cNvPr id="183" name="Shape 183"/>
         <p:cNvGrpSpPr/>
         <p:nvPr/>
       </p:nvGrpSpPr>
@@ -11625,7 +11962,7 @@
       </p:grpSpPr>
       <p:grpSp>
         <p:nvGrpSpPr>
-          <p:cNvPr id="176" name="Google Shape;176;p28"/>
+          <p:cNvPr id="184" name="Google Shape;184;p28"/>
           <p:cNvGrpSpPr/>
           <p:nvPr/>
         </p:nvGrpSpPr>
@@ -11639,7 +11976,7 @@
         </p:grpSpPr>
         <p:sp>
           <p:nvSpPr>
-            <p:cNvPr id="177" name="Google Shape;177;p28"/>
+            <p:cNvPr id="185" name="Google Shape;185;p28"/>
             <p:cNvSpPr/>
             <p:nvPr/>
           </p:nvSpPr>
@@ -11686,7 +12023,7 @@
         </p:sp>
         <p:sp>
           <p:nvSpPr>
-            <p:cNvPr id="178" name="Google Shape;178;p28"/>
+            <p:cNvPr id="186" name="Google Shape;186;p28"/>
             <p:cNvSpPr/>
             <p:nvPr/>
           </p:nvSpPr>
@@ -11733,7 +12070,7 @@
         </p:sp>
         <p:sp>
           <p:nvSpPr>
-            <p:cNvPr id="179" name="Google Shape;179;p28"/>
+            <p:cNvPr id="187" name="Google Shape;187;p28"/>
             <p:cNvSpPr/>
             <p:nvPr/>
           </p:nvSpPr>
@@ -11779,6 +12116,79 @@
           </p:txBody>
         </p:sp>
       </p:grpSp>
+      <p:sp>
+        <p:nvSpPr>
+          <p:cNvPr id="188" name="Google Shape;188;p28"/>
+          <p:cNvSpPr txBox="1"/>
+          <p:nvPr/>
+        </p:nvSpPr>
+        <p:spPr>
+          <a:xfrm>
+            <a:off x="888300" y="2340625"/>
+            <a:ext cx="7512000" cy="831300"/>
+          </a:xfrm>
+          <a:prstGeom prst="rect">
+            <a:avLst/>
+          </a:prstGeom>
+          <a:noFill/>
+          <a:ln>
+            <a:noFill/>
+          </a:ln>
+        </p:spPr>
+        <p:txBody>
+          <a:bodyPr anchorCtr="0" anchor="t" bIns="91425" lIns="91425" spcFirstLastPara="1" rIns="91425" wrap="square" tIns="91425">
+            <a:spAutoFit/>
+          </a:bodyPr>
+          <a:lstStyle/>
+          <a:p>
+            <a:pPr indent="0" lvl="0" marL="0" rtl="0" algn="l">
+              <a:spcBef>
+                <a:spcPts val="0"/>
+              </a:spcBef>
+              <a:spcAft>
+                <a:spcPts val="0"/>
+              </a:spcAft>
+              <a:buNone/>
+            </a:pPr>
+            <a:r>
+              <a:rPr lang="en-GB"/>
+              <a:t>Izmantotie informācijas avoti:</a:t>
+            </a:r>
+            <a:endParaRPr/>
+          </a:p>
+          <a:p>
+            <a:pPr indent="0" lvl="0" marL="0" rtl="0" algn="l">
+              <a:spcBef>
+                <a:spcPts val="0"/>
+              </a:spcBef>
+              <a:spcAft>
+                <a:spcPts val="0"/>
+              </a:spcAft>
+              <a:buNone/>
+            </a:pPr>
+            <a:r>
+              <a:t/>
+            </a:r>
+            <a:endParaRPr/>
+          </a:p>
+          <a:p>
+            <a:pPr indent="0" lvl="0" marL="0" rtl="0" algn="l">
+              <a:spcBef>
+                <a:spcPts val="0"/>
+              </a:spcBef>
+              <a:spcAft>
+                <a:spcPts val="0"/>
+              </a:spcAft>
+              <a:buNone/>
+            </a:pPr>
+            <a:r>
+              <a:rPr lang="en-GB"/>
+              <a:t>https://stackoverflow.com/questions/25233132/the-difference-between-while-and-do-while-c</a:t>
+            </a:r>
+            <a:endParaRPr/>
+          </a:p>
+        </p:txBody>
+      </p:sp>
     </p:spTree>
   </p:cSld>
   <p:clrMapOvr>
@@ -11788,6 +12198,285 @@
 </file>
 
 <file path=ppt/theme/theme1.xml><?xml version="1.0" encoding="utf-8"?>
+<a:theme xmlns:a="http://schemas.openxmlformats.org/drawingml/2006/main" xmlns:r="http://schemas.openxmlformats.org/officeDocument/2006/relationships">
+  <a:themeElements>
+    <a:clrScheme name="Default">
+      <a:dk1>
+        <a:srgbClr val="000000"/>
+      </a:dk1>
+      <a:lt1>
+        <a:srgbClr val="FFFFFF"/>
+      </a:lt1>
+      <a:dk2>
+        <a:srgbClr val="158158"/>
+      </a:dk2>
+      <a:lt2>
+        <a:srgbClr val="F3F3F3"/>
+      </a:lt2>
+      <a:accent1>
+        <a:srgbClr val="058DC7"/>
+      </a:accent1>
+      <a:accent2>
+        <a:srgbClr val="50B432"/>
+      </a:accent2>
+      <a:accent3>
+        <a:srgbClr val="ED561B"/>
+      </a:accent3>
+      <a:accent4>
+        <a:srgbClr val="EDEF00"/>
+      </a:accent4>
+      <a:accent5>
+        <a:srgbClr val="24CBE5"/>
+      </a:accent5>
+      <a:accent6>
+        <a:srgbClr val="64E572"/>
+      </a:accent6>
+      <a:hlink>
+        <a:srgbClr val="2200CC"/>
+      </a:hlink>
+      <a:folHlink>
+        <a:srgbClr val="551A8B"/>
+      </a:folHlink>
+    </a:clrScheme>
+    <a:fontScheme name="Office">
+      <a:majorFont>
+        <a:latin typeface="Arial"/>
+        <a:ea typeface=""/>
+        <a:cs typeface=""/>
+        <a:font script="Jpan" typeface="ＭＳ Ｐゴシック"/>
+        <a:font script="Hang" typeface="맑은 고딕"/>
+        <a:font script="Hans" typeface="宋体"/>
+        <a:font script="Hant" typeface="新細明體"/>
+        <a:font script="Arab" typeface="Times New Roman"/>
+        <a:font script="Hebr" typeface="Times New Roman"/>
+        <a:font script="Thai" typeface="Angsana New"/>
+        <a:font script="Ethi" typeface="Nyala"/>
+        <a:font script="Beng" typeface="Vrinda"/>
+        <a:font script="Gujr" typeface="Shruti"/>
+        <a:font script="Khmr" typeface="MoolBoran"/>
+        <a:font script="Knda" typeface="Tunga"/>
+        <a:font script="Guru" typeface="Raavi"/>
+        <a:font script="Cans" typeface="Euphemia"/>
+        <a:font script="Cher" typeface="Plantagenet Cherokee"/>
+        <a:font script="Yiii" typeface="Microsoft Yi Baiti"/>
+        <a:font script="Tibt" typeface="Microsoft Himalaya"/>
+        <a:font script="Thaa" typeface="MV Boli"/>
+        <a:font script="Deva" typeface="Mangal"/>
+        <a:font script="Telu" typeface="Gautami"/>
+        <a:font script="Taml" typeface="Latha"/>
+        <a:font script="Syrc" typeface="Estrangelo Edessa"/>
+        <a:font script="Orya" typeface="Kalinga"/>
+        <a:font script="Mlym" typeface="Kartika"/>
+        <a:font script="Laoo" typeface="DokChampa"/>
+        <a:font script="Sinh" typeface="Iskoola Pota"/>
+        <a:font script="Mong" typeface="Mongolian Baiti"/>
+        <a:font script="Viet" typeface="Times New Roman"/>
+        <a:font script="Uigh" typeface="Microsoft Uighur"/>
+        <a:font script="Geor" typeface="Sylfaen"/>
+      </a:majorFont>
+      <a:minorFont>
+        <a:latin typeface="Arial"/>
+        <a:ea typeface=""/>
+        <a:cs typeface=""/>
+        <a:font script="Jpan" typeface="ＭＳ Ｐゴシック"/>
+        <a:font script="Hang" typeface="맑은 고딕"/>
+        <a:font script="Hans" typeface="宋体"/>
+        <a:font script="Hant" typeface="新細明體"/>
+        <a:font script="Arab" typeface="Arial"/>
+        <a:font script="Hebr" typeface="Arial"/>
+        <a:font script="Thai" typeface="Cordia New"/>
+        <a:font script="Ethi" typeface="Nyala"/>
+        <a:font script="Beng" typeface="Vrinda"/>
+        <a:font script="Gujr" typeface="Shruti"/>
+        <a:font script="Khmr" typeface="DaunPenh"/>
+        <a:font script="Knda" typeface="Tunga"/>
+        <a:font script="Guru" typeface="Raavi"/>
+        <a:font script="Cans" typeface="Euphemia"/>
+        <a:font script="Cher" typeface="Plantagenet Cherokee"/>
+        <a:font script="Yiii" typeface="Microsoft Yi Baiti"/>
+        <a:font script="Tibt" typeface="Microsoft Himalaya"/>
+        <a:font script="Thaa" typeface="MV Boli"/>
+        <a:font script="Deva" typeface="Mangal"/>
+        <a:font script="Telu" typeface="Gautami"/>
+        <a:font script="Taml" typeface="Latha"/>
+        <a:font script="Syrc" typeface="Estrangelo Edessa"/>
+        <a:font script="Orya" typeface="Kalinga"/>
+        <a:font script="Mlym" typeface="Kartika"/>
+        <a:font script="Laoo" typeface="DokChampa"/>
+        <a:font script="Sinh" typeface="Iskoola Pota"/>
+        <a:font script="Mong" typeface="Mongolian Baiti"/>
+        <a:font script="Viet" typeface="Arial"/>
+        <a:font script="Uigh" typeface="Microsoft Uighur"/>
+        <a:font script="Geor" typeface="Sylfaen"/>
+      </a:minorFont>
+    </a:fontScheme>
+    <a:fmtScheme name="Office">
+      <a:fillStyleLst>
+        <a:solidFill>
+          <a:schemeClr val="phClr"/>
+        </a:solidFill>
+        <a:gradFill rotWithShape="1">
+          <a:gsLst>
+            <a:gs pos="0">
+              <a:schemeClr val="phClr">
+                <a:tint val="50000"/>
+                <a:satMod val="300000"/>
+              </a:schemeClr>
+            </a:gs>
+            <a:gs pos="35000">
+              <a:schemeClr val="phClr">
+                <a:tint val="37000"/>
+                <a:satMod val="300000"/>
+              </a:schemeClr>
+            </a:gs>
+            <a:gs pos="100000">
+              <a:schemeClr val="phClr">
+                <a:tint val="15000"/>
+                <a:satMod val="350000"/>
+              </a:schemeClr>
+            </a:gs>
+          </a:gsLst>
+          <a:lin ang="16200000" scaled="1"/>
+        </a:gradFill>
+        <a:gradFill rotWithShape="1">
+          <a:gsLst>
+            <a:gs pos="0">
+              <a:schemeClr val="phClr">
+                <a:tint val="100000"/>
+                <a:shade val="100000"/>
+                <a:satMod val="130000"/>
+              </a:schemeClr>
+            </a:gs>
+            <a:gs pos="100000">
+              <a:schemeClr val="phClr">
+                <a:tint val="50000"/>
+                <a:shade val="100000"/>
+                <a:satMod val="350000"/>
+              </a:schemeClr>
+            </a:gs>
+          </a:gsLst>
+          <a:lin ang="16200000" scaled="0"/>
+        </a:gradFill>
+      </a:fillStyleLst>
+      <a:lnStyleLst>
+        <a:ln w="9525" cap="flat" cmpd="sng" algn="ctr">
+          <a:solidFill>
+            <a:schemeClr val="phClr">
+              <a:shade val="95000"/>
+              <a:satMod val="105000"/>
+            </a:schemeClr>
+          </a:solidFill>
+          <a:prstDash val="solid"/>
+        </a:ln>
+        <a:ln w="25400" cap="flat" cmpd="sng" algn="ctr">
+          <a:solidFill>
+            <a:schemeClr val="phClr"/>
+          </a:solidFill>
+          <a:prstDash val="solid"/>
+        </a:ln>
+        <a:ln w="38100" cap="flat" cmpd="sng" algn="ctr">
+          <a:solidFill>
+            <a:schemeClr val="phClr"/>
+          </a:solidFill>
+          <a:prstDash val="solid"/>
+        </a:ln>
+      </a:lnStyleLst>
+      <a:effectStyleLst>
+        <a:effectStyle>
+          <a:effectLst>
+            <a:outerShdw blurRad="40000" dist="20000" dir="5400000" rotWithShape="0">
+              <a:srgbClr val="000000">
+                <a:alpha val="38000"/>
+              </a:srgbClr>
+            </a:outerShdw>
+          </a:effectLst>
+        </a:effectStyle>
+        <a:effectStyle>
+          <a:effectLst>
+            <a:outerShdw blurRad="40000" dist="23000" dir="5400000" rotWithShape="0">
+              <a:srgbClr val="000000">
+                <a:alpha val="35000"/>
+              </a:srgbClr>
+            </a:outerShdw>
+          </a:effectLst>
+        </a:effectStyle>
+        <a:effectStyle>
+          <a:effectLst>
+            <a:outerShdw blurRad="40000" dist="23000" dir="5400000" rotWithShape="0">
+              <a:srgbClr val="000000">
+                <a:alpha val="35000"/>
+              </a:srgbClr>
+            </a:outerShdw>
+          </a:effectLst>
+          <a:scene3d>
+            <a:camera prst="orthographicFront">
+              <a:rot lat="0" lon="0" rev="0"/>
+            </a:camera>
+            <a:lightRig rig="threePt" dir="t">
+              <a:rot lat="0" lon="0" rev="1200000"/>
+            </a:lightRig>
+          </a:scene3d>
+          <a:sp3d>
+            <a:bevelT w="63500" h="25400"/>
+          </a:sp3d>
+        </a:effectStyle>
+      </a:effectStyleLst>
+      <a:bgFillStyleLst>
+        <a:solidFill>
+          <a:schemeClr val="phClr"/>
+        </a:solidFill>
+        <a:gradFill rotWithShape="1">
+          <a:gsLst>
+            <a:gs pos="0">
+              <a:schemeClr val="phClr">
+                <a:tint val="40000"/>
+                <a:satMod val="350000"/>
+              </a:schemeClr>
+            </a:gs>
+            <a:gs pos="40000">
+              <a:schemeClr val="phClr">
+                <a:tint val="45000"/>
+                <a:shade val="99000"/>
+                <a:satMod val="350000"/>
+              </a:schemeClr>
+            </a:gs>
+            <a:gs pos="100000">
+              <a:schemeClr val="phClr">
+                <a:shade val="20000"/>
+                <a:satMod val="255000"/>
+              </a:schemeClr>
+            </a:gs>
+          </a:gsLst>
+          <a:path path="circle">
+            <a:fillToRect l="50000" t="-80000" r="50000" b="180000"/>
+          </a:path>
+        </a:gradFill>
+        <a:gradFill rotWithShape="1">
+          <a:gsLst>
+            <a:gs pos="0">
+              <a:schemeClr val="phClr">
+                <a:tint val="80000"/>
+                <a:satMod val="300000"/>
+              </a:schemeClr>
+            </a:gs>
+            <a:gs pos="100000">
+              <a:schemeClr val="phClr">
+                <a:shade val="30000"/>
+                <a:satMod val="200000"/>
+              </a:schemeClr>
+            </a:gs>
+          </a:gsLst>
+          <a:path path="circle">
+            <a:fillToRect l="50000" t="50000" r="50000" b="50000"/>
+          </a:path>
+        </a:gradFill>
+      </a:bgFillStyleLst>
+    </a:fmtScheme>
+  </a:themeElements>
+</a:theme>
+</file>
+
+<file path=ppt/theme/theme2.xml><?xml version="1.0" encoding="utf-8"?>
 <a:theme xmlns:a="http://schemas.openxmlformats.org/drawingml/2006/main" xmlns:r="http://schemas.openxmlformats.org/officeDocument/2006/relationships" name="Simple Light">
   <a:themeElements>
     <a:clrScheme name="Simple Light">
@@ -12064,283 +12753,4 @@
     </a:fmtScheme>
   </a:themeElements>
 </a:theme>
-</file>
-
-<file path=ppt/theme/theme2.xml><?xml version="1.0" encoding="utf-8"?>
-<a:theme xmlns:a="http://schemas.openxmlformats.org/drawingml/2006/main" xmlns:r="http://schemas.openxmlformats.org/officeDocument/2006/relationships">
-  <a:themeElements>
-    <a:clrScheme name="Default">
-      <a:dk1>
-        <a:srgbClr val="000000"/>
-      </a:dk1>
-      <a:lt1>
-        <a:srgbClr val="FFFFFF"/>
-      </a:lt1>
-      <a:dk2>
-        <a:srgbClr val="158158"/>
-      </a:dk2>
-      <a:lt2>
-        <a:srgbClr val="F3F3F3"/>
-      </a:lt2>
-      <a:accent1>
-        <a:srgbClr val="058DC7"/>
-      </a:accent1>
-      <a:accent2>
-        <a:srgbClr val="50B432"/>
-      </a:accent2>
-      <a:accent3>
-        <a:srgbClr val="ED561B"/>
-      </a:accent3>
-      <a:accent4>
-        <a:srgbClr val="EDEF00"/>
-      </a:accent4>
-      <a:accent5>
-        <a:srgbClr val="24CBE5"/>
-      </a:accent5>
-      <a:accent6>
-        <a:srgbClr val="64E572"/>
-      </a:accent6>
-      <a:hlink>
-        <a:srgbClr val="2200CC"/>
-      </a:hlink>
-      <a:folHlink>
-        <a:srgbClr val="551A8B"/>
-      </a:folHlink>
-    </a:clrScheme>
-    <a:fontScheme name="Office">
-      <a:majorFont>
-        <a:latin typeface="Arial"/>
-        <a:ea typeface=""/>
-        <a:cs typeface=""/>
-        <a:font script="Jpan" typeface="ＭＳ Ｐゴシック"/>
-        <a:font script="Hang" typeface="맑은 고딕"/>
-        <a:font script="Hans" typeface="宋体"/>
-        <a:font script="Hant" typeface="新細明體"/>
-        <a:font script="Arab" typeface="Times New Roman"/>
-        <a:font script="Hebr" typeface="Times New Roman"/>
-        <a:font script="Thai" typeface="Angsana New"/>
-        <a:font script="Ethi" typeface="Nyala"/>
-        <a:font script="Beng" typeface="Vrinda"/>
-        <a:font script="Gujr" typeface="Shruti"/>
-        <a:font script="Khmr" typeface="MoolBoran"/>
-        <a:font script="Knda" typeface="Tunga"/>
-        <a:font script="Guru" typeface="Raavi"/>
-        <a:font script="Cans" typeface="Euphemia"/>
-        <a:font script="Cher" typeface="Plantagenet Cherokee"/>
-        <a:font script="Yiii" typeface="Microsoft Yi Baiti"/>
-        <a:font script="Tibt" typeface="Microsoft Himalaya"/>
-        <a:font script="Thaa" typeface="MV Boli"/>
-        <a:font script="Deva" typeface="Mangal"/>
-        <a:font script="Telu" typeface="Gautami"/>
-        <a:font script="Taml" typeface="Latha"/>
-        <a:font script="Syrc" typeface="Estrangelo Edessa"/>
-        <a:font script="Orya" typeface="Kalinga"/>
-        <a:font script="Mlym" typeface="Kartika"/>
-        <a:font script="Laoo" typeface="DokChampa"/>
-        <a:font script="Sinh" typeface="Iskoola Pota"/>
-        <a:font script="Mong" typeface="Mongolian Baiti"/>
-        <a:font script="Viet" typeface="Times New Roman"/>
-        <a:font script="Uigh" typeface="Microsoft Uighur"/>
-        <a:font script="Geor" typeface="Sylfaen"/>
-      </a:majorFont>
-      <a:minorFont>
-        <a:latin typeface="Arial"/>
-        <a:ea typeface=""/>
-        <a:cs typeface=""/>
-        <a:font script="Jpan" typeface="ＭＳ Ｐゴシック"/>
-        <a:font script="Hang" typeface="맑은 고딕"/>
-        <a:font script="Hans" typeface="宋体"/>
-        <a:font script="Hant" typeface="新細明體"/>
-        <a:font script="Arab" typeface="Arial"/>
-        <a:font script="Hebr" typeface="Arial"/>
-        <a:font script="Thai" typeface="Cordia New"/>
-        <a:font script="Ethi" typeface="Nyala"/>
-        <a:font script="Beng" typeface="Vrinda"/>
-        <a:font script="Gujr" typeface="Shruti"/>
-        <a:font script="Khmr" typeface="DaunPenh"/>
-        <a:font script="Knda" typeface="Tunga"/>
-        <a:font script="Guru" typeface="Raavi"/>
-        <a:font script="Cans" typeface="Euphemia"/>
-        <a:font script="Cher" typeface="Plantagenet Cherokee"/>
-        <a:font script="Yiii" typeface="Microsoft Yi Baiti"/>
-        <a:font script="Tibt" typeface="Microsoft Himalaya"/>
-        <a:font script="Thaa" typeface="MV Boli"/>
-        <a:font script="Deva" typeface="Mangal"/>
-        <a:font script="Telu" typeface="Gautami"/>
-        <a:font script="Taml" typeface="Latha"/>
-        <a:font script="Syrc" typeface="Estrangelo Edessa"/>
-        <a:font script="Orya" typeface="Kalinga"/>
-        <a:font script="Mlym" typeface="Kartika"/>
-        <a:font script="Laoo" typeface="DokChampa"/>
-        <a:font script="Sinh" typeface="Iskoola Pota"/>
-        <a:font script="Mong" typeface="Mongolian Baiti"/>
-        <a:font script="Viet" typeface="Arial"/>
-        <a:font script="Uigh" typeface="Microsoft Uighur"/>
-        <a:font script="Geor" typeface="Sylfaen"/>
-      </a:minorFont>
-    </a:fontScheme>
-    <a:fmtScheme name="Office">
-      <a:fillStyleLst>
-        <a:solidFill>
-          <a:schemeClr val="phClr"/>
-        </a:solidFill>
-        <a:gradFill rotWithShape="1">
-          <a:gsLst>
-            <a:gs pos="0">
-              <a:schemeClr val="phClr">
-                <a:tint val="50000"/>
-                <a:satMod val="300000"/>
-              </a:schemeClr>
-            </a:gs>
-            <a:gs pos="35000">
-              <a:schemeClr val="phClr">
-                <a:tint val="37000"/>
-                <a:satMod val="300000"/>
-              </a:schemeClr>
-            </a:gs>
-            <a:gs pos="100000">
-              <a:schemeClr val="phClr">
-                <a:tint val="15000"/>
-                <a:satMod val="350000"/>
-              </a:schemeClr>
-            </a:gs>
-          </a:gsLst>
-          <a:lin ang="16200000" scaled="1"/>
-        </a:gradFill>
-        <a:gradFill rotWithShape="1">
-          <a:gsLst>
-            <a:gs pos="0">
-              <a:schemeClr val="phClr">
-                <a:tint val="100000"/>
-                <a:shade val="100000"/>
-                <a:satMod val="130000"/>
-              </a:schemeClr>
-            </a:gs>
-            <a:gs pos="100000">
-              <a:schemeClr val="phClr">
-                <a:tint val="50000"/>
-                <a:shade val="100000"/>
-                <a:satMod val="350000"/>
-              </a:schemeClr>
-            </a:gs>
-          </a:gsLst>
-          <a:lin ang="16200000" scaled="0"/>
-        </a:gradFill>
-      </a:fillStyleLst>
-      <a:lnStyleLst>
-        <a:ln w="9525" cap="flat" cmpd="sng" algn="ctr">
-          <a:solidFill>
-            <a:schemeClr val="phClr">
-              <a:shade val="95000"/>
-              <a:satMod val="105000"/>
-            </a:schemeClr>
-          </a:solidFill>
-          <a:prstDash val="solid"/>
-        </a:ln>
-        <a:ln w="25400" cap="flat" cmpd="sng" algn="ctr">
-          <a:solidFill>
-            <a:schemeClr val="phClr"/>
-          </a:solidFill>
-          <a:prstDash val="solid"/>
-        </a:ln>
-        <a:ln w="38100" cap="flat" cmpd="sng" algn="ctr">
-          <a:solidFill>
-            <a:schemeClr val="phClr"/>
-          </a:solidFill>
-          <a:prstDash val="solid"/>
-        </a:ln>
-      </a:lnStyleLst>
-      <a:effectStyleLst>
-        <a:effectStyle>
-          <a:effectLst>
-            <a:outerShdw blurRad="40000" dist="20000" dir="5400000" rotWithShape="0">
-              <a:srgbClr val="000000">
-                <a:alpha val="38000"/>
-              </a:srgbClr>
-            </a:outerShdw>
-          </a:effectLst>
-        </a:effectStyle>
-        <a:effectStyle>
-          <a:effectLst>
-            <a:outerShdw blurRad="40000" dist="23000" dir="5400000" rotWithShape="0">
-              <a:srgbClr val="000000">
-                <a:alpha val="35000"/>
-              </a:srgbClr>
-            </a:outerShdw>
-          </a:effectLst>
-        </a:effectStyle>
-        <a:effectStyle>
-          <a:effectLst>
-            <a:outerShdw blurRad="40000" dist="23000" dir="5400000" rotWithShape="0">
-              <a:srgbClr val="000000">
-                <a:alpha val="35000"/>
-              </a:srgbClr>
-            </a:outerShdw>
-          </a:effectLst>
-          <a:scene3d>
-            <a:camera prst="orthographicFront">
-              <a:rot lat="0" lon="0" rev="0"/>
-            </a:camera>
-            <a:lightRig rig="threePt" dir="t">
-              <a:rot lat="0" lon="0" rev="1200000"/>
-            </a:lightRig>
-          </a:scene3d>
-          <a:sp3d>
-            <a:bevelT w="63500" h="25400"/>
-          </a:sp3d>
-        </a:effectStyle>
-      </a:effectStyleLst>
-      <a:bgFillStyleLst>
-        <a:solidFill>
-          <a:schemeClr val="phClr"/>
-        </a:solidFill>
-        <a:gradFill rotWithShape="1">
-          <a:gsLst>
-            <a:gs pos="0">
-              <a:schemeClr val="phClr">
-                <a:tint val="40000"/>
-                <a:satMod val="350000"/>
-              </a:schemeClr>
-            </a:gs>
-            <a:gs pos="40000">
-              <a:schemeClr val="phClr">
-                <a:tint val="45000"/>
-                <a:shade val="99000"/>
-                <a:satMod val="350000"/>
-              </a:schemeClr>
-            </a:gs>
-            <a:gs pos="100000">
-              <a:schemeClr val="phClr">
-                <a:shade val="20000"/>
-                <a:satMod val="255000"/>
-              </a:schemeClr>
-            </a:gs>
-          </a:gsLst>
-          <a:path path="circle">
-            <a:fillToRect l="50000" t="-80000" r="50000" b="180000"/>
-          </a:path>
-        </a:gradFill>
-        <a:gradFill rotWithShape="1">
-          <a:gsLst>
-            <a:gs pos="0">
-              <a:schemeClr val="phClr">
-                <a:tint val="80000"/>
-                <a:satMod val="300000"/>
-              </a:schemeClr>
-            </a:gs>
-            <a:gs pos="100000">
-              <a:schemeClr val="phClr">
-                <a:shade val="30000"/>
-                <a:satMod val="200000"/>
-              </a:schemeClr>
-            </a:gs>
-          </a:gsLst>
-          <a:path path="circle">
-            <a:fillToRect l="50000" t="50000" r="50000" b="50000"/>
-          </a:path>
-        </a:gradFill>
-      </a:bgFillStyleLst>
-    </a:fmtScheme>
-  </a:themeElements>
-</a:theme>
 </file>
</xml_diff>

<commit_message>
Gandrīz pabeigta mācību materiāla izstrāde, pietrūkst iespējams 1 vai 2 attēli un 2 programmas koda piemeri
</commit_message>
<xml_diff>
--- a/Pecnosacījumu_MācībuMaterials.pptx
+++ b/Pecnosacījumu_MācībuMaterials.pptx
@@ -16,23 +16,26 @@
     <p:sldId id="261" r:id="rId11"/>
     <p:sldId id="262" r:id="rId12"/>
     <p:sldId id="263" r:id="rId13"/>
+    <p:sldId id="264" r:id="rId14"/>
+    <p:sldId id="265" r:id="rId15"/>
+    <p:sldId id="266" r:id="rId16"/>
   </p:sldIdLst>
   <p:sldSz cy="5143500" cx="9144000"/>
   <p:notesSz cx="6858000" cy="9144000"/>
   <p:embeddedFontLst>
     <p:embeddedFont>
       <p:font typeface="Epilogue"/>
-      <p:regular r:id="rId14"/>
-      <p:bold r:id="rId15"/>
-      <p:italic r:id="rId16"/>
-      <p:boldItalic r:id="rId17"/>
+      <p:regular r:id="rId17"/>
+      <p:bold r:id="rId18"/>
+      <p:italic r:id="rId19"/>
+      <p:boldItalic r:id="rId20"/>
     </p:embeddedFont>
     <p:embeddedFont>
       <p:font typeface="Spectral Medium"/>
-      <p:regular r:id="rId18"/>
-      <p:bold r:id="rId19"/>
-      <p:italic r:id="rId20"/>
-      <p:boldItalic r:id="rId21"/>
+      <p:regular r:id="rId21"/>
+      <p:bold r:id="rId22"/>
+      <p:italic r:id="rId23"/>
+      <p:boldItalic r:id="rId24"/>
     </p:embeddedFont>
   </p:embeddedFontLst>
   <p:defaultTextStyle>
@@ -808,6 +811,204 @@
 </p:notes>
 </file>
 
+<file path=ppt/notesSlides/notesSlide10.xml><?xml version="1.0" encoding="utf-8"?>
+<p:notes xmlns:a="http://schemas.openxmlformats.org/drawingml/2006/main" xmlns:r="http://schemas.openxmlformats.org/officeDocument/2006/relationships" xmlns:mc="http://schemas.openxmlformats.org/markup-compatibility/2006" xmlns:mv="urn:schemas-microsoft-com:mac:vml" xmlns:p="http://schemas.openxmlformats.org/presentationml/2006/main" xmlns:c="http://schemas.openxmlformats.org/drawingml/2006/chart" xmlns:dgm="http://schemas.openxmlformats.org/drawingml/2006/diagram" xmlns:o="urn:schemas-microsoft-com:office:office" xmlns:v="urn:schemas-microsoft-com:vml" xmlns:pvml="urn:schemas-microsoft-com:office:powerpoint" xmlns:com="http://schemas.openxmlformats.org/drawingml/2006/compatibility" xmlns:p14="http://schemas.microsoft.com/office/powerpoint/2010/main" xmlns:p15="http://schemas.microsoft.com/office/powerpoint/2012/main" xmlns:ahyp="http://schemas.microsoft.com/office/drawing/2018/hyperlinkcolor" showMasterPhAnim="0" showMasterSp="0">
+  <p:cSld>
+    <p:spTree>
+      <p:nvGrpSpPr>
+        <p:cNvPr id="225" name="Shape 225"/>
+        <p:cNvGrpSpPr/>
+        <p:nvPr/>
+      </p:nvGrpSpPr>
+      <p:grpSpPr>
+        <a:xfrm>
+          <a:off x="0" y="0"/>
+          <a:ext cx="0" cy="0"/>
+          <a:chOff x="0" y="0"/>
+          <a:chExt cx="0" cy="0"/>
+        </a:xfrm>
+      </p:grpSpPr>
+      <p:sp>
+        <p:nvSpPr>
+          <p:cNvPr id="226" name="Google Shape;226;g24e7310e459_0_61:notes"/>
+          <p:cNvSpPr/>
+          <p:nvPr>
+            <p:ph idx="2" type="sldImg"/>
+          </p:nvPr>
+        </p:nvSpPr>
+        <p:spPr>
+          <a:xfrm>
+            <a:off x="381300" y="685800"/>
+            <a:ext cx="6096000" cy="3429000"/>
+          </a:xfrm>
+          <a:custGeom>
+            <a:rect b="b" l="l" r="r" t="t"/>
+            <a:pathLst>
+              <a:path extrusionOk="0" h="120000" w="120000">
+                <a:moveTo>
+                  <a:pt x="0" y="0"/>
+                </a:moveTo>
+                <a:lnTo>
+                  <a:pt x="120000" y="0"/>
+                </a:lnTo>
+                <a:lnTo>
+                  <a:pt x="120000" y="120000"/>
+                </a:lnTo>
+                <a:lnTo>
+                  <a:pt x="0" y="120000"/>
+                </a:lnTo>
+                <a:close/>
+              </a:path>
+            </a:pathLst>
+          </a:custGeom>
+        </p:spPr>
+      </p:sp>
+      <p:sp>
+        <p:nvSpPr>
+          <p:cNvPr id="227" name="Google Shape;227;g24e7310e459_0_61:notes"/>
+          <p:cNvSpPr txBox="1"/>
+          <p:nvPr>
+            <p:ph idx="1" type="body"/>
+          </p:nvPr>
+        </p:nvSpPr>
+        <p:spPr>
+          <a:xfrm>
+            <a:off x="685800" y="4343400"/>
+            <a:ext cx="5486400" cy="4114800"/>
+          </a:xfrm>
+          <a:prstGeom prst="rect">
+            <a:avLst/>
+          </a:prstGeom>
+        </p:spPr>
+        <p:txBody>
+          <a:bodyPr anchorCtr="0" anchor="t" bIns="91425" lIns="91425" spcFirstLastPara="1" rIns="91425" wrap="square" tIns="91425">
+            <a:noAutofit/>
+          </a:bodyPr>
+          <a:lstStyle/>
+          <a:p>
+            <a:pPr indent="0" lvl="0" marL="0" rtl="0" algn="l">
+              <a:spcBef>
+                <a:spcPts val="0"/>
+              </a:spcBef>
+              <a:spcAft>
+                <a:spcPts val="0"/>
+              </a:spcAft>
+              <a:buNone/>
+            </a:pPr>
+            <a:r>
+              <a:t/>
+            </a:r>
+            <a:endParaRPr/>
+          </a:p>
+        </p:txBody>
+      </p:sp>
+    </p:spTree>
+  </p:cSld>
+  <p:clrMapOvr>
+    <a:masterClrMapping/>
+  </p:clrMapOvr>
+</p:notes>
+</file>
+
+<file path=ppt/notesSlides/notesSlide11.xml><?xml version="1.0" encoding="utf-8"?>
+<p:notes xmlns:a="http://schemas.openxmlformats.org/drawingml/2006/main" xmlns:r="http://schemas.openxmlformats.org/officeDocument/2006/relationships" xmlns:mc="http://schemas.openxmlformats.org/markup-compatibility/2006" xmlns:mv="urn:schemas-microsoft-com:mac:vml" xmlns:p="http://schemas.openxmlformats.org/presentationml/2006/main" xmlns:c="http://schemas.openxmlformats.org/drawingml/2006/chart" xmlns:dgm="http://schemas.openxmlformats.org/drawingml/2006/diagram" xmlns:o="urn:schemas-microsoft-com:office:office" xmlns:v="urn:schemas-microsoft-com:vml" xmlns:pvml="urn:schemas-microsoft-com:office:powerpoint" xmlns:com="http://schemas.openxmlformats.org/drawingml/2006/compatibility" xmlns:p14="http://schemas.microsoft.com/office/powerpoint/2010/main" xmlns:p15="http://schemas.microsoft.com/office/powerpoint/2012/main" xmlns:ahyp="http://schemas.microsoft.com/office/drawing/2018/hyperlinkcolor" showMasterPhAnim="0" showMasterSp="0">
+  <p:cSld>
+    <p:spTree>
+      <p:nvGrpSpPr>
+        <p:cNvPr id="230" name="Shape 230"/>
+        <p:cNvGrpSpPr/>
+        <p:nvPr/>
+      </p:nvGrpSpPr>
+      <p:grpSpPr>
+        <a:xfrm>
+          <a:off x="0" y="0"/>
+          <a:ext cx="0" cy="0"/>
+          <a:chOff x="0" y="0"/>
+          <a:chExt cx="0" cy="0"/>
+        </a:xfrm>
+      </p:grpSpPr>
+      <p:sp>
+        <p:nvSpPr>
+          <p:cNvPr id="231" name="Google Shape;231;g20a4e56f568_0_75:notes"/>
+          <p:cNvSpPr/>
+          <p:nvPr>
+            <p:ph idx="2" type="sldImg"/>
+          </p:nvPr>
+        </p:nvSpPr>
+        <p:spPr>
+          <a:xfrm>
+            <a:off x="381300" y="685800"/>
+            <a:ext cx="6096000" cy="3429000"/>
+          </a:xfrm>
+          <a:custGeom>
+            <a:rect b="b" l="l" r="r" t="t"/>
+            <a:pathLst>
+              <a:path extrusionOk="0" h="120000" w="120000">
+                <a:moveTo>
+                  <a:pt x="0" y="0"/>
+                </a:moveTo>
+                <a:lnTo>
+                  <a:pt x="120000" y="0"/>
+                </a:lnTo>
+                <a:lnTo>
+                  <a:pt x="120000" y="120000"/>
+                </a:lnTo>
+                <a:lnTo>
+                  <a:pt x="0" y="120000"/>
+                </a:lnTo>
+                <a:close/>
+              </a:path>
+            </a:pathLst>
+          </a:custGeom>
+        </p:spPr>
+      </p:sp>
+      <p:sp>
+        <p:nvSpPr>
+          <p:cNvPr id="232" name="Google Shape;232;g20a4e56f568_0_75:notes"/>
+          <p:cNvSpPr txBox="1"/>
+          <p:nvPr>
+            <p:ph idx="1" type="body"/>
+          </p:nvPr>
+        </p:nvSpPr>
+        <p:spPr>
+          <a:xfrm>
+            <a:off x="685800" y="4343400"/>
+            <a:ext cx="5486400" cy="4114800"/>
+          </a:xfrm>
+          <a:prstGeom prst="rect">
+            <a:avLst/>
+          </a:prstGeom>
+        </p:spPr>
+        <p:txBody>
+          <a:bodyPr anchorCtr="0" anchor="t" bIns="91425" lIns="91425" spcFirstLastPara="1" rIns="91425" wrap="square" tIns="91425">
+            <a:noAutofit/>
+          </a:bodyPr>
+          <a:lstStyle/>
+          <a:p>
+            <a:pPr indent="0" lvl="0" marL="0" rtl="0" algn="l">
+              <a:spcBef>
+                <a:spcPts val="0"/>
+              </a:spcBef>
+              <a:spcAft>
+                <a:spcPts val="0"/>
+              </a:spcAft>
+              <a:buNone/>
+            </a:pPr>
+            <a:r>
+              <a:t/>
+            </a:r>
+            <a:endParaRPr/>
+          </a:p>
+        </p:txBody>
+      </p:sp>
+    </p:spTree>
+  </p:cSld>
+  <p:clrMapOvr>
+    <a:masterClrMapping/>
+  </p:clrMapOvr>
+</p:notes>
+</file>
+
 <file path=ppt/notesSlides/notesSlide2.xml><?xml version="1.0" encoding="utf-8"?>
 <p:notes xmlns:a="http://schemas.openxmlformats.org/drawingml/2006/main" xmlns:r="http://schemas.openxmlformats.org/officeDocument/2006/relationships" xmlns:mc="http://schemas.openxmlformats.org/markup-compatibility/2006" xmlns:mv="urn:schemas-microsoft-com:mac:vml" xmlns:p="http://schemas.openxmlformats.org/presentationml/2006/main" xmlns:c="http://schemas.openxmlformats.org/drawingml/2006/chart" xmlns:dgm="http://schemas.openxmlformats.org/drawingml/2006/diagram" xmlns:o="urn:schemas-microsoft-com:office:office" xmlns:v="urn:schemas-microsoft-com:vml" xmlns:pvml="urn:schemas-microsoft-com:office:powerpoint" xmlns:com="http://schemas.openxmlformats.org/drawingml/2006/compatibility" xmlns:p14="http://schemas.microsoft.com/office/powerpoint/2010/main" xmlns:p15="http://schemas.microsoft.com/office/powerpoint/2012/main" xmlns:ahyp="http://schemas.microsoft.com/office/drawing/2018/hyperlinkcolor" showMasterPhAnim="0" showMasterSp="0">
   <p:cSld>
@@ -912,7 +1113,7 @@
   <p:cSld>
     <p:spTree>
       <p:nvGrpSpPr>
-        <p:cNvPr id="128" name="Shape 128"/>
+        <p:cNvPr id="129" name="Shape 129"/>
         <p:cNvGrpSpPr/>
         <p:nvPr/>
       </p:nvGrpSpPr>
@@ -926,7 +1127,7 @@
       </p:grpSpPr>
       <p:sp>
         <p:nvSpPr>
-          <p:cNvPr id="129" name="Google Shape;129;g20a4e56f568_0_12:notes"/>
+          <p:cNvPr id="130" name="Google Shape;130;g20a4e56f568_0_12:notes"/>
           <p:cNvSpPr/>
           <p:nvPr>
             <p:ph idx="2" type="sldImg"/>
@@ -961,7 +1162,7 @@
       </p:sp>
       <p:sp>
         <p:nvSpPr>
-          <p:cNvPr id="130" name="Google Shape;130;g20a4e56f568_0_12:notes"/>
+          <p:cNvPr id="131" name="Google Shape;131;g20a4e56f568_0_12:notes"/>
           <p:cNvSpPr txBox="1"/>
           <p:nvPr>
             <p:ph idx="1" type="body"/>
@@ -1011,7 +1212,7 @@
   <p:cSld>
     <p:spTree>
       <p:nvGrpSpPr>
-        <p:cNvPr id="149" name="Shape 149"/>
+        <p:cNvPr id="150" name="Shape 150"/>
         <p:cNvGrpSpPr/>
         <p:nvPr/>
       </p:nvGrpSpPr>
@@ -1025,7 +1226,7 @@
       </p:grpSpPr>
       <p:sp>
         <p:nvSpPr>
-          <p:cNvPr id="150" name="Google Shape;150;g20a4e56f568_0_36:notes"/>
+          <p:cNvPr id="151" name="Google Shape;151;g24e7310e459_0_7:notes"/>
           <p:cNvSpPr/>
           <p:nvPr>
             <p:ph idx="2" type="sldImg"/>
@@ -1060,7 +1261,7 @@
       </p:sp>
       <p:sp>
         <p:nvSpPr>
-          <p:cNvPr id="151" name="Google Shape;151;g20a4e56f568_0_36:notes"/>
+          <p:cNvPr id="152" name="Google Shape;152;g24e7310e459_0_7:notes"/>
           <p:cNvSpPr txBox="1"/>
           <p:nvPr>
             <p:ph idx="1" type="body"/>
@@ -1110,7 +1311,7 @@
   <p:cSld>
     <p:spTree>
       <p:nvGrpSpPr>
-        <p:cNvPr id="154" name="Shape 154"/>
+        <p:cNvPr id="159" name="Shape 159"/>
         <p:cNvGrpSpPr/>
         <p:nvPr/>
       </p:nvGrpSpPr>
@@ -1124,7 +1325,7 @@
       </p:grpSpPr>
       <p:sp>
         <p:nvSpPr>
-          <p:cNvPr id="155" name="Google Shape;155;g20a4e56f568_0_44:notes"/>
+          <p:cNvPr id="160" name="Google Shape;160;g20a4e56f568_0_44:notes"/>
           <p:cNvSpPr/>
           <p:nvPr>
             <p:ph idx="2" type="sldImg"/>
@@ -1159,7 +1360,7 @@
       </p:sp>
       <p:sp>
         <p:nvSpPr>
-          <p:cNvPr id="156" name="Google Shape;156;g20a4e56f568_0_44:notes"/>
+          <p:cNvPr id="161" name="Google Shape;161;g20a4e56f568_0_44:notes"/>
           <p:cNvSpPr txBox="1"/>
           <p:nvPr>
             <p:ph idx="1" type="body"/>
@@ -1209,7 +1410,7 @@
   <p:cSld>
     <p:spTree>
       <p:nvGrpSpPr>
-        <p:cNvPr id="165" name="Shape 165"/>
+        <p:cNvPr id="182" name="Shape 182"/>
         <p:cNvGrpSpPr/>
         <p:nvPr/>
       </p:nvGrpSpPr>
@@ -1223,7 +1424,7 @@
       </p:grpSpPr>
       <p:sp>
         <p:nvSpPr>
-          <p:cNvPr id="166" name="Google Shape;166;g20a4e56f568_0_56:notes"/>
+          <p:cNvPr id="183" name="Google Shape;183;g24e7310e459_0_34:notes"/>
           <p:cNvSpPr/>
           <p:nvPr>
             <p:ph idx="2" type="sldImg"/>
@@ -1258,7 +1459,7 @@
       </p:sp>
       <p:sp>
         <p:nvSpPr>
-          <p:cNvPr id="167" name="Google Shape;167;g20a4e56f568_0_56:notes"/>
+          <p:cNvPr id="184" name="Google Shape;184;g24e7310e459_0_34:notes"/>
           <p:cNvSpPr txBox="1"/>
           <p:nvPr>
             <p:ph idx="1" type="body"/>
@@ -1308,7 +1509,7 @@
   <p:cSld>
     <p:spTree>
       <p:nvGrpSpPr>
-        <p:cNvPr id="176" name="Shape 176"/>
+        <p:cNvPr id="191" name="Shape 191"/>
         <p:cNvGrpSpPr/>
         <p:nvPr/>
       </p:nvGrpSpPr>
@@ -1322,7 +1523,7 @@
       </p:grpSpPr>
       <p:sp>
         <p:nvSpPr>
-          <p:cNvPr id="177" name="Google Shape;177;g20a4e56f568_0_69:notes"/>
+          <p:cNvPr id="192" name="Google Shape;192;g20a4e56f568_0_56:notes"/>
           <p:cNvSpPr/>
           <p:nvPr>
             <p:ph idx="2" type="sldImg"/>
@@ -1357,7 +1558,7 @@
       </p:sp>
       <p:sp>
         <p:nvSpPr>
-          <p:cNvPr id="178" name="Google Shape;178;g20a4e56f568_0_69:notes"/>
+          <p:cNvPr id="193" name="Google Shape;193;g20a4e56f568_0_56:notes"/>
           <p:cNvSpPr txBox="1"/>
           <p:nvPr>
             <p:ph idx="1" type="body"/>
@@ -1407,7 +1608,7 @@
   <p:cSld>
     <p:spTree>
       <p:nvGrpSpPr>
-        <p:cNvPr id="180" name="Shape 180"/>
+        <p:cNvPr id="211" name="Shape 211"/>
         <p:cNvGrpSpPr/>
         <p:nvPr/>
       </p:nvGrpSpPr>
@@ -1421,7 +1622,7 @@
       </p:grpSpPr>
       <p:sp>
         <p:nvSpPr>
-          <p:cNvPr id="181" name="Google Shape;181;g20a4e56f568_0_75:notes"/>
+          <p:cNvPr id="212" name="Google Shape;212;g20a4e56f568_0_36:notes"/>
           <p:cNvSpPr/>
           <p:nvPr>
             <p:ph idx="2" type="sldImg"/>
@@ -1456,7 +1657,106 @@
       </p:sp>
       <p:sp>
         <p:nvSpPr>
-          <p:cNvPr id="182" name="Google Shape;182;g20a4e56f568_0_75:notes"/>
+          <p:cNvPr id="213" name="Google Shape;213;g20a4e56f568_0_36:notes"/>
+          <p:cNvSpPr txBox="1"/>
+          <p:nvPr>
+            <p:ph idx="1" type="body"/>
+          </p:nvPr>
+        </p:nvSpPr>
+        <p:spPr>
+          <a:xfrm>
+            <a:off x="685800" y="4343400"/>
+            <a:ext cx="5486400" cy="4114800"/>
+          </a:xfrm>
+          <a:prstGeom prst="rect">
+            <a:avLst/>
+          </a:prstGeom>
+        </p:spPr>
+        <p:txBody>
+          <a:bodyPr anchorCtr="0" anchor="t" bIns="91425" lIns="91425" spcFirstLastPara="1" rIns="91425" wrap="square" tIns="91425">
+            <a:noAutofit/>
+          </a:bodyPr>
+          <a:lstStyle/>
+          <a:p>
+            <a:pPr indent="0" lvl="0" marL="0" rtl="0" algn="l">
+              <a:spcBef>
+                <a:spcPts val="0"/>
+              </a:spcBef>
+              <a:spcAft>
+                <a:spcPts val="0"/>
+              </a:spcAft>
+              <a:buNone/>
+            </a:pPr>
+            <a:r>
+              <a:t/>
+            </a:r>
+            <a:endParaRPr/>
+          </a:p>
+        </p:txBody>
+      </p:sp>
+    </p:spTree>
+  </p:cSld>
+  <p:clrMapOvr>
+    <a:masterClrMapping/>
+  </p:clrMapOvr>
+</p:notes>
+</file>
+
+<file path=ppt/notesSlides/notesSlide9.xml><?xml version="1.0" encoding="utf-8"?>
+<p:notes xmlns:a="http://schemas.openxmlformats.org/drawingml/2006/main" xmlns:r="http://schemas.openxmlformats.org/officeDocument/2006/relationships" xmlns:mc="http://schemas.openxmlformats.org/markup-compatibility/2006" xmlns:mv="urn:schemas-microsoft-com:mac:vml" xmlns:p="http://schemas.openxmlformats.org/presentationml/2006/main" xmlns:c="http://schemas.openxmlformats.org/drawingml/2006/chart" xmlns:dgm="http://schemas.openxmlformats.org/drawingml/2006/diagram" xmlns:o="urn:schemas-microsoft-com:office:office" xmlns:v="urn:schemas-microsoft-com:vml" xmlns:pvml="urn:schemas-microsoft-com:office:powerpoint" xmlns:com="http://schemas.openxmlformats.org/drawingml/2006/compatibility" xmlns:p14="http://schemas.microsoft.com/office/powerpoint/2010/main" xmlns:p15="http://schemas.microsoft.com/office/powerpoint/2012/main" xmlns:ahyp="http://schemas.microsoft.com/office/drawing/2018/hyperlinkcolor" showMasterPhAnim="0" showMasterSp="0">
+  <p:cSld>
+    <p:spTree>
+      <p:nvGrpSpPr>
+        <p:cNvPr id="220" name="Shape 220"/>
+        <p:cNvGrpSpPr/>
+        <p:nvPr/>
+      </p:nvGrpSpPr>
+      <p:grpSpPr>
+        <a:xfrm>
+          <a:off x="0" y="0"/>
+          <a:ext cx="0" cy="0"/>
+          <a:chOff x="0" y="0"/>
+          <a:chExt cx="0" cy="0"/>
+        </a:xfrm>
+      </p:grpSpPr>
+      <p:sp>
+        <p:nvSpPr>
+          <p:cNvPr id="221" name="Google Shape;221;g20a4e56f568_0_69:notes"/>
+          <p:cNvSpPr/>
+          <p:nvPr>
+            <p:ph idx="2" type="sldImg"/>
+          </p:nvPr>
+        </p:nvSpPr>
+        <p:spPr>
+          <a:xfrm>
+            <a:off x="381300" y="685800"/>
+            <a:ext cx="6096000" cy="3429000"/>
+          </a:xfrm>
+          <a:custGeom>
+            <a:rect b="b" l="l" r="r" t="t"/>
+            <a:pathLst>
+              <a:path extrusionOk="0" h="120000" w="120000">
+                <a:moveTo>
+                  <a:pt x="0" y="0"/>
+                </a:moveTo>
+                <a:lnTo>
+                  <a:pt x="120000" y="0"/>
+                </a:lnTo>
+                <a:lnTo>
+                  <a:pt x="120000" y="120000"/>
+                </a:lnTo>
+                <a:lnTo>
+                  <a:pt x="0" y="120000"/>
+                </a:lnTo>
+                <a:close/>
+              </a:path>
+            </a:pathLst>
+          </a:custGeom>
+        </p:spPr>
+      </p:sp>
+      <p:sp>
+        <p:nvSpPr>
+          <p:cNvPr id="222" name="Google Shape;222;g20a4e56f568_0_69:notes"/>
           <p:cNvSpPr txBox="1"/>
           <p:nvPr>
             <p:ph idx="1" type="body"/>
@@ -10097,6 +10397,412 @@
 </p:sld>
 </file>
 
+<file path=ppt/slides/slide10.xml><?xml version="1.0" encoding="utf-8"?>
+<p:sld xmlns:a="http://schemas.openxmlformats.org/drawingml/2006/main" xmlns:r="http://schemas.openxmlformats.org/officeDocument/2006/relationships" xmlns:mc="http://schemas.openxmlformats.org/markup-compatibility/2006" xmlns:mv="urn:schemas-microsoft-com:mac:vml" xmlns:p="http://schemas.openxmlformats.org/presentationml/2006/main" xmlns:c="http://schemas.openxmlformats.org/drawingml/2006/chart" xmlns:dgm="http://schemas.openxmlformats.org/drawingml/2006/diagram" xmlns:o="urn:schemas-microsoft-com:office:office" xmlns:v="urn:schemas-microsoft-com:vml" xmlns:pvml="urn:schemas-microsoft-com:office:powerpoint" xmlns:com="http://schemas.openxmlformats.org/drawingml/2006/compatibility" xmlns:p14="http://schemas.microsoft.com/office/powerpoint/2010/main" xmlns:p15="http://schemas.microsoft.com/office/powerpoint/2012/main" xmlns:ahyp="http://schemas.microsoft.com/office/drawing/2018/hyperlinkcolor">
+  <p:cSld>
+    <p:spTree>
+      <p:nvGrpSpPr>
+        <p:cNvPr id="228" name="Shape 228"/>
+        <p:cNvGrpSpPr/>
+        <p:nvPr/>
+      </p:nvGrpSpPr>
+      <p:grpSpPr>
+        <a:xfrm>
+          <a:off x="0" y="0"/>
+          <a:ext cx="0" cy="0"/>
+          <a:chOff x="0" y="0"/>
+          <a:chExt cx="0" cy="0"/>
+        </a:xfrm>
+      </p:grpSpPr>
+      <p:sp>
+        <p:nvSpPr>
+          <p:cNvPr id="229" name="Google Shape;229;p30"/>
+          <p:cNvSpPr txBox="1"/>
+          <p:nvPr/>
+        </p:nvSpPr>
+        <p:spPr>
+          <a:xfrm>
+            <a:off x="1552500" y="0"/>
+            <a:ext cx="6039000" cy="1262100"/>
+          </a:xfrm>
+          <a:prstGeom prst="rect">
+            <a:avLst/>
+          </a:prstGeom>
+          <a:noFill/>
+          <a:ln>
+            <a:noFill/>
+          </a:ln>
+        </p:spPr>
+        <p:txBody>
+          <a:bodyPr anchorCtr="0" anchor="t" bIns="91425" lIns="91425" spcFirstLastPara="1" rIns="91425" wrap="square" tIns="91425">
+            <a:spAutoFit/>
+          </a:bodyPr>
+          <a:lstStyle/>
+          <a:p>
+            <a:pPr indent="0" lvl="0" marL="0" rtl="0" algn="ctr">
+              <a:spcBef>
+                <a:spcPts val="0"/>
+              </a:spcBef>
+              <a:spcAft>
+                <a:spcPts val="0"/>
+              </a:spcAft>
+              <a:buNone/>
+            </a:pPr>
+            <a:r>
+              <a:rPr lang="en-GB" sz="3500">
+                <a:solidFill>
+                  <a:schemeClr val="dk1"/>
+                </a:solidFill>
+              </a:rPr>
+              <a:t>Pecnosacījuma and (un) kritērija piemērs</a:t>
+            </a:r>
+            <a:endParaRPr sz="3500">
+              <a:solidFill>
+                <a:schemeClr val="dk1"/>
+              </a:solidFill>
+            </a:endParaRPr>
+          </a:p>
+        </p:txBody>
+      </p:sp>
+    </p:spTree>
+  </p:cSld>
+  <p:clrMapOvr>
+    <a:masterClrMapping/>
+  </p:clrMapOvr>
+</p:sld>
+</file>
+
+<file path=ppt/slides/slide11.xml><?xml version="1.0" encoding="utf-8"?>
+<p:sld xmlns:a="http://schemas.openxmlformats.org/drawingml/2006/main" xmlns:r="http://schemas.openxmlformats.org/officeDocument/2006/relationships" xmlns:mc="http://schemas.openxmlformats.org/markup-compatibility/2006" xmlns:mv="urn:schemas-microsoft-com:mac:vml" xmlns:p="http://schemas.openxmlformats.org/presentationml/2006/main" xmlns:c="http://schemas.openxmlformats.org/drawingml/2006/chart" xmlns:dgm="http://schemas.openxmlformats.org/drawingml/2006/diagram" xmlns:o="urn:schemas-microsoft-com:office:office" xmlns:v="urn:schemas-microsoft-com:vml" xmlns:pvml="urn:schemas-microsoft-com:office:powerpoint" xmlns:com="http://schemas.openxmlformats.org/drawingml/2006/compatibility" xmlns:p14="http://schemas.microsoft.com/office/powerpoint/2010/main" xmlns:p15="http://schemas.microsoft.com/office/powerpoint/2012/main" xmlns:ahyp="http://schemas.microsoft.com/office/drawing/2018/hyperlinkcolor">
+  <p:cSld>
+    <p:spTree>
+      <p:nvGrpSpPr>
+        <p:cNvPr id="233" name="Shape 233"/>
+        <p:cNvGrpSpPr/>
+        <p:nvPr/>
+      </p:nvGrpSpPr>
+      <p:grpSpPr>
+        <a:xfrm>
+          <a:off x="0" y="0"/>
+          <a:ext cx="0" cy="0"/>
+          <a:chOff x="0" y="0"/>
+          <a:chExt cx="0" cy="0"/>
+        </a:xfrm>
+      </p:grpSpPr>
+      <p:grpSp>
+        <p:nvGrpSpPr>
+          <p:cNvPr id="234" name="Google Shape;234;p31"/>
+          <p:cNvGrpSpPr/>
+          <p:nvPr/>
+        </p:nvGrpSpPr>
+        <p:grpSpPr>
+          <a:xfrm>
+            <a:off x="1998639" y="3555686"/>
+            <a:ext cx="4885074" cy="3749289"/>
+            <a:chOff x="1846239" y="3327086"/>
+            <a:chExt cx="4885074" cy="3749289"/>
+          </a:xfrm>
+        </p:grpSpPr>
+        <p:sp>
+          <p:nvSpPr>
+            <p:cNvPr id="235" name="Google Shape;235;p31"/>
+            <p:cNvSpPr/>
+            <p:nvPr/>
+          </p:nvSpPr>
+          <p:spPr>
+            <a:xfrm rot="3096072">
+              <a:off x="3146220" y="3291043"/>
+              <a:ext cx="1398738" cy="3993763"/>
+            </a:xfrm>
+            <a:prstGeom prst="ellipse">
+              <a:avLst/>
+            </a:prstGeom>
+            <a:noFill/>
+            <a:ln cap="flat" cmpd="sng" w="9525">
+              <a:solidFill>
+                <a:schemeClr val="dk1"/>
+              </a:solidFill>
+              <a:prstDash val="solid"/>
+              <a:round/>
+              <a:headEnd len="sm" w="sm" type="none"/>
+              <a:tailEnd len="sm" w="sm" type="none"/>
+            </a:ln>
+          </p:spPr>
+          <p:txBody>
+            <a:bodyPr anchorCtr="0" anchor="ctr" bIns="91425" lIns="91425" spcFirstLastPara="1" rIns="91425" wrap="square" tIns="91425">
+              <a:noAutofit/>
+            </a:bodyPr>
+            <a:lstStyle/>
+            <a:p>
+              <a:pPr indent="0" lvl="0" marL="0" rtl="0" algn="l">
+                <a:spcBef>
+                  <a:spcPts val="0"/>
+                </a:spcBef>
+                <a:spcAft>
+                  <a:spcPts val="0"/>
+                </a:spcAft>
+                <a:buNone/>
+              </a:pPr>
+              <a:r>
+                <a:t/>
+              </a:r>
+              <a:endParaRPr/>
+            </a:p>
+          </p:txBody>
+        </p:sp>
+        <p:sp>
+          <p:nvSpPr>
+            <p:cNvPr id="236" name="Google Shape;236;p31"/>
+            <p:cNvSpPr/>
+            <p:nvPr/>
+          </p:nvSpPr>
+          <p:spPr>
+            <a:xfrm rot="7071076">
+              <a:off x="3939808" y="2881518"/>
+              <a:ext cx="1398610" cy="3993735"/>
+            </a:xfrm>
+            <a:prstGeom prst="ellipse">
+              <a:avLst/>
+            </a:prstGeom>
+            <a:noFill/>
+            <a:ln cap="flat" cmpd="sng" w="9525">
+              <a:solidFill>
+                <a:schemeClr val="dk1"/>
+              </a:solidFill>
+              <a:prstDash val="solid"/>
+              <a:round/>
+              <a:headEnd len="sm" w="sm" type="none"/>
+              <a:tailEnd len="sm" w="sm" type="none"/>
+            </a:ln>
+          </p:spPr>
+          <p:txBody>
+            <a:bodyPr anchorCtr="0" anchor="ctr" bIns="91425" lIns="91425" spcFirstLastPara="1" rIns="91425" wrap="square" tIns="91425">
+              <a:noAutofit/>
+            </a:bodyPr>
+            <a:lstStyle/>
+            <a:p>
+              <a:pPr indent="0" lvl="0" marL="0" rtl="0" algn="l">
+                <a:spcBef>
+                  <a:spcPts val="0"/>
+                </a:spcBef>
+                <a:spcAft>
+                  <a:spcPts val="0"/>
+                </a:spcAft>
+                <a:buNone/>
+              </a:pPr>
+              <a:r>
+                <a:t/>
+              </a:r>
+              <a:endParaRPr/>
+            </a:p>
+          </p:txBody>
+        </p:sp>
+        <p:sp>
+          <p:nvSpPr>
+            <p:cNvPr id="237" name="Google Shape;237;p31"/>
+            <p:cNvSpPr/>
+            <p:nvPr/>
+          </p:nvSpPr>
+          <p:spPr>
+            <a:xfrm>
+              <a:off x="2483486" y="3603467"/>
+              <a:ext cx="790800" cy="790800"/>
+            </a:xfrm>
+            <a:prstGeom prst="ellipse">
+              <a:avLst/>
+            </a:prstGeom>
+            <a:noFill/>
+            <a:ln cap="flat" cmpd="sng" w="9525">
+              <a:solidFill>
+                <a:schemeClr val="dk1"/>
+              </a:solidFill>
+              <a:prstDash val="solid"/>
+              <a:round/>
+              <a:headEnd len="sm" w="sm" type="none"/>
+              <a:tailEnd len="sm" w="sm" type="none"/>
+            </a:ln>
+          </p:spPr>
+          <p:txBody>
+            <a:bodyPr anchorCtr="0" anchor="ctr" bIns="91425" lIns="91425" spcFirstLastPara="1" rIns="91425" wrap="square" tIns="91425">
+              <a:noAutofit/>
+            </a:bodyPr>
+            <a:lstStyle/>
+            <a:p>
+              <a:pPr indent="0" lvl="0" marL="0" rtl="0" algn="l">
+                <a:spcBef>
+                  <a:spcPts val="0"/>
+                </a:spcBef>
+                <a:spcAft>
+                  <a:spcPts val="0"/>
+                </a:spcAft>
+                <a:buNone/>
+              </a:pPr>
+              <a:r>
+                <a:t/>
+              </a:r>
+              <a:endParaRPr/>
+            </a:p>
+          </p:txBody>
+        </p:sp>
+      </p:grpSp>
+      <p:sp>
+        <p:nvSpPr>
+          <p:cNvPr id="238" name="Google Shape;238;p31"/>
+          <p:cNvSpPr txBox="1"/>
+          <p:nvPr/>
+        </p:nvSpPr>
+        <p:spPr>
+          <a:xfrm>
+            <a:off x="888300" y="2340625"/>
+            <a:ext cx="7512000" cy="1693200"/>
+          </a:xfrm>
+          <a:prstGeom prst="rect">
+            <a:avLst/>
+          </a:prstGeom>
+          <a:noFill/>
+          <a:ln>
+            <a:noFill/>
+          </a:ln>
+        </p:spPr>
+        <p:txBody>
+          <a:bodyPr anchorCtr="0" anchor="t" bIns="91425" lIns="91425" spcFirstLastPara="1" rIns="91425" wrap="square" tIns="91425">
+            <a:spAutoFit/>
+          </a:bodyPr>
+          <a:lstStyle/>
+          <a:p>
+            <a:pPr indent="0" lvl="0" marL="0" rtl="0" algn="l">
+              <a:spcBef>
+                <a:spcPts val="0"/>
+              </a:spcBef>
+              <a:spcAft>
+                <a:spcPts val="0"/>
+              </a:spcAft>
+              <a:buNone/>
+            </a:pPr>
+            <a:r>
+              <a:rPr lang="en-GB"/>
+              <a:t>Izmantotie informācijas avoti:</a:t>
+            </a:r>
+            <a:endParaRPr/>
+          </a:p>
+          <a:p>
+            <a:pPr indent="0" lvl="0" marL="0" rtl="0" algn="l">
+              <a:spcBef>
+                <a:spcPts val="0"/>
+              </a:spcBef>
+              <a:spcAft>
+                <a:spcPts val="0"/>
+              </a:spcAft>
+              <a:buNone/>
+            </a:pPr>
+            <a:r>
+              <a:t/>
+            </a:r>
+            <a:endParaRPr/>
+          </a:p>
+          <a:p>
+            <a:pPr indent="0" lvl="0" marL="0" rtl="0" algn="l">
+              <a:spcBef>
+                <a:spcPts val="0"/>
+              </a:spcBef>
+              <a:spcAft>
+                <a:spcPts val="0"/>
+              </a:spcAft>
+              <a:buNone/>
+            </a:pPr>
+            <a:r>
+              <a:rPr lang="en-GB" u="sng">
+                <a:solidFill>
+                  <a:schemeClr val="hlink"/>
+                </a:solidFill>
+                <a:hlinkClick r:id="rId3"/>
+              </a:rPr>
+              <a:t>https://stackoverflow.com/questions/25233132/the-difference-between-while-and-do-while-c</a:t>
+            </a:r>
+            <a:endParaRPr/>
+          </a:p>
+          <a:p>
+            <a:pPr indent="0" lvl="0" marL="0" rtl="0" algn="l">
+              <a:spcBef>
+                <a:spcPts val="0"/>
+              </a:spcBef>
+              <a:spcAft>
+                <a:spcPts val="0"/>
+              </a:spcAft>
+              <a:buNone/>
+            </a:pPr>
+            <a:r>
+              <a:rPr lang="en-GB" u="sng">
+                <a:solidFill>
+                  <a:schemeClr val="hlink"/>
+                </a:solidFill>
+                <a:hlinkClick r:id="rId4"/>
+              </a:rPr>
+              <a:t>https://www.javatpoint.com/cpp-do-while-loop</a:t>
+            </a:r>
+            <a:endParaRPr/>
+          </a:p>
+          <a:p>
+            <a:pPr indent="0" lvl="0" marL="0" rtl="0" algn="l">
+              <a:spcBef>
+                <a:spcPts val="0"/>
+              </a:spcBef>
+              <a:spcAft>
+                <a:spcPts val="0"/>
+              </a:spcAft>
+              <a:buNone/>
+            </a:pPr>
+            <a:r>
+              <a:rPr lang="en-GB" u="sng">
+                <a:solidFill>
+                  <a:schemeClr val="hlink"/>
+                </a:solidFill>
+                <a:hlinkClick r:id="rId5"/>
+              </a:rPr>
+              <a:t>https://www.guru99.com/cpp-do-while-loop.html</a:t>
+            </a:r>
+            <a:endParaRPr/>
+          </a:p>
+          <a:p>
+            <a:pPr indent="0" lvl="0" marL="0" rtl="0" algn="l">
+              <a:spcBef>
+                <a:spcPts val="0"/>
+              </a:spcBef>
+              <a:spcAft>
+                <a:spcPts val="0"/>
+              </a:spcAft>
+              <a:buNone/>
+            </a:pPr>
+            <a:r>
+              <a:t/>
+            </a:r>
+            <a:endParaRPr/>
+          </a:p>
+          <a:p>
+            <a:pPr indent="0" lvl="0" marL="0" rtl="0" algn="l">
+              <a:spcBef>
+                <a:spcPts val="0"/>
+              </a:spcBef>
+              <a:spcAft>
+                <a:spcPts val="0"/>
+              </a:spcAft>
+              <a:buNone/>
+            </a:pPr>
+            <a:r>
+              <a:t/>
+            </a:r>
+            <a:endParaRPr/>
+          </a:p>
+        </p:txBody>
+      </p:sp>
+    </p:spTree>
+  </p:cSld>
+  <p:clrMapOvr>
+    <a:masterClrMapping/>
+  </p:clrMapOvr>
+</p:sld>
+</file>
+
 <file path=ppt/slides/slide2.xml><?xml version="1.0" encoding="utf-8"?>
 <p:sld xmlns:a="http://schemas.openxmlformats.org/drawingml/2006/main" xmlns:r="http://schemas.openxmlformats.org/officeDocument/2006/relationships" xmlns:mc="http://schemas.openxmlformats.org/markup-compatibility/2006" xmlns:mv="urn:schemas-microsoft-com:mac:vml" xmlns:p="http://schemas.openxmlformats.org/presentationml/2006/main" xmlns:c="http://schemas.openxmlformats.org/drawingml/2006/chart" xmlns:dgm="http://schemas.openxmlformats.org/drawingml/2006/diagram" xmlns:o="urn:schemas-microsoft-com:office:office" xmlns:v="urn:schemas-microsoft-com:vml" xmlns:pvml="urn:schemas-microsoft-com:office:powerpoint" xmlns:com="http://schemas.openxmlformats.org/drawingml/2006/compatibility" xmlns:p14="http://schemas.microsoft.com/office/powerpoint/2010/main" xmlns:p15="http://schemas.microsoft.com/office/powerpoint/2012/main" xmlns:ahyp="http://schemas.microsoft.com/office/drawing/2018/hyperlinkcolor">
   <p:cSld>
@@ -10526,8 +11232,8 @@
         </p:nvSpPr>
         <p:spPr>
           <a:xfrm>
-            <a:off x="525588" y="2829400"/>
-            <a:ext cx="8092800" cy="1576500"/>
+            <a:off x="2531372" y="3058000"/>
+            <a:ext cx="6381000" cy="1576500"/>
           </a:xfrm>
           <a:prstGeom prst="rect">
             <a:avLst/>
@@ -10550,12 +11256,40 @@
             </a:pPr>
             <a:r>
               <a:rPr lang="en-GB"/>
-              <a:t>Pecnosacījuma ciklu izmanto, ja vēlas izpildīt tā darbības vismaz vienu vai vairākas reizes.</a:t>
+              <a:t>Pecnosacījuma ciklu izmanto, ja vēlas izpildīt tā darbības vismaz vienu vai vairākas reizes</a:t>
             </a:r>
             <a:endParaRPr/>
           </a:p>
         </p:txBody>
       </p:sp>
+      <p:pic>
+        <p:nvPicPr>
+          <p:cNvPr id="128" name="Google Shape;128;p22"/>
+          <p:cNvPicPr preferRelativeResize="0"/>
+          <p:nvPr/>
+        </p:nvPicPr>
+        <p:blipFill>
+          <a:blip r:embed="rId3">
+            <a:alphaModFix/>
+          </a:blip>
+          <a:stretch>
+            <a:fillRect/>
+          </a:stretch>
+        </p:blipFill>
+        <p:spPr>
+          <a:xfrm>
+            <a:off x="598150" y="2729500"/>
+            <a:ext cx="1868975" cy="2143825"/>
+          </a:xfrm>
+          <a:prstGeom prst="rect">
+            <a:avLst/>
+          </a:prstGeom>
+          <a:noFill/>
+          <a:ln>
+            <a:noFill/>
+          </a:ln>
+        </p:spPr>
+      </p:pic>
     </p:spTree>
   </p:cSld>
   <p:clrMapOvr>
@@ -10569,7 +11303,7 @@
   <p:cSld>
     <p:spTree>
       <p:nvGrpSpPr>
-        <p:cNvPr id="131" name="Shape 131"/>
+        <p:cNvPr id="132" name="Shape 132"/>
         <p:cNvGrpSpPr/>
         <p:nvPr/>
       </p:nvGrpSpPr>
@@ -10583,7 +11317,7 @@
       </p:grpSpPr>
       <p:sp>
         <p:nvSpPr>
-          <p:cNvPr id="132" name="Google Shape;132;p23"/>
+          <p:cNvPr id="133" name="Google Shape;133;p23"/>
           <p:cNvSpPr txBox="1"/>
           <p:nvPr>
             <p:ph type="title"/>
@@ -10623,7 +11357,7 @@
       </p:sp>
       <p:sp>
         <p:nvSpPr>
-          <p:cNvPr id="133" name="Google Shape;133;p23"/>
+          <p:cNvPr id="134" name="Google Shape;134;p23"/>
           <p:cNvSpPr txBox="1"/>
           <p:nvPr>
             <p:ph idx="1" type="subTitle"/>
@@ -10678,7 +11412,7 @@
       </p:sp>
       <p:grpSp>
         <p:nvGrpSpPr>
-          <p:cNvPr id="134" name="Google Shape;134;p23"/>
+          <p:cNvPr id="135" name="Google Shape;135;p23"/>
           <p:cNvGrpSpPr/>
           <p:nvPr/>
         </p:nvGrpSpPr>
@@ -10692,7 +11426,7 @@
         </p:grpSpPr>
         <p:sp>
           <p:nvSpPr>
-            <p:cNvPr id="135" name="Google Shape;135;p23"/>
+            <p:cNvPr id="136" name="Google Shape;136;p23"/>
             <p:cNvSpPr/>
             <p:nvPr/>
           </p:nvSpPr>
@@ -10739,7 +11473,7 @@
         </p:sp>
         <p:sp>
           <p:nvSpPr>
-            <p:cNvPr id="136" name="Google Shape;136;p23"/>
+            <p:cNvPr id="137" name="Google Shape;137;p23"/>
             <p:cNvSpPr/>
             <p:nvPr/>
           </p:nvSpPr>
@@ -10786,7 +11520,7 @@
         </p:sp>
         <p:sp>
           <p:nvSpPr>
-            <p:cNvPr id="137" name="Google Shape;137;p23"/>
+            <p:cNvPr id="138" name="Google Shape;138;p23"/>
             <p:cNvSpPr/>
             <p:nvPr/>
           </p:nvSpPr>
@@ -10834,7 +11568,7 @@
       </p:grpSp>
       <p:pic>
         <p:nvPicPr>
-          <p:cNvPr id="138" name="Google Shape;138;p23"/>
+          <p:cNvPr id="139" name="Google Shape;139;p23"/>
           <p:cNvPicPr preferRelativeResize="0"/>
           <p:nvPr/>
         </p:nvPicPr>
@@ -10862,7 +11596,7 @@
       </p:pic>
       <p:sp>
         <p:nvSpPr>
-          <p:cNvPr id="139" name="Google Shape;139;p23"/>
+          <p:cNvPr id="140" name="Google Shape;140;p23"/>
           <p:cNvSpPr txBox="1"/>
           <p:nvPr/>
         </p:nvSpPr>
@@ -10904,7 +11638,7 @@
       </p:sp>
       <p:sp>
         <p:nvSpPr>
-          <p:cNvPr id="140" name="Google Shape;140;p23"/>
+          <p:cNvPr id="141" name="Google Shape;141;p23"/>
           <p:cNvSpPr txBox="1"/>
           <p:nvPr/>
         </p:nvSpPr>
@@ -10946,7 +11680,7 @@
       </p:sp>
       <p:pic>
         <p:nvPicPr>
-          <p:cNvPr id="141" name="Google Shape;141;p23"/>
+          <p:cNvPr id="142" name="Google Shape;142;p23"/>
           <p:cNvPicPr preferRelativeResize="0"/>
           <p:nvPr/>
         </p:nvPicPr>
@@ -10974,7 +11708,7 @@
       </p:pic>
       <p:sp>
         <p:nvSpPr>
-          <p:cNvPr id="142" name="Google Shape;142;p23"/>
+          <p:cNvPr id="143" name="Google Shape;143;p23"/>
           <p:cNvSpPr txBox="1"/>
           <p:nvPr/>
         </p:nvSpPr>
@@ -11036,7 +11770,7 @@
       </p:sp>
       <p:cxnSp>
         <p:nvCxnSpPr>
-          <p:cNvPr id="143" name="Google Shape;143;p23"/>
+          <p:cNvPr id="144" name="Google Shape;144;p23"/>
           <p:cNvCxnSpPr/>
           <p:nvPr/>
         </p:nvCxnSpPr>
@@ -11062,7 +11796,7 @@
       </p:cxnSp>
       <p:sp>
         <p:nvSpPr>
-          <p:cNvPr id="144" name="Google Shape;144;p23"/>
+          <p:cNvPr id="145" name="Google Shape;145;p23"/>
           <p:cNvSpPr txBox="1"/>
           <p:nvPr/>
         </p:nvSpPr>
@@ -11104,16 +11838,16 @@
       </p:sp>
       <p:cxnSp>
         <p:nvCxnSpPr>
-          <p:cNvPr id="145" name="Google Shape;145;p23"/>
+          <p:cNvPr id="146" name="Google Shape;146;p23"/>
           <p:cNvCxnSpPr>
-            <a:endCxn id="146" idx="3"/>
+            <a:endCxn id="147" idx="3"/>
           </p:cNvCxnSpPr>
           <p:nvPr/>
         </p:nvCxnSpPr>
         <p:spPr>
           <a:xfrm flipH="1" rot="10800000">
-            <a:off x="7593824" y="2940011"/>
-            <a:ext cx="386100" cy="952800"/>
+            <a:off x="6228774" y="3549136"/>
+            <a:ext cx="1668600" cy="393900"/>
           </a:xfrm>
           <a:prstGeom prst="straightConnector1">
             <a:avLst/>
@@ -11132,13 +11866,13 @@
       </p:cxnSp>
       <p:sp>
         <p:nvSpPr>
-          <p:cNvPr id="146" name="Google Shape;146;p23"/>
+          <p:cNvPr id="147" name="Google Shape;147;p23"/>
           <p:cNvSpPr/>
           <p:nvPr/>
         </p:nvSpPr>
         <p:spPr>
           <a:xfrm>
-            <a:off x="7780200" y="2050950"/>
+            <a:off x="7697650" y="2660075"/>
             <a:ext cx="1363800" cy="1041600"/>
           </a:xfrm>
           <a:prstGeom prst="ellipse">
@@ -11182,7 +11916,7 @@
       </p:sp>
       <p:sp>
         <p:nvSpPr>
-          <p:cNvPr id="147" name="Google Shape;147;p23"/>
+          <p:cNvPr id="148" name="Google Shape;148;p23"/>
           <p:cNvSpPr/>
           <p:nvPr/>
         </p:nvSpPr>
@@ -11232,16 +11966,16 @@
       </p:sp>
       <p:cxnSp>
         <p:nvCxnSpPr>
-          <p:cNvPr id="148" name="Google Shape;148;p23"/>
+          <p:cNvPr id="149" name="Google Shape;149;p23"/>
           <p:cNvCxnSpPr>
-            <a:stCxn id="147" idx="3"/>
+            <a:stCxn id="148" idx="3"/>
           </p:cNvCxnSpPr>
           <p:nvPr/>
         </p:nvCxnSpPr>
         <p:spPr>
           <a:xfrm flipH="1">
-            <a:off x="3103828" y="2775617"/>
-            <a:ext cx="105600" cy="460800"/>
+            <a:off x="1739128" y="2775617"/>
+            <a:ext cx="1470300" cy="437100"/>
           </a:xfrm>
           <a:prstGeom prst="straightConnector1">
             <a:avLst/>
@@ -11271,7 +12005,7 @@
   <p:cSld>
     <p:spTree>
       <p:nvGrpSpPr>
-        <p:cNvPr id="152" name="Shape 152"/>
+        <p:cNvPr id="153" name="Shape 153"/>
         <p:cNvGrpSpPr/>
         <p:nvPr/>
       </p:nvGrpSpPr>
@@ -11285,7 +12019,7 @@
       </p:grpSpPr>
       <p:sp>
         <p:nvSpPr>
-          <p:cNvPr id="153" name="Google Shape;153;p24"/>
+          <p:cNvPr id="154" name="Google Shape;154;p24"/>
           <p:cNvSpPr/>
           <p:nvPr/>
         </p:nvSpPr>
@@ -11330,6 +12064,184 @@
           </a:p>
         </p:txBody>
       </p:sp>
+      <p:sp>
+        <p:nvSpPr>
+          <p:cNvPr id="155" name="Google Shape;155;p24"/>
+          <p:cNvSpPr txBox="1"/>
+          <p:nvPr>
+            <p:ph idx="4294967295" type="title"/>
+          </p:nvPr>
+        </p:nvSpPr>
+        <p:spPr>
+          <a:xfrm>
+            <a:off x="713700" y="133350"/>
+            <a:ext cx="7716600" cy="572700"/>
+          </a:xfrm>
+          <a:prstGeom prst="rect">
+            <a:avLst/>
+          </a:prstGeom>
+        </p:spPr>
+        <p:txBody>
+          <a:bodyPr anchorCtr="0" anchor="t" bIns="91425" lIns="91425" spcFirstLastPara="1" rIns="91425" wrap="square" tIns="91425">
+            <a:noAutofit/>
+          </a:bodyPr>
+          <a:lstStyle/>
+          <a:p>
+            <a:pPr indent="0" lvl="0" marL="0" rtl="0" algn="ctr">
+              <a:spcBef>
+                <a:spcPts val="0"/>
+              </a:spcBef>
+              <a:spcAft>
+                <a:spcPts val="0"/>
+              </a:spcAft>
+              <a:buNone/>
+            </a:pPr>
+            <a:r>
+              <a:rPr lang="en-GB" sz="4200"/>
+              <a:t>Pēcnosacījuma cikla kritēriju veidi</a:t>
+            </a:r>
+            <a:endParaRPr sz="4200"/>
+          </a:p>
+        </p:txBody>
+      </p:sp>
+      <p:sp>
+        <p:nvSpPr>
+          <p:cNvPr id="156" name="Google Shape;156;p24"/>
+          <p:cNvSpPr txBox="1"/>
+          <p:nvPr/>
+        </p:nvSpPr>
+        <p:spPr>
+          <a:xfrm>
+            <a:off x="852350" y="1756475"/>
+            <a:ext cx="6724800" cy="1015800"/>
+          </a:xfrm>
+          <a:prstGeom prst="rect">
+            <a:avLst/>
+          </a:prstGeom>
+          <a:noFill/>
+          <a:ln>
+            <a:noFill/>
+          </a:ln>
+        </p:spPr>
+        <p:txBody>
+          <a:bodyPr anchorCtr="0" anchor="t" bIns="91425" lIns="91425" spcFirstLastPara="1" rIns="91425" wrap="square" tIns="91425">
+            <a:spAutoFit/>
+          </a:bodyPr>
+          <a:lstStyle/>
+          <a:p>
+            <a:pPr indent="0" lvl="0" marL="0" rtl="0" algn="l">
+              <a:spcBef>
+                <a:spcPts val="0"/>
+              </a:spcBef>
+              <a:spcAft>
+                <a:spcPts val="0"/>
+              </a:spcAft>
+              <a:buNone/>
+            </a:pPr>
+            <a:r>
+              <a:rPr lang="en-GB" sz="1800">
+                <a:solidFill>
+                  <a:schemeClr val="dk2"/>
+                </a:solidFill>
+              </a:rPr>
+              <a:t>Izmantojot pēcnosacījuma ciklu var izmantot vairākas papildus funkcijas kas ļauj programmai veidot vairākus nosacījumus priekš cikla darbošanās un tā apturēšanas</a:t>
+            </a:r>
+            <a:endParaRPr/>
+          </a:p>
+        </p:txBody>
+      </p:sp>
+      <p:sp>
+        <p:nvSpPr>
+          <p:cNvPr id="157" name="Google Shape;157;p24"/>
+          <p:cNvSpPr txBox="1"/>
+          <p:nvPr/>
+        </p:nvSpPr>
+        <p:spPr>
+          <a:xfrm>
+            <a:off x="852350" y="2886775"/>
+            <a:ext cx="6724800" cy="646500"/>
+          </a:xfrm>
+          <a:prstGeom prst="rect">
+            <a:avLst/>
+          </a:prstGeom>
+          <a:noFill/>
+          <a:ln>
+            <a:noFill/>
+          </a:ln>
+        </p:spPr>
+        <p:txBody>
+          <a:bodyPr anchorCtr="0" anchor="t" bIns="91425" lIns="91425" spcFirstLastPara="1" rIns="91425" wrap="square" tIns="91425">
+            <a:spAutoFit/>
+          </a:bodyPr>
+          <a:lstStyle/>
+          <a:p>
+            <a:pPr indent="0" lvl="0" marL="0" rtl="0" algn="l">
+              <a:spcBef>
+                <a:spcPts val="0"/>
+              </a:spcBef>
+              <a:spcAft>
+                <a:spcPts val="0"/>
+              </a:spcAft>
+              <a:buNone/>
+            </a:pPr>
+            <a:r>
+              <a:rPr lang="en-GB" sz="1500">
+                <a:solidFill>
+                  <a:schemeClr val="dk2"/>
+                </a:solidFill>
+              </a:rPr>
+              <a:t>== - Equals (vienads) cikls strādās kamēr norādītās vērtības būs vienādas un tiklīdz vērtības vairs nebūs vienādas cikls pārtrauks savu darbību</a:t>
+            </a:r>
+            <a:endParaRPr sz="1100"/>
+          </a:p>
+        </p:txBody>
+      </p:sp>
+      <p:sp>
+        <p:nvSpPr>
+          <p:cNvPr id="158" name="Google Shape;158;p24"/>
+          <p:cNvSpPr txBox="1"/>
+          <p:nvPr/>
+        </p:nvSpPr>
+        <p:spPr>
+          <a:xfrm>
+            <a:off x="852350" y="3736675"/>
+            <a:ext cx="6724800" cy="646500"/>
+          </a:xfrm>
+          <a:prstGeom prst="rect">
+            <a:avLst/>
+          </a:prstGeom>
+          <a:noFill/>
+          <a:ln>
+            <a:noFill/>
+          </a:ln>
+        </p:spPr>
+        <p:txBody>
+          <a:bodyPr anchorCtr="0" anchor="t" bIns="91425" lIns="91425" spcFirstLastPara="1" rIns="91425" wrap="square" tIns="91425">
+            <a:spAutoFit/>
+          </a:bodyPr>
+          <a:lstStyle/>
+          <a:p>
+            <a:pPr indent="0" lvl="0" marL="0" rtl="0" algn="l">
+              <a:spcBef>
+                <a:spcPts val="0"/>
+              </a:spcBef>
+              <a:spcAft>
+                <a:spcPts val="0"/>
+              </a:spcAft>
+              <a:buNone/>
+            </a:pPr>
+            <a:r>
+              <a:rPr lang="en-GB" sz="1500">
+                <a:solidFill>
+                  <a:schemeClr val="dk2"/>
+                </a:solidFill>
+              </a:rPr>
+              <a:t>!= - Not equal (nav vienads) cikls turpinās darboties, ja izvelētās 2 vienības nav vienādas</a:t>
+            </a:r>
+            <a:endParaRPr sz="1100"/>
+          </a:p>
+        </p:txBody>
+      </p:sp>
     </p:spTree>
   </p:cSld>
   <p:clrMapOvr>
@@ -11343,7 +12255,7 @@
   <p:cSld>
     <p:spTree>
       <p:nvGrpSpPr>
-        <p:cNvPr id="157" name="Shape 157"/>
+        <p:cNvPr id="162" name="Shape 162"/>
         <p:cNvGrpSpPr/>
         <p:nvPr/>
       </p:nvGrpSpPr>
@@ -11357,13 +12269,13 @@
       </p:grpSpPr>
       <p:grpSp>
         <p:nvGrpSpPr>
-          <p:cNvPr id="158" name="Google Shape;158;p25"/>
+          <p:cNvPr id="163" name="Google Shape;163;p25"/>
           <p:cNvGrpSpPr/>
           <p:nvPr/>
         </p:nvGrpSpPr>
         <p:grpSpPr>
           <a:xfrm rot="969130">
-            <a:off x="1737359" y="3889651"/>
+            <a:off x="7769859" y="4315101"/>
             <a:ext cx="1249125" cy="790919"/>
             <a:chOff x="2358150" y="204975"/>
             <a:chExt cx="937650" cy="593700"/>
@@ -11371,7 +12283,7 @@
         </p:grpSpPr>
         <p:sp>
           <p:nvSpPr>
-            <p:cNvPr id="159" name="Google Shape;159;p25"/>
+            <p:cNvPr id="164" name="Google Shape;164;p25"/>
             <p:cNvSpPr/>
             <p:nvPr/>
           </p:nvSpPr>
@@ -11418,7 +12330,7 @@
         </p:sp>
         <p:sp>
           <p:nvSpPr>
-            <p:cNvPr id="160" name="Google Shape;160;p25"/>
+            <p:cNvPr id="165" name="Google Shape;165;p25"/>
             <p:cNvSpPr/>
             <p:nvPr/>
           </p:nvSpPr>
@@ -11466,13 +12378,13 @@
       </p:grpSp>
       <p:grpSp>
         <p:nvGrpSpPr>
-          <p:cNvPr id="161" name="Google Shape;161;p25"/>
+          <p:cNvPr id="166" name="Google Shape;166;p25"/>
           <p:cNvGrpSpPr/>
           <p:nvPr/>
         </p:nvGrpSpPr>
         <p:grpSpPr>
           <a:xfrm>
-            <a:off x="2556740" y="-2465213"/>
+            <a:off x="5611090" y="-1976263"/>
             <a:ext cx="5859308" cy="4270853"/>
             <a:chOff x="2556740" y="-2465213"/>
             <a:chExt cx="5859308" cy="4270853"/>
@@ -11480,7 +12392,7 @@
         </p:grpSpPr>
         <p:sp>
           <p:nvSpPr>
-            <p:cNvPr id="162" name="Google Shape;162;p25"/>
+            <p:cNvPr id="167" name="Google Shape;167;p25"/>
             <p:cNvSpPr/>
             <p:nvPr/>
           </p:nvSpPr>
@@ -11527,7 +12439,7 @@
         </p:sp>
         <p:sp>
           <p:nvSpPr>
-            <p:cNvPr id="163" name="Google Shape;163;p25"/>
+            <p:cNvPr id="168" name="Google Shape;168;p25"/>
             <p:cNvSpPr/>
             <p:nvPr/>
           </p:nvSpPr>
@@ -11574,7 +12486,7 @@
         </p:sp>
         <p:sp>
           <p:nvSpPr>
-            <p:cNvPr id="164" name="Google Shape;164;p25"/>
+            <p:cNvPr id="169" name="Google Shape;169;p25"/>
             <p:cNvSpPr/>
             <p:nvPr/>
           </p:nvSpPr>
@@ -11620,6 +12532,476 @@
           </p:txBody>
         </p:sp>
       </p:grpSp>
+      <p:sp>
+        <p:nvSpPr>
+          <p:cNvPr id="170" name="Google Shape;170;p25"/>
+          <p:cNvSpPr txBox="1"/>
+          <p:nvPr>
+            <p:ph type="title"/>
+          </p:nvPr>
+        </p:nvSpPr>
+        <p:spPr>
+          <a:xfrm>
+            <a:off x="745450" y="558800"/>
+            <a:ext cx="7716600" cy="572700"/>
+          </a:xfrm>
+          <a:prstGeom prst="rect">
+            <a:avLst/>
+          </a:prstGeom>
+        </p:spPr>
+        <p:txBody>
+          <a:bodyPr anchorCtr="0" anchor="b" bIns="91425" lIns="91425" spcFirstLastPara="1" rIns="91425" wrap="square" tIns="91425">
+            <a:noAutofit/>
+          </a:bodyPr>
+          <a:lstStyle/>
+          <a:p>
+            <a:pPr indent="0" lvl="0" marL="0" rtl="0" algn="ctr">
+              <a:spcBef>
+                <a:spcPts val="0"/>
+              </a:spcBef>
+              <a:spcAft>
+                <a:spcPts val="0"/>
+              </a:spcAft>
+              <a:buNone/>
+            </a:pPr>
+            <a:r>
+              <a:rPr lang="en-GB" sz="3500"/>
+              <a:t>Pecnosacījuma not equal (nav vienāds) kritērija piemērs</a:t>
+            </a:r>
+            <a:endParaRPr sz="3500"/>
+          </a:p>
+        </p:txBody>
+      </p:sp>
+      <p:pic>
+        <p:nvPicPr>
+          <p:cNvPr id="171" name="Google Shape;171;p25"/>
+          <p:cNvPicPr preferRelativeResize="0"/>
+          <p:nvPr/>
+        </p:nvPicPr>
+        <p:blipFill>
+          <a:blip r:embed="rId3">
+            <a:alphaModFix/>
+          </a:blip>
+          <a:stretch>
+            <a:fillRect/>
+          </a:stretch>
+        </p:blipFill>
+        <p:spPr>
+          <a:xfrm>
+            <a:off x="3067050" y="1452414"/>
+            <a:ext cx="3009900" cy="2447925"/>
+          </a:xfrm>
+          <a:prstGeom prst="rect">
+            <a:avLst/>
+          </a:prstGeom>
+          <a:noFill/>
+          <a:ln>
+            <a:noFill/>
+          </a:ln>
+        </p:spPr>
+      </p:pic>
+      <p:cxnSp>
+        <p:nvCxnSpPr>
+          <p:cNvPr id="172" name="Google Shape;172;p25"/>
+          <p:cNvCxnSpPr>
+            <a:endCxn id="173" idx="2"/>
+          </p:cNvCxnSpPr>
+          <p:nvPr/>
+        </p:nvCxnSpPr>
+        <p:spPr>
+          <a:xfrm>
+            <a:off x="4571875" y="1540725"/>
+            <a:ext cx="1864800" cy="13500"/>
+          </a:xfrm>
+          <a:prstGeom prst="straightConnector1">
+            <a:avLst/>
+          </a:prstGeom>
+          <a:noFill/>
+          <a:ln cap="flat" cmpd="sng" w="9525">
+            <a:solidFill>
+              <a:schemeClr val="dk2"/>
+            </a:solidFill>
+            <a:prstDash val="solid"/>
+            <a:round/>
+            <a:headEnd len="med" w="med" type="none"/>
+            <a:tailEnd len="med" w="med" type="none"/>
+          </a:ln>
+        </p:spPr>
+      </p:cxnSp>
+      <p:sp>
+        <p:nvSpPr>
+          <p:cNvPr id="173" name="Google Shape;173;p25"/>
+          <p:cNvSpPr/>
+          <p:nvPr/>
+        </p:nvSpPr>
+        <p:spPr>
+          <a:xfrm>
+            <a:off x="6436675" y="1197675"/>
+            <a:ext cx="1581300" cy="713100"/>
+          </a:xfrm>
+          <a:prstGeom prst="ellipse">
+            <a:avLst/>
+          </a:prstGeom>
+          <a:solidFill>
+            <a:schemeClr val="lt2"/>
+          </a:solidFill>
+          <a:ln cap="flat" cmpd="sng" w="9525">
+            <a:solidFill>
+              <a:schemeClr val="dk2"/>
+            </a:solidFill>
+            <a:prstDash val="solid"/>
+            <a:round/>
+            <a:headEnd len="sm" w="sm" type="none"/>
+            <a:tailEnd len="sm" w="sm" type="none"/>
+          </a:ln>
+        </p:spPr>
+        <p:txBody>
+          <a:bodyPr anchorCtr="0" anchor="ctr" bIns="91425" lIns="91425" spcFirstLastPara="1" rIns="91425" wrap="square" tIns="91425">
+            <a:noAutofit/>
+          </a:bodyPr>
+          <a:lstStyle/>
+          <a:p>
+            <a:pPr indent="0" lvl="0" marL="0" rtl="0" algn="l">
+              <a:spcBef>
+                <a:spcPts val="0"/>
+              </a:spcBef>
+              <a:spcAft>
+                <a:spcPts val="0"/>
+              </a:spcAft>
+              <a:buNone/>
+            </a:pPr>
+            <a:r>
+              <a:rPr lang="en-GB" sz="800"/>
+              <a:t>Sākotnējie mainīgie</a:t>
+            </a:r>
+            <a:endParaRPr sz="800"/>
+          </a:p>
+        </p:txBody>
+      </p:sp>
+      <p:cxnSp>
+        <p:nvCxnSpPr>
+          <p:cNvPr id="174" name="Google Shape;174;p25"/>
+          <p:cNvCxnSpPr>
+            <a:endCxn id="175" idx="2"/>
+          </p:cNvCxnSpPr>
+          <p:nvPr/>
+        </p:nvCxnSpPr>
+        <p:spPr>
+          <a:xfrm rot="10800000">
+            <a:off x="2729800" y="2640425"/>
+            <a:ext cx="952500" cy="17700"/>
+          </a:xfrm>
+          <a:prstGeom prst="straightConnector1">
+            <a:avLst/>
+          </a:prstGeom>
+          <a:noFill/>
+          <a:ln cap="flat" cmpd="sng" w="9525">
+            <a:solidFill>
+              <a:schemeClr val="dk2"/>
+            </a:solidFill>
+            <a:prstDash val="solid"/>
+            <a:round/>
+            <a:headEnd len="med" w="med" type="none"/>
+            <a:tailEnd len="med" w="med" type="none"/>
+          </a:ln>
+        </p:spPr>
+      </p:cxnSp>
+      <p:sp>
+        <p:nvSpPr>
+          <p:cNvPr id="175" name="Google Shape;175;p25"/>
+          <p:cNvSpPr/>
+          <p:nvPr/>
+        </p:nvSpPr>
+        <p:spPr>
+          <a:xfrm flipH="1">
+            <a:off x="1415500" y="2215925"/>
+            <a:ext cx="1314300" cy="849000"/>
+          </a:xfrm>
+          <a:prstGeom prst="ellipse">
+            <a:avLst/>
+          </a:prstGeom>
+          <a:solidFill>
+            <a:schemeClr val="lt2"/>
+          </a:solidFill>
+          <a:ln cap="flat" cmpd="sng" w="9525">
+            <a:solidFill>
+              <a:schemeClr val="dk2"/>
+            </a:solidFill>
+            <a:prstDash val="solid"/>
+            <a:round/>
+            <a:headEnd len="sm" w="sm" type="none"/>
+            <a:tailEnd len="sm" w="sm" type="none"/>
+          </a:ln>
+        </p:spPr>
+        <p:txBody>
+          <a:bodyPr anchorCtr="0" anchor="ctr" bIns="91425" lIns="91425" spcFirstLastPara="1" rIns="91425" wrap="square" tIns="91425">
+            <a:noAutofit/>
+          </a:bodyPr>
+          <a:lstStyle/>
+          <a:p>
+            <a:pPr indent="0" lvl="0" marL="0" rtl="0" algn="l">
+              <a:spcBef>
+                <a:spcPts val="0"/>
+              </a:spcBef>
+              <a:spcAft>
+                <a:spcPts val="0"/>
+              </a:spcAft>
+              <a:buNone/>
+            </a:pPr>
+            <a:r>
+              <a:rPr lang="en-GB" sz="800"/>
+              <a:t>Lietotājs ievada jebkādu skaitli</a:t>
+            </a:r>
+            <a:endParaRPr sz="800"/>
+          </a:p>
+        </p:txBody>
+      </p:sp>
+      <p:cxnSp>
+        <p:nvCxnSpPr>
+          <p:cNvPr id="176" name="Google Shape;176;p25"/>
+          <p:cNvCxnSpPr>
+            <a:endCxn id="177" idx="2"/>
+          </p:cNvCxnSpPr>
+          <p:nvPr/>
+        </p:nvCxnSpPr>
+        <p:spPr>
+          <a:xfrm>
+            <a:off x="5269800" y="3839225"/>
+            <a:ext cx="954900" cy="135600"/>
+          </a:xfrm>
+          <a:prstGeom prst="straightConnector1">
+            <a:avLst/>
+          </a:prstGeom>
+          <a:noFill/>
+          <a:ln cap="flat" cmpd="sng" w="9525">
+            <a:solidFill>
+              <a:schemeClr val="dk2"/>
+            </a:solidFill>
+            <a:prstDash val="solid"/>
+            <a:round/>
+            <a:headEnd len="med" w="med" type="none"/>
+            <a:tailEnd len="med" w="med" type="none"/>
+          </a:ln>
+        </p:spPr>
+      </p:cxnSp>
+      <p:sp>
+        <p:nvSpPr>
+          <p:cNvPr id="177" name="Google Shape;177;p25"/>
+          <p:cNvSpPr/>
+          <p:nvPr/>
+        </p:nvSpPr>
+        <p:spPr>
+          <a:xfrm>
+            <a:off x="6224700" y="3550325"/>
+            <a:ext cx="1410600" cy="849000"/>
+          </a:xfrm>
+          <a:prstGeom prst="ellipse">
+            <a:avLst/>
+          </a:prstGeom>
+          <a:solidFill>
+            <a:schemeClr val="lt2"/>
+          </a:solidFill>
+          <a:ln cap="flat" cmpd="sng" w="9525">
+            <a:solidFill>
+              <a:schemeClr val="dk2"/>
+            </a:solidFill>
+            <a:prstDash val="solid"/>
+            <a:round/>
+            <a:headEnd len="sm" w="sm" type="none"/>
+            <a:tailEnd len="sm" w="sm" type="none"/>
+          </a:ln>
+        </p:spPr>
+        <p:txBody>
+          <a:bodyPr anchorCtr="0" anchor="ctr" bIns="91425" lIns="91425" spcFirstLastPara="1" rIns="91425" wrap="square" tIns="91425">
+            <a:noAutofit/>
+          </a:bodyPr>
+          <a:lstStyle/>
+          <a:p>
+            <a:pPr indent="0" lvl="0" marL="0" rtl="0" algn="l">
+              <a:spcBef>
+                <a:spcPts val="0"/>
+              </a:spcBef>
+              <a:spcAft>
+                <a:spcPts val="0"/>
+              </a:spcAft>
+              <a:buNone/>
+            </a:pPr>
+            <a:r>
+              <a:rPr lang="en-GB" sz="800"/>
+              <a:t>Izvada kopējās summas skaitu kas tika iegūta no mainīgā “sum”</a:t>
+            </a:r>
+            <a:endParaRPr sz="800"/>
+          </a:p>
+        </p:txBody>
+      </p:sp>
+      <p:cxnSp>
+        <p:nvCxnSpPr>
+          <p:cNvPr id="178" name="Google Shape;178;p25"/>
+          <p:cNvCxnSpPr>
+            <a:endCxn id="179" idx="2"/>
+          </p:cNvCxnSpPr>
+          <p:nvPr/>
+        </p:nvCxnSpPr>
+        <p:spPr>
+          <a:xfrm flipH="1">
+            <a:off x="2035449" y="3610575"/>
+            <a:ext cx="1018200" cy="261600"/>
+          </a:xfrm>
+          <a:prstGeom prst="straightConnector1">
+            <a:avLst/>
+          </a:prstGeom>
+          <a:noFill/>
+          <a:ln cap="flat" cmpd="sng" w="9525">
+            <a:solidFill>
+              <a:schemeClr val="dk2"/>
+            </a:solidFill>
+            <a:prstDash val="solid"/>
+            <a:round/>
+            <a:headEnd len="med" w="med" type="none"/>
+            <a:tailEnd len="med" w="med" type="none"/>
+          </a:ln>
+        </p:spPr>
+      </p:cxnSp>
+      <p:sp>
+        <p:nvSpPr>
+          <p:cNvPr id="179" name="Google Shape;179;p25"/>
+          <p:cNvSpPr/>
+          <p:nvPr/>
+        </p:nvSpPr>
+        <p:spPr>
+          <a:xfrm flipH="1">
+            <a:off x="371649" y="3194925"/>
+            <a:ext cx="1663800" cy="1354500"/>
+          </a:xfrm>
+          <a:prstGeom prst="ellipse">
+            <a:avLst/>
+          </a:prstGeom>
+          <a:solidFill>
+            <a:schemeClr val="lt2"/>
+          </a:solidFill>
+          <a:ln cap="flat" cmpd="sng" w="9525">
+            <a:solidFill>
+              <a:schemeClr val="dk2"/>
+            </a:solidFill>
+            <a:prstDash val="solid"/>
+            <a:round/>
+            <a:headEnd len="sm" w="sm" type="none"/>
+            <a:tailEnd len="sm" w="sm" type="none"/>
+          </a:ln>
+        </p:spPr>
+        <p:txBody>
+          <a:bodyPr anchorCtr="0" anchor="ctr" bIns="91425" lIns="91425" spcFirstLastPara="1" rIns="91425" wrap="square" tIns="91425">
+            <a:noAutofit/>
+          </a:bodyPr>
+          <a:lstStyle/>
+          <a:p>
+            <a:pPr indent="0" lvl="0" marL="0" rtl="0" algn="l">
+              <a:spcBef>
+                <a:spcPts val="0"/>
+              </a:spcBef>
+              <a:spcAft>
+                <a:spcPts val="0"/>
+              </a:spcAft>
+              <a:buNone/>
+            </a:pPr>
+            <a:r>
+              <a:rPr b="1" lang="en-GB" sz="800"/>
+              <a:t>Pecnosacījumu cikls kas atkārtosies kamēr skaitlis kuru lietotajs ievadīs nebūs vienāds ar </a:t>
+            </a:r>
+            <a:r>
+              <a:rPr b="1" lang="en-GB" sz="800">
+                <a:highlight>
+                  <a:srgbClr val="00FF00"/>
+                </a:highlight>
+              </a:rPr>
+              <a:t>0</a:t>
+            </a:r>
+            <a:endParaRPr b="1" sz="800">
+              <a:highlight>
+                <a:srgbClr val="00FF00"/>
+              </a:highlight>
+            </a:endParaRPr>
+          </a:p>
+        </p:txBody>
+      </p:sp>
+      <p:cxnSp>
+        <p:nvCxnSpPr>
+          <p:cNvPr id="180" name="Google Shape;180;p25"/>
+          <p:cNvCxnSpPr>
+            <a:endCxn id="181" idx="2"/>
+          </p:cNvCxnSpPr>
+          <p:nvPr/>
+        </p:nvCxnSpPr>
+        <p:spPr>
+          <a:xfrm flipH="1" rot="10800000">
+            <a:off x="4736384" y="3125825"/>
+            <a:ext cx="2765400" cy="40200"/>
+          </a:xfrm>
+          <a:prstGeom prst="straightConnector1">
+            <a:avLst/>
+          </a:prstGeom>
+          <a:noFill/>
+          <a:ln cap="flat" cmpd="sng" w="9525">
+            <a:solidFill>
+              <a:schemeClr val="dk2"/>
+            </a:solidFill>
+            <a:prstDash val="solid"/>
+            <a:round/>
+            <a:headEnd len="med" w="med" type="none"/>
+            <a:tailEnd len="med" w="med" type="none"/>
+          </a:ln>
+        </p:spPr>
+      </p:cxnSp>
+      <p:sp>
+        <p:nvSpPr>
+          <p:cNvPr id="181" name="Google Shape;181;p25"/>
+          <p:cNvSpPr/>
+          <p:nvPr/>
+        </p:nvSpPr>
+        <p:spPr>
+          <a:xfrm>
+            <a:off x="7501784" y="2701325"/>
+            <a:ext cx="1444800" cy="849000"/>
+          </a:xfrm>
+          <a:prstGeom prst="ellipse">
+            <a:avLst/>
+          </a:prstGeom>
+          <a:solidFill>
+            <a:schemeClr val="lt2"/>
+          </a:solidFill>
+          <a:ln cap="flat" cmpd="sng" w="9525">
+            <a:solidFill>
+              <a:schemeClr val="dk2"/>
+            </a:solidFill>
+            <a:prstDash val="solid"/>
+            <a:round/>
+            <a:headEnd len="sm" w="sm" type="none"/>
+            <a:tailEnd len="sm" w="sm" type="none"/>
+          </a:ln>
+        </p:spPr>
+        <p:txBody>
+          <a:bodyPr anchorCtr="0" anchor="ctr" bIns="91425" lIns="91425" spcFirstLastPara="1" rIns="91425" wrap="square" tIns="91425">
+            <a:noAutofit/>
+          </a:bodyPr>
+          <a:lstStyle/>
+          <a:p>
+            <a:pPr indent="0" lvl="0" marL="0" rtl="0" algn="l">
+              <a:spcBef>
+                <a:spcPts val="0"/>
+              </a:spcBef>
+              <a:spcAft>
+                <a:spcPts val="0"/>
+              </a:spcAft>
+              <a:buNone/>
+            </a:pPr>
+            <a:r>
+              <a:rPr lang="en-GB" sz="800"/>
+              <a:t>Pie mainīgā sum pieskaita klāt mainīgo num kuru lietotājs bija ievadījis</a:t>
+            </a:r>
+            <a:endParaRPr sz="800"/>
+          </a:p>
+        </p:txBody>
+      </p:sp>
     </p:spTree>
   </p:cSld>
   <p:clrMapOvr>
@@ -11633,7 +13015,7 @@
   <p:cSld>
     <p:spTree>
       <p:nvGrpSpPr>
-        <p:cNvPr id="168" name="Shape 168"/>
+        <p:cNvPr id="185" name="Shape 185"/>
         <p:cNvGrpSpPr/>
         <p:nvPr/>
       </p:nvGrpSpPr>
@@ -11645,487 +13027,103 @@
           <a:chExt cx="0" cy="0"/>
         </a:xfrm>
       </p:grpSpPr>
-      <p:grpSp>
-        <p:nvGrpSpPr>
-          <p:cNvPr id="169" name="Google Shape;169;p26"/>
-          <p:cNvGrpSpPr/>
-          <p:nvPr/>
-        </p:nvGrpSpPr>
-        <p:grpSpPr>
-          <a:xfrm>
-            <a:off x="7138474" y="1214699"/>
-            <a:ext cx="3813300" cy="4438568"/>
-            <a:chOff x="7138474" y="1214699"/>
-            <a:chExt cx="3813300" cy="4438568"/>
-          </a:xfrm>
-        </p:grpSpPr>
-        <p:sp>
-          <p:nvSpPr>
-            <p:cNvPr id="170" name="Google Shape;170;p26"/>
-            <p:cNvSpPr/>
-            <p:nvPr/>
-          </p:nvSpPr>
-          <p:spPr>
-            <a:xfrm rot="-2700000">
-              <a:off x="8345724" y="1124338"/>
-              <a:ext cx="1398799" cy="3994022"/>
-            </a:xfrm>
-            <a:prstGeom prst="ellipse">
-              <a:avLst/>
-            </a:prstGeom>
-            <a:noFill/>
-            <a:ln cap="flat" cmpd="sng" w="9525">
-              <a:solidFill>
-                <a:schemeClr val="dk1"/>
-              </a:solidFill>
-              <a:prstDash val="solid"/>
-              <a:round/>
-              <a:headEnd len="sm" w="sm" type="none"/>
-              <a:tailEnd len="sm" w="sm" type="none"/>
-            </a:ln>
-          </p:spPr>
-          <p:txBody>
-            <a:bodyPr anchorCtr="0" anchor="ctr" bIns="91425" lIns="91425" spcFirstLastPara="1" rIns="91425" wrap="square" tIns="91425">
-              <a:noAutofit/>
-            </a:bodyPr>
-            <a:lstStyle/>
-            <a:p>
-              <a:pPr indent="0" lvl="0" marL="0" rtl="0" algn="l">
-                <a:spcBef>
-                  <a:spcPts val="0"/>
-                </a:spcBef>
-                <a:spcAft>
-                  <a:spcPts val="0"/>
-                </a:spcAft>
-                <a:buNone/>
-              </a:pPr>
-              <a:r>
-                <a:t/>
-              </a:r>
-              <a:endParaRPr/>
-            </a:p>
-          </p:txBody>
-        </p:sp>
-        <p:sp>
-          <p:nvSpPr>
-            <p:cNvPr id="171" name="Google Shape;171;p26"/>
-            <p:cNvSpPr/>
-            <p:nvPr/>
-          </p:nvSpPr>
-          <p:spPr>
-            <a:xfrm rot="799075">
-              <a:off x="7809735" y="1551919"/>
-              <a:ext cx="1398716" cy="3993998"/>
-            </a:xfrm>
-            <a:prstGeom prst="ellipse">
-              <a:avLst/>
-            </a:prstGeom>
-            <a:noFill/>
-            <a:ln cap="flat" cmpd="sng" w="9525">
-              <a:solidFill>
-                <a:schemeClr val="dk1"/>
-              </a:solidFill>
-              <a:prstDash val="solid"/>
-              <a:round/>
-              <a:headEnd len="sm" w="sm" type="none"/>
-              <a:tailEnd len="sm" w="sm" type="none"/>
-            </a:ln>
-          </p:spPr>
-          <p:txBody>
-            <a:bodyPr anchorCtr="0" anchor="ctr" bIns="91425" lIns="91425" spcFirstLastPara="1" rIns="91425" wrap="square" tIns="91425">
-              <a:noAutofit/>
-            </a:bodyPr>
-            <a:lstStyle/>
-            <a:p>
-              <a:pPr indent="0" lvl="0" marL="0" rtl="0" algn="l">
-                <a:spcBef>
-                  <a:spcPts val="0"/>
-                </a:spcBef>
-                <a:spcAft>
-                  <a:spcPts val="0"/>
-                </a:spcAft>
-                <a:buNone/>
-              </a:pPr>
-              <a:r>
-                <a:t/>
-              </a:r>
-              <a:endParaRPr/>
-            </a:p>
-          </p:txBody>
-        </p:sp>
-        <p:sp>
-          <p:nvSpPr>
-            <p:cNvPr id="172" name="Google Shape;172;p26"/>
-            <p:cNvSpPr/>
-            <p:nvPr/>
-          </p:nvSpPr>
-          <p:spPr>
-            <a:xfrm>
-              <a:off x="7502461" y="2463667"/>
-              <a:ext cx="790800" cy="790800"/>
-            </a:xfrm>
-            <a:prstGeom prst="ellipse">
-              <a:avLst/>
-            </a:prstGeom>
-            <a:noFill/>
-            <a:ln cap="flat" cmpd="sng" w="9525">
-              <a:solidFill>
-                <a:schemeClr val="dk1"/>
-              </a:solidFill>
-              <a:prstDash val="solid"/>
-              <a:round/>
-              <a:headEnd len="sm" w="sm" type="none"/>
-              <a:tailEnd len="sm" w="sm" type="none"/>
-            </a:ln>
-          </p:spPr>
-          <p:txBody>
-            <a:bodyPr anchorCtr="0" anchor="ctr" bIns="91425" lIns="91425" spcFirstLastPara="1" rIns="91425" wrap="square" tIns="91425">
-              <a:noAutofit/>
-            </a:bodyPr>
-            <a:lstStyle/>
-            <a:p>
-              <a:pPr indent="0" lvl="0" marL="0" rtl="0" algn="l">
-                <a:spcBef>
-                  <a:spcPts val="0"/>
-                </a:spcBef>
-                <a:spcAft>
-                  <a:spcPts val="0"/>
-                </a:spcAft>
-                <a:buNone/>
-              </a:pPr>
-              <a:r>
-                <a:t/>
-              </a:r>
-              <a:endParaRPr/>
-            </a:p>
-          </p:txBody>
-        </p:sp>
-      </p:grpSp>
-      <p:grpSp>
-        <p:nvGrpSpPr>
-          <p:cNvPr id="173" name="Google Shape;173;p26"/>
-          <p:cNvGrpSpPr/>
-          <p:nvPr/>
-        </p:nvGrpSpPr>
-        <p:grpSpPr>
-          <a:xfrm>
-            <a:off x="4800611" y="4099942"/>
-            <a:ext cx="1249137" cy="790927"/>
-            <a:chOff x="2358150" y="204975"/>
-            <a:chExt cx="937650" cy="593700"/>
-          </a:xfrm>
-        </p:grpSpPr>
-        <p:sp>
-          <p:nvSpPr>
-            <p:cNvPr id="174" name="Google Shape;174;p26"/>
-            <p:cNvSpPr/>
-            <p:nvPr/>
-          </p:nvSpPr>
-          <p:spPr>
-            <a:xfrm>
-              <a:off x="2358150" y="204975"/>
-              <a:ext cx="593700" cy="593700"/>
-            </a:xfrm>
-            <a:prstGeom prst="ellipse">
-              <a:avLst/>
-            </a:prstGeom>
-            <a:noFill/>
-            <a:ln cap="flat" cmpd="sng" w="9525">
-              <a:solidFill>
-                <a:schemeClr val="dk1"/>
-              </a:solidFill>
-              <a:prstDash val="solid"/>
-              <a:round/>
-              <a:headEnd len="sm" w="sm" type="none"/>
-              <a:tailEnd len="sm" w="sm" type="none"/>
-            </a:ln>
-          </p:spPr>
-          <p:txBody>
-            <a:bodyPr anchorCtr="0" anchor="ctr" bIns="91425" lIns="91425" spcFirstLastPara="1" rIns="91425" wrap="square" tIns="91425">
-              <a:noAutofit/>
-            </a:bodyPr>
-            <a:lstStyle/>
-            <a:p>
-              <a:pPr indent="0" lvl="0" marL="0" rtl="0" algn="l">
-                <a:spcBef>
-                  <a:spcPts val="0"/>
-                </a:spcBef>
-                <a:spcAft>
-                  <a:spcPts val="0"/>
-                </a:spcAft>
-                <a:buNone/>
-              </a:pPr>
-              <a:r>
-                <a:t/>
-              </a:r>
-              <a:endParaRPr/>
-            </a:p>
-          </p:txBody>
-        </p:sp>
-        <p:sp>
-          <p:nvSpPr>
-            <p:cNvPr id="175" name="Google Shape;175;p26"/>
-            <p:cNvSpPr/>
-            <p:nvPr/>
-          </p:nvSpPr>
-          <p:spPr>
-            <a:xfrm>
-              <a:off x="2702100" y="204975"/>
-              <a:ext cx="593700" cy="593700"/>
-            </a:xfrm>
-            <a:prstGeom prst="ellipse">
-              <a:avLst/>
-            </a:prstGeom>
-            <a:noFill/>
-            <a:ln cap="flat" cmpd="sng" w="9525">
-              <a:solidFill>
-                <a:schemeClr val="dk1"/>
-              </a:solidFill>
-              <a:prstDash val="solid"/>
-              <a:round/>
-              <a:headEnd len="sm" w="sm" type="none"/>
-              <a:tailEnd len="sm" w="sm" type="none"/>
-            </a:ln>
-          </p:spPr>
-          <p:txBody>
-            <a:bodyPr anchorCtr="0" anchor="ctr" bIns="91425" lIns="91425" spcFirstLastPara="1" rIns="91425" wrap="square" tIns="91425">
-              <a:noAutofit/>
-            </a:bodyPr>
-            <a:lstStyle/>
-            <a:p>
-              <a:pPr indent="0" lvl="0" marL="0" rtl="0" algn="l">
-                <a:spcBef>
-                  <a:spcPts val="0"/>
-                </a:spcBef>
-                <a:spcAft>
-                  <a:spcPts val="0"/>
-                </a:spcAft>
-                <a:buNone/>
-              </a:pPr>
-              <a:r>
-                <a:t/>
-              </a:r>
-              <a:endParaRPr/>
-            </a:p>
-          </p:txBody>
-        </p:sp>
-      </p:grpSp>
-    </p:spTree>
-  </p:cSld>
-  <p:clrMapOvr>
-    <a:masterClrMapping/>
-  </p:clrMapOvr>
-</p:sld>
-</file>
-
-<file path=ppt/slides/slide7.xml><?xml version="1.0" encoding="utf-8"?>
-<p:sld xmlns:a="http://schemas.openxmlformats.org/drawingml/2006/main" xmlns:r="http://schemas.openxmlformats.org/officeDocument/2006/relationships" xmlns:mc="http://schemas.openxmlformats.org/markup-compatibility/2006" xmlns:mv="urn:schemas-microsoft-com:mac:vml" xmlns:p="http://schemas.openxmlformats.org/presentationml/2006/main" xmlns:c="http://schemas.openxmlformats.org/drawingml/2006/chart" xmlns:dgm="http://schemas.openxmlformats.org/drawingml/2006/diagram" xmlns:o="urn:schemas-microsoft-com:office:office" xmlns:v="urn:schemas-microsoft-com:vml" xmlns:pvml="urn:schemas-microsoft-com:office:powerpoint" xmlns:com="http://schemas.openxmlformats.org/drawingml/2006/compatibility" xmlns:p14="http://schemas.microsoft.com/office/powerpoint/2010/main" xmlns:p15="http://schemas.microsoft.com/office/powerpoint/2012/main" xmlns:ahyp="http://schemas.microsoft.com/office/drawing/2018/hyperlinkcolor">
-  <p:cSld>
-    <p:spTree>
-      <p:nvGrpSpPr>
-        <p:cNvPr id="179" name="Shape 179"/>
-        <p:cNvGrpSpPr/>
-        <p:nvPr/>
-      </p:nvGrpSpPr>
-      <p:grpSpPr>
-        <a:xfrm>
-          <a:off x="0" y="0"/>
-          <a:ext cx="0" cy="0"/>
-          <a:chOff x="0" y="0"/>
-          <a:chExt cx="0" cy="0"/>
-        </a:xfrm>
-      </p:grpSpPr>
-    </p:spTree>
-  </p:cSld>
-  <p:clrMapOvr>
-    <a:masterClrMapping/>
-  </p:clrMapOvr>
-</p:sld>
-</file>
-
-<file path=ppt/slides/slide8.xml><?xml version="1.0" encoding="utf-8"?>
-<p:sld xmlns:a="http://schemas.openxmlformats.org/drawingml/2006/main" xmlns:r="http://schemas.openxmlformats.org/officeDocument/2006/relationships" xmlns:mc="http://schemas.openxmlformats.org/markup-compatibility/2006" xmlns:mv="urn:schemas-microsoft-com:mac:vml" xmlns:p="http://schemas.openxmlformats.org/presentationml/2006/main" xmlns:c="http://schemas.openxmlformats.org/drawingml/2006/chart" xmlns:dgm="http://schemas.openxmlformats.org/drawingml/2006/diagram" xmlns:o="urn:schemas-microsoft-com:office:office" xmlns:v="urn:schemas-microsoft-com:vml" xmlns:pvml="urn:schemas-microsoft-com:office:powerpoint" xmlns:com="http://schemas.openxmlformats.org/drawingml/2006/compatibility" xmlns:p14="http://schemas.microsoft.com/office/powerpoint/2010/main" xmlns:p15="http://schemas.microsoft.com/office/powerpoint/2012/main" xmlns:ahyp="http://schemas.microsoft.com/office/drawing/2018/hyperlinkcolor">
-  <p:cSld>
-    <p:spTree>
-      <p:nvGrpSpPr>
-        <p:cNvPr id="183" name="Shape 183"/>
-        <p:cNvGrpSpPr/>
-        <p:nvPr/>
-      </p:nvGrpSpPr>
-      <p:grpSpPr>
-        <a:xfrm>
-          <a:off x="0" y="0"/>
-          <a:ext cx="0" cy="0"/>
-          <a:chOff x="0" y="0"/>
-          <a:chExt cx="0" cy="0"/>
-        </a:xfrm>
-      </p:grpSpPr>
-      <p:grpSp>
-        <p:nvGrpSpPr>
-          <p:cNvPr id="184" name="Google Shape;184;p28"/>
-          <p:cNvGrpSpPr/>
-          <p:nvPr/>
-        </p:nvGrpSpPr>
-        <p:grpSpPr>
-          <a:xfrm>
-            <a:off x="1998639" y="3555686"/>
-            <a:ext cx="4885074" cy="3749289"/>
-            <a:chOff x="1846239" y="3327086"/>
-            <a:chExt cx="4885074" cy="3749289"/>
-          </a:xfrm>
-        </p:grpSpPr>
-        <p:sp>
-          <p:nvSpPr>
-            <p:cNvPr id="185" name="Google Shape;185;p28"/>
-            <p:cNvSpPr/>
-            <p:nvPr/>
-          </p:nvSpPr>
-          <p:spPr>
-            <a:xfrm rot="3096072">
-              <a:off x="3146220" y="3291043"/>
-              <a:ext cx="1398738" cy="3993763"/>
-            </a:xfrm>
-            <a:prstGeom prst="ellipse">
-              <a:avLst/>
-            </a:prstGeom>
-            <a:noFill/>
-            <a:ln cap="flat" cmpd="sng" w="9525">
-              <a:solidFill>
-                <a:schemeClr val="dk1"/>
-              </a:solidFill>
-              <a:prstDash val="solid"/>
-              <a:round/>
-              <a:headEnd len="sm" w="sm" type="none"/>
-              <a:tailEnd len="sm" w="sm" type="none"/>
-            </a:ln>
-          </p:spPr>
-          <p:txBody>
-            <a:bodyPr anchorCtr="0" anchor="ctr" bIns="91425" lIns="91425" spcFirstLastPara="1" rIns="91425" wrap="square" tIns="91425">
-              <a:noAutofit/>
-            </a:bodyPr>
-            <a:lstStyle/>
-            <a:p>
-              <a:pPr indent="0" lvl="0" marL="0" rtl="0" algn="l">
-                <a:spcBef>
-                  <a:spcPts val="0"/>
-                </a:spcBef>
-                <a:spcAft>
-                  <a:spcPts val="0"/>
-                </a:spcAft>
-                <a:buNone/>
-              </a:pPr>
-              <a:r>
-                <a:t/>
-              </a:r>
-              <a:endParaRPr/>
-            </a:p>
-          </p:txBody>
-        </p:sp>
-        <p:sp>
-          <p:nvSpPr>
-            <p:cNvPr id="186" name="Google Shape;186;p28"/>
-            <p:cNvSpPr/>
-            <p:nvPr/>
-          </p:nvSpPr>
-          <p:spPr>
-            <a:xfrm rot="7071076">
-              <a:off x="3939808" y="2881518"/>
-              <a:ext cx="1398610" cy="3993735"/>
-            </a:xfrm>
-            <a:prstGeom prst="ellipse">
-              <a:avLst/>
-            </a:prstGeom>
-            <a:noFill/>
-            <a:ln cap="flat" cmpd="sng" w="9525">
-              <a:solidFill>
-                <a:schemeClr val="dk1"/>
-              </a:solidFill>
-              <a:prstDash val="solid"/>
-              <a:round/>
-              <a:headEnd len="sm" w="sm" type="none"/>
-              <a:tailEnd len="sm" w="sm" type="none"/>
-            </a:ln>
-          </p:spPr>
-          <p:txBody>
-            <a:bodyPr anchorCtr="0" anchor="ctr" bIns="91425" lIns="91425" spcFirstLastPara="1" rIns="91425" wrap="square" tIns="91425">
-              <a:noAutofit/>
-            </a:bodyPr>
-            <a:lstStyle/>
-            <a:p>
-              <a:pPr indent="0" lvl="0" marL="0" rtl="0" algn="l">
-                <a:spcBef>
-                  <a:spcPts val="0"/>
-                </a:spcBef>
-                <a:spcAft>
-                  <a:spcPts val="0"/>
-                </a:spcAft>
-                <a:buNone/>
-              </a:pPr>
-              <a:r>
-                <a:t/>
-              </a:r>
-              <a:endParaRPr/>
-            </a:p>
-          </p:txBody>
-        </p:sp>
-        <p:sp>
-          <p:nvSpPr>
-            <p:cNvPr id="187" name="Google Shape;187;p28"/>
-            <p:cNvSpPr/>
-            <p:nvPr/>
-          </p:nvSpPr>
-          <p:spPr>
-            <a:xfrm>
-              <a:off x="2483486" y="3603467"/>
-              <a:ext cx="790800" cy="790800"/>
-            </a:xfrm>
-            <a:prstGeom prst="ellipse">
-              <a:avLst/>
-            </a:prstGeom>
-            <a:noFill/>
-            <a:ln cap="flat" cmpd="sng" w="9525">
-              <a:solidFill>
-                <a:schemeClr val="dk1"/>
-              </a:solidFill>
-              <a:prstDash val="solid"/>
-              <a:round/>
-              <a:headEnd len="sm" w="sm" type="none"/>
-              <a:tailEnd len="sm" w="sm" type="none"/>
-            </a:ln>
-          </p:spPr>
-          <p:txBody>
-            <a:bodyPr anchorCtr="0" anchor="ctr" bIns="91425" lIns="91425" spcFirstLastPara="1" rIns="91425" wrap="square" tIns="91425">
-              <a:noAutofit/>
-            </a:bodyPr>
-            <a:lstStyle/>
-            <a:p>
-              <a:pPr indent="0" lvl="0" marL="0" rtl="0" algn="l">
-                <a:spcBef>
-                  <a:spcPts val="0"/>
-                </a:spcBef>
-                <a:spcAft>
-                  <a:spcPts val="0"/>
-                </a:spcAft>
-                <a:buNone/>
-              </a:pPr>
-              <a:r>
-                <a:t/>
-              </a:r>
-              <a:endParaRPr/>
-            </a:p>
-          </p:txBody>
-        </p:sp>
-      </p:grpSp>
       <p:sp>
         <p:nvSpPr>
-          <p:cNvPr id="188" name="Google Shape;188;p28"/>
+          <p:cNvPr id="186" name="Google Shape;186;p26"/>
+          <p:cNvSpPr/>
+          <p:nvPr/>
+        </p:nvSpPr>
+        <p:spPr>
+          <a:xfrm rot="3181171">
+            <a:off x="-699502" y="-1265664"/>
+            <a:ext cx="1398903" cy="3994087"/>
+          </a:xfrm>
+          <a:prstGeom prst="ellipse">
+            <a:avLst/>
+          </a:prstGeom>
+          <a:noFill/>
+          <a:ln cap="flat" cmpd="sng" w="9525">
+            <a:solidFill>
+              <a:schemeClr val="dk1"/>
+            </a:solidFill>
+            <a:prstDash val="solid"/>
+            <a:round/>
+            <a:headEnd len="sm" w="sm" type="none"/>
+            <a:tailEnd len="sm" w="sm" type="none"/>
+          </a:ln>
+        </p:spPr>
+        <p:txBody>
+          <a:bodyPr anchorCtr="0" anchor="ctr" bIns="91425" lIns="91425" spcFirstLastPara="1" rIns="91425" wrap="square" tIns="91425">
+            <a:noAutofit/>
+          </a:bodyPr>
+          <a:lstStyle/>
+          <a:p>
+            <a:pPr indent="0" lvl="0" marL="0" rtl="0" algn="l">
+              <a:spcBef>
+                <a:spcPts val="0"/>
+              </a:spcBef>
+              <a:spcAft>
+                <a:spcPts val="0"/>
+              </a:spcAft>
+              <a:buNone/>
+            </a:pPr>
+            <a:r>
+              <a:t/>
+            </a:r>
+            <a:endParaRPr/>
+          </a:p>
+        </p:txBody>
+      </p:sp>
+      <p:sp>
+        <p:nvSpPr>
+          <p:cNvPr id="187" name="Google Shape;187;p26"/>
+          <p:cNvSpPr txBox="1"/>
+          <p:nvPr>
+            <p:ph idx="4294967295" type="title"/>
+          </p:nvPr>
+        </p:nvSpPr>
+        <p:spPr>
+          <a:xfrm>
+            <a:off x="713700" y="133350"/>
+            <a:ext cx="7716600" cy="572700"/>
+          </a:xfrm>
+          <a:prstGeom prst="rect">
+            <a:avLst/>
+          </a:prstGeom>
+        </p:spPr>
+        <p:txBody>
+          <a:bodyPr anchorCtr="0" anchor="t" bIns="91425" lIns="91425" spcFirstLastPara="1" rIns="91425" wrap="square" tIns="91425">
+            <a:noAutofit/>
+          </a:bodyPr>
+          <a:lstStyle/>
+          <a:p>
+            <a:pPr indent="0" lvl="0" marL="0" rtl="0" algn="ctr">
+              <a:spcBef>
+                <a:spcPts val="0"/>
+              </a:spcBef>
+              <a:spcAft>
+                <a:spcPts val="0"/>
+              </a:spcAft>
+              <a:buNone/>
+            </a:pPr>
+            <a:r>
+              <a:rPr lang="en-GB" sz="4200"/>
+              <a:t>Pēcnosacījuma cikla kritēriju veidi</a:t>
+            </a:r>
+            <a:endParaRPr sz="4200"/>
+          </a:p>
+        </p:txBody>
+      </p:sp>
+      <p:sp>
+        <p:nvSpPr>
+          <p:cNvPr id="188" name="Google Shape;188;p26"/>
           <p:cNvSpPr txBox="1"/>
           <p:nvPr/>
         </p:nvSpPr>
         <p:spPr>
           <a:xfrm>
-            <a:off x="888300" y="2340625"/>
-            <a:ext cx="7512000" cy="831300"/>
+            <a:off x="852350" y="1858075"/>
+            <a:ext cx="6724800" cy="400200"/>
           </a:xfrm>
           <a:prstGeom prst="rect">
             <a:avLst/>
@@ -12151,11 +13149,1152 @@
               <a:buNone/>
             </a:pPr>
             <a:r>
-              <a:rPr lang="en-GB"/>
-              <a:t>Izmantotie informācijas avoti:</a:t>
+              <a:t/>
             </a:r>
             <a:endParaRPr/>
           </a:p>
+        </p:txBody>
+      </p:sp>
+      <p:sp>
+        <p:nvSpPr>
+          <p:cNvPr id="189" name="Google Shape;189;p26"/>
+          <p:cNvSpPr txBox="1"/>
+          <p:nvPr/>
+        </p:nvSpPr>
+        <p:spPr>
+          <a:xfrm>
+            <a:off x="852350" y="2876550"/>
+            <a:ext cx="6724800" cy="1339200"/>
+          </a:xfrm>
+          <a:prstGeom prst="rect">
+            <a:avLst/>
+          </a:prstGeom>
+          <a:noFill/>
+          <a:ln>
+            <a:noFill/>
+          </a:ln>
+        </p:spPr>
+        <p:txBody>
+          <a:bodyPr anchorCtr="0" anchor="t" bIns="91425" lIns="91425" spcFirstLastPara="1" rIns="91425" wrap="square" tIns="91425">
+            <a:spAutoFit/>
+          </a:bodyPr>
+          <a:lstStyle/>
+          <a:p>
+            <a:pPr indent="0" lvl="0" marL="0" rtl="0" algn="l">
+              <a:spcBef>
+                <a:spcPts val="0"/>
+              </a:spcBef>
+              <a:spcAft>
+                <a:spcPts val="0"/>
+              </a:spcAft>
+              <a:buNone/>
+            </a:pPr>
+            <a:r>
+              <a:rPr lang="en-GB" sz="1500">
+                <a:solidFill>
+                  <a:schemeClr val="dk2"/>
+                </a:solidFill>
+              </a:rPr>
+              <a:t>&gt; ,&gt;= vai &lt;,&lt;= </a:t>
+            </a:r>
+            <a:r>
+              <a:rPr lang="en-GB" sz="1500">
+                <a:solidFill>
+                  <a:schemeClr val="dk2"/>
+                </a:solidFill>
+              </a:rPr>
+              <a:t>-  Lielāks vai mazāks funkcijām nav nozīmes kuru jūs izmantojat, galvenais ir, ka jūs mainīgos novietojiet pareizajās pusēs aiz bultām, kurās vēlaties lai viņi ir lielāki vai mazāki. Kā arī vara izmantot papildus vienādības zīmi ar viņām ja jus tā mazāks vai lielāks intervālu arī pieļaujat vienādas vērtības</a:t>
+            </a:r>
+            <a:endParaRPr sz="1500">
+              <a:solidFill>
+                <a:schemeClr val="dk2"/>
+              </a:solidFill>
+            </a:endParaRPr>
+          </a:p>
+        </p:txBody>
+      </p:sp>
+      <p:sp>
+        <p:nvSpPr>
+          <p:cNvPr id="190" name="Google Shape;190;p26"/>
+          <p:cNvSpPr txBox="1"/>
+          <p:nvPr/>
+        </p:nvSpPr>
+        <p:spPr>
+          <a:xfrm>
+            <a:off x="903150" y="1661225"/>
+            <a:ext cx="6724800" cy="1015800"/>
+          </a:xfrm>
+          <a:prstGeom prst="rect">
+            <a:avLst/>
+          </a:prstGeom>
+          <a:noFill/>
+          <a:ln>
+            <a:noFill/>
+          </a:ln>
+        </p:spPr>
+        <p:txBody>
+          <a:bodyPr anchorCtr="0" anchor="t" bIns="91425" lIns="91425" spcFirstLastPara="1" rIns="91425" wrap="square" tIns="91425">
+            <a:spAutoFit/>
+          </a:bodyPr>
+          <a:lstStyle/>
+          <a:p>
+            <a:pPr indent="0" lvl="0" marL="0" marR="0" rtl="0" algn="l">
+              <a:lnSpc>
+                <a:spcPct val="100000"/>
+              </a:lnSpc>
+              <a:spcBef>
+                <a:spcPts val="0"/>
+              </a:spcBef>
+              <a:spcAft>
+                <a:spcPts val="0"/>
+              </a:spcAft>
+              <a:buNone/>
+            </a:pPr>
+            <a:r>
+              <a:rPr lang="en-GB" sz="1800">
+                <a:solidFill>
+                  <a:schemeClr val="dk2"/>
+                </a:solidFill>
+              </a:rPr>
+              <a:t>Ja vēlaties lai cikls darbojas līdz kamēr padotais mainīgais ir lielāks vai mazāks par kritērija mainīgo tad ir iespējams to darīt izmantojot šīs funkcijas:</a:t>
+            </a:r>
+            <a:endParaRPr sz="1800">
+              <a:solidFill>
+                <a:schemeClr val="dk2"/>
+              </a:solidFill>
+            </a:endParaRPr>
+          </a:p>
+        </p:txBody>
+      </p:sp>
+    </p:spTree>
+  </p:cSld>
+  <p:clrMapOvr>
+    <a:masterClrMapping/>
+  </p:clrMapOvr>
+</p:sld>
+</file>
+
+<file path=ppt/slides/slide7.xml><?xml version="1.0" encoding="utf-8"?>
+<p:sld xmlns:a="http://schemas.openxmlformats.org/drawingml/2006/main" xmlns:r="http://schemas.openxmlformats.org/officeDocument/2006/relationships" xmlns:mc="http://schemas.openxmlformats.org/markup-compatibility/2006" xmlns:mv="urn:schemas-microsoft-com:mac:vml" xmlns:p="http://schemas.openxmlformats.org/presentationml/2006/main" xmlns:c="http://schemas.openxmlformats.org/drawingml/2006/chart" xmlns:dgm="http://schemas.openxmlformats.org/drawingml/2006/diagram" xmlns:o="urn:schemas-microsoft-com:office:office" xmlns:v="urn:schemas-microsoft-com:vml" xmlns:pvml="urn:schemas-microsoft-com:office:powerpoint" xmlns:com="http://schemas.openxmlformats.org/drawingml/2006/compatibility" xmlns:p14="http://schemas.microsoft.com/office/powerpoint/2010/main" xmlns:p15="http://schemas.microsoft.com/office/powerpoint/2012/main" xmlns:ahyp="http://schemas.microsoft.com/office/drawing/2018/hyperlinkcolor">
+  <p:cSld>
+    <p:spTree>
+      <p:nvGrpSpPr>
+        <p:cNvPr id="194" name="Shape 194"/>
+        <p:cNvGrpSpPr/>
+        <p:nvPr/>
+      </p:nvGrpSpPr>
+      <p:grpSpPr>
+        <a:xfrm>
+          <a:off x="0" y="0"/>
+          <a:ext cx="0" cy="0"/>
+          <a:chOff x="0" y="0"/>
+          <a:chExt cx="0" cy="0"/>
+        </a:xfrm>
+      </p:grpSpPr>
+      <p:pic>
+        <p:nvPicPr>
+          <p:cNvPr id="195" name="Google Shape;195;p27"/>
+          <p:cNvPicPr preferRelativeResize="0"/>
+          <p:nvPr/>
+        </p:nvPicPr>
+        <p:blipFill>
+          <a:blip r:embed="rId3">
+            <a:alphaModFix/>
+          </a:blip>
+          <a:stretch>
+            <a:fillRect/>
+          </a:stretch>
+        </p:blipFill>
+        <p:spPr>
+          <a:xfrm>
+            <a:off x="2486238" y="1572825"/>
+            <a:ext cx="3849950" cy="2534750"/>
+          </a:xfrm>
+          <a:prstGeom prst="rect">
+            <a:avLst/>
+          </a:prstGeom>
+          <a:noFill/>
+          <a:ln>
+            <a:noFill/>
+          </a:ln>
+        </p:spPr>
+      </p:pic>
+      <p:cxnSp>
+        <p:nvCxnSpPr>
+          <p:cNvPr id="196" name="Google Shape;196;p27"/>
+          <p:cNvCxnSpPr>
+            <a:stCxn id="195" idx="3"/>
+            <a:endCxn id="197" idx="2"/>
+          </p:cNvCxnSpPr>
+          <p:nvPr/>
+        </p:nvCxnSpPr>
+        <p:spPr>
+          <a:xfrm flipH="1" rot="10800000">
+            <a:off x="6336188" y="2169700"/>
+            <a:ext cx="1471200" cy="670500"/>
+          </a:xfrm>
+          <a:prstGeom prst="straightConnector1">
+            <a:avLst/>
+          </a:prstGeom>
+          <a:noFill/>
+          <a:ln cap="flat" cmpd="sng" w="9525">
+            <a:solidFill>
+              <a:schemeClr val="dk2"/>
+            </a:solidFill>
+            <a:prstDash val="solid"/>
+            <a:round/>
+            <a:headEnd len="med" w="med" type="none"/>
+            <a:tailEnd len="med" w="med" type="none"/>
+          </a:ln>
+        </p:spPr>
+      </p:cxnSp>
+      <p:sp>
+        <p:nvSpPr>
+          <p:cNvPr id="197" name="Google Shape;197;p27"/>
+          <p:cNvSpPr/>
+          <p:nvPr/>
+        </p:nvSpPr>
+        <p:spPr>
+          <a:xfrm flipH="1">
+            <a:off x="6395150" y="1656963"/>
+            <a:ext cx="1412100" cy="1025400"/>
+          </a:xfrm>
+          <a:prstGeom prst="ellipse">
+            <a:avLst/>
+          </a:prstGeom>
+          <a:solidFill>
+            <a:schemeClr val="lt2"/>
+          </a:solidFill>
+          <a:ln cap="flat" cmpd="sng" w="9525">
+            <a:solidFill>
+              <a:schemeClr val="dk2"/>
+            </a:solidFill>
+            <a:prstDash val="solid"/>
+            <a:round/>
+            <a:headEnd len="sm" w="sm" type="none"/>
+            <a:tailEnd len="sm" w="sm" type="none"/>
+          </a:ln>
+        </p:spPr>
+        <p:txBody>
+          <a:bodyPr anchorCtr="0" anchor="ctr" bIns="91425" lIns="91425" spcFirstLastPara="1" rIns="91425" wrap="square" tIns="91425">
+            <a:noAutofit/>
+          </a:bodyPr>
+          <a:lstStyle/>
+          <a:p>
+            <a:pPr indent="0" lvl="0" marL="0" rtl="0" algn="l">
+              <a:spcBef>
+                <a:spcPts val="0"/>
+              </a:spcBef>
+              <a:spcAft>
+                <a:spcPts val="0"/>
+              </a:spcAft>
+              <a:buNone/>
+            </a:pPr>
+            <a:r>
+              <a:rPr lang="en-GB" sz="800"/>
+              <a:t>Izvadīs pašreizējo mainīgo </a:t>
+            </a:r>
+            <a:r>
+              <a:rPr lang="en-GB" sz="800">
+                <a:highlight>
+                  <a:srgbClr val="00FFFF"/>
+                </a:highlight>
+              </a:rPr>
+              <a:t>a</a:t>
+            </a:r>
+            <a:endParaRPr sz="800">
+              <a:highlight>
+                <a:srgbClr val="00FFFF"/>
+              </a:highlight>
+            </a:endParaRPr>
+          </a:p>
+        </p:txBody>
+      </p:sp>
+      <p:cxnSp>
+        <p:nvCxnSpPr>
+          <p:cNvPr id="198" name="Google Shape;198;p27"/>
+          <p:cNvCxnSpPr>
+            <a:endCxn id="199" idx="6"/>
+          </p:cNvCxnSpPr>
+          <p:nvPr/>
+        </p:nvCxnSpPr>
+        <p:spPr>
+          <a:xfrm flipH="1">
+            <a:off x="1823650" y="3972475"/>
+            <a:ext cx="684000" cy="344100"/>
+          </a:xfrm>
+          <a:prstGeom prst="straightConnector1">
+            <a:avLst/>
+          </a:prstGeom>
+          <a:noFill/>
+          <a:ln cap="flat" cmpd="sng" w="9525">
+            <a:solidFill>
+              <a:schemeClr val="dk2"/>
+            </a:solidFill>
+            <a:prstDash val="solid"/>
+            <a:round/>
+            <a:headEnd len="med" w="med" type="none"/>
+            <a:tailEnd len="med" w="med" type="none"/>
+          </a:ln>
+        </p:spPr>
+      </p:cxnSp>
+      <p:sp>
+        <p:nvSpPr>
+          <p:cNvPr id="199" name="Google Shape;199;p27"/>
+          <p:cNvSpPr/>
+          <p:nvPr/>
+        </p:nvSpPr>
+        <p:spPr>
+          <a:xfrm>
+            <a:off x="254050" y="3803875"/>
+            <a:ext cx="1569600" cy="1025400"/>
+          </a:xfrm>
+          <a:prstGeom prst="ellipse">
+            <a:avLst/>
+          </a:prstGeom>
+          <a:solidFill>
+            <a:schemeClr val="lt2"/>
+          </a:solidFill>
+          <a:ln cap="flat" cmpd="sng" w="9525">
+            <a:solidFill>
+              <a:schemeClr val="dk2"/>
+            </a:solidFill>
+            <a:prstDash val="solid"/>
+            <a:round/>
+            <a:headEnd len="sm" w="sm" type="none"/>
+            <a:tailEnd len="sm" w="sm" type="none"/>
+          </a:ln>
+        </p:spPr>
+        <p:txBody>
+          <a:bodyPr anchorCtr="0" anchor="ctr" bIns="91425" lIns="91425" spcFirstLastPara="1" rIns="91425" wrap="square" tIns="91425">
+            <a:noAutofit/>
+          </a:bodyPr>
+          <a:lstStyle/>
+          <a:p>
+            <a:pPr indent="0" lvl="0" marL="0" rtl="0" algn="l">
+              <a:spcBef>
+                <a:spcPts val="0"/>
+              </a:spcBef>
+              <a:spcAft>
+                <a:spcPts val="0"/>
+              </a:spcAft>
+              <a:buNone/>
+            </a:pPr>
+            <a:r>
+              <a:rPr b="1" lang="en-GB" sz="800"/>
+              <a:t>Atkārtos darbību kamēr mainīgais </a:t>
+            </a:r>
+            <a:r>
+              <a:rPr b="1" lang="en-GB" sz="800">
+                <a:highlight>
+                  <a:srgbClr val="00FFFF"/>
+                </a:highlight>
+              </a:rPr>
+              <a:t>a</a:t>
+            </a:r>
+            <a:r>
+              <a:rPr b="1" lang="en-GB" sz="800"/>
+              <a:t> būs mazāks vai vienāds ar 3</a:t>
+            </a:r>
+            <a:endParaRPr b="1" sz="800"/>
+          </a:p>
+        </p:txBody>
+      </p:sp>
+      <p:cxnSp>
+        <p:nvCxnSpPr>
+          <p:cNvPr id="200" name="Google Shape;200;p27"/>
+          <p:cNvCxnSpPr>
+            <a:endCxn id="201" idx="2"/>
+          </p:cNvCxnSpPr>
+          <p:nvPr/>
+        </p:nvCxnSpPr>
+        <p:spPr>
+          <a:xfrm>
+            <a:off x="4038038" y="3686825"/>
+            <a:ext cx="3696900" cy="374400"/>
+          </a:xfrm>
+          <a:prstGeom prst="straightConnector1">
+            <a:avLst/>
+          </a:prstGeom>
+          <a:noFill/>
+          <a:ln cap="flat" cmpd="sng" w="9525">
+            <a:solidFill>
+              <a:schemeClr val="dk2"/>
+            </a:solidFill>
+            <a:prstDash val="solid"/>
+            <a:round/>
+            <a:headEnd len="med" w="med" type="none"/>
+            <a:tailEnd len="med" w="med" type="none"/>
+          </a:ln>
+        </p:spPr>
+      </p:cxnSp>
+      <p:sp>
+        <p:nvSpPr>
+          <p:cNvPr id="201" name="Google Shape;201;p27"/>
+          <p:cNvSpPr/>
+          <p:nvPr/>
+        </p:nvSpPr>
+        <p:spPr>
+          <a:xfrm flipH="1">
+            <a:off x="6395138" y="3686825"/>
+            <a:ext cx="1339800" cy="748800"/>
+          </a:xfrm>
+          <a:prstGeom prst="ellipse">
+            <a:avLst/>
+          </a:prstGeom>
+          <a:solidFill>
+            <a:schemeClr val="lt2"/>
+          </a:solidFill>
+          <a:ln cap="flat" cmpd="sng" w="9525">
+            <a:solidFill>
+              <a:schemeClr val="dk2"/>
+            </a:solidFill>
+            <a:prstDash val="solid"/>
+            <a:round/>
+            <a:headEnd len="sm" w="sm" type="none"/>
+            <a:tailEnd len="sm" w="sm" type="none"/>
+          </a:ln>
+        </p:spPr>
+        <p:txBody>
+          <a:bodyPr anchorCtr="0" anchor="ctr" bIns="91425" lIns="91425" spcFirstLastPara="1" rIns="91425" wrap="square" tIns="91425">
+            <a:noAutofit/>
+          </a:bodyPr>
+          <a:lstStyle/>
+          <a:p>
+            <a:pPr indent="0" lvl="0" marL="0" rtl="0" algn="l">
+              <a:spcBef>
+                <a:spcPts val="0"/>
+              </a:spcBef>
+              <a:spcAft>
+                <a:spcPts val="0"/>
+              </a:spcAft>
+              <a:buNone/>
+            </a:pPr>
+            <a:r>
+              <a:rPr lang="en-GB" sz="800"/>
+              <a:t>Pieskaitīs skaitli 1 pašreizējam mainīgajam </a:t>
+            </a:r>
+            <a:r>
+              <a:rPr lang="en-GB" sz="800">
+                <a:highlight>
+                  <a:srgbClr val="00FFFF"/>
+                </a:highlight>
+              </a:rPr>
+              <a:t>a</a:t>
+            </a:r>
+            <a:endParaRPr sz="800">
+              <a:highlight>
+                <a:srgbClr val="00FFFF"/>
+              </a:highlight>
+            </a:endParaRPr>
+          </a:p>
+        </p:txBody>
+      </p:sp>
+      <p:cxnSp>
+        <p:nvCxnSpPr>
+          <p:cNvPr id="202" name="Google Shape;202;p27"/>
+          <p:cNvCxnSpPr>
+            <a:endCxn id="203" idx="6"/>
+          </p:cNvCxnSpPr>
+          <p:nvPr/>
+        </p:nvCxnSpPr>
+        <p:spPr>
+          <a:xfrm rot="10800000">
+            <a:off x="1683950" y="1770225"/>
+            <a:ext cx="1649100" cy="411600"/>
+          </a:xfrm>
+          <a:prstGeom prst="straightConnector1">
+            <a:avLst/>
+          </a:prstGeom>
+          <a:noFill/>
+          <a:ln cap="flat" cmpd="sng" w="9525">
+            <a:solidFill>
+              <a:schemeClr val="dk2"/>
+            </a:solidFill>
+            <a:prstDash val="solid"/>
+            <a:round/>
+            <a:headEnd len="med" w="med" type="none"/>
+            <a:tailEnd len="med" w="med" type="none"/>
+          </a:ln>
+        </p:spPr>
+      </p:cxnSp>
+      <p:sp>
+        <p:nvSpPr>
+          <p:cNvPr id="203" name="Google Shape;203;p27"/>
+          <p:cNvSpPr/>
+          <p:nvPr/>
+        </p:nvSpPr>
+        <p:spPr>
+          <a:xfrm>
+            <a:off x="114350" y="1257525"/>
+            <a:ext cx="1569600" cy="1025400"/>
+          </a:xfrm>
+          <a:prstGeom prst="ellipse">
+            <a:avLst/>
+          </a:prstGeom>
+          <a:solidFill>
+            <a:schemeClr val="lt2"/>
+          </a:solidFill>
+          <a:ln cap="flat" cmpd="sng" w="9525">
+            <a:solidFill>
+              <a:schemeClr val="dk2"/>
+            </a:solidFill>
+            <a:prstDash val="solid"/>
+            <a:round/>
+            <a:headEnd len="sm" w="sm" type="none"/>
+            <a:tailEnd len="sm" w="sm" type="none"/>
+          </a:ln>
+        </p:spPr>
+        <p:txBody>
+          <a:bodyPr anchorCtr="0" anchor="ctr" bIns="91425" lIns="91425" spcFirstLastPara="1" rIns="91425" wrap="square" tIns="91425">
+            <a:noAutofit/>
+          </a:bodyPr>
+          <a:lstStyle/>
+          <a:p>
+            <a:pPr indent="0" lvl="0" marL="0" rtl="0" algn="l">
+              <a:spcBef>
+                <a:spcPts val="0"/>
+              </a:spcBef>
+              <a:spcAft>
+                <a:spcPts val="0"/>
+              </a:spcAft>
+              <a:buNone/>
+            </a:pPr>
+            <a:r>
+              <a:rPr lang="en-GB" sz="800"/>
+              <a:t>Katru reizi kad ārējais cikls atkārtosies mainīgais </a:t>
+            </a:r>
+            <a:r>
+              <a:rPr lang="en-GB" sz="800">
+                <a:highlight>
+                  <a:srgbClr val="00FF00"/>
+                </a:highlight>
+              </a:rPr>
+              <a:t>b</a:t>
+            </a:r>
+            <a:r>
+              <a:rPr lang="en-GB" sz="800"/>
+              <a:t> parvērtīsies atpakaļ pa skaitli 1</a:t>
+            </a:r>
+            <a:endParaRPr sz="800"/>
+          </a:p>
+        </p:txBody>
+      </p:sp>
+      <p:cxnSp>
+        <p:nvCxnSpPr>
+          <p:cNvPr id="204" name="Google Shape;204;p27"/>
+          <p:cNvCxnSpPr>
+            <a:endCxn id="205" idx="6"/>
+          </p:cNvCxnSpPr>
+          <p:nvPr/>
+        </p:nvCxnSpPr>
+        <p:spPr>
+          <a:xfrm rot="10800000">
+            <a:off x="1868100" y="3233900"/>
+            <a:ext cx="1541100" cy="148200"/>
+          </a:xfrm>
+          <a:prstGeom prst="straightConnector1">
+            <a:avLst/>
+          </a:prstGeom>
+          <a:noFill/>
+          <a:ln cap="flat" cmpd="sng" w="9525">
+            <a:solidFill>
+              <a:schemeClr val="dk2"/>
+            </a:solidFill>
+            <a:prstDash val="solid"/>
+            <a:round/>
+            <a:headEnd len="med" w="med" type="none"/>
+            <a:tailEnd len="med" w="med" type="none"/>
+          </a:ln>
+        </p:spPr>
+      </p:cxnSp>
+      <p:sp>
+        <p:nvSpPr>
+          <p:cNvPr id="205" name="Google Shape;205;p27"/>
+          <p:cNvSpPr/>
+          <p:nvPr/>
+        </p:nvSpPr>
+        <p:spPr>
+          <a:xfrm>
+            <a:off x="298500" y="2721200"/>
+            <a:ext cx="1569600" cy="1025400"/>
+          </a:xfrm>
+          <a:prstGeom prst="ellipse">
+            <a:avLst/>
+          </a:prstGeom>
+          <a:solidFill>
+            <a:schemeClr val="lt2"/>
+          </a:solidFill>
+          <a:ln cap="flat" cmpd="sng" w="9525">
+            <a:solidFill>
+              <a:schemeClr val="dk2"/>
+            </a:solidFill>
+            <a:prstDash val="solid"/>
+            <a:round/>
+            <a:headEnd len="sm" w="sm" type="none"/>
+            <a:tailEnd len="sm" w="sm" type="none"/>
+          </a:ln>
+        </p:spPr>
+        <p:txBody>
+          <a:bodyPr anchorCtr="0" anchor="ctr" bIns="91425" lIns="91425" spcFirstLastPara="1" rIns="91425" wrap="square" tIns="91425">
+            <a:noAutofit/>
+          </a:bodyPr>
+          <a:lstStyle/>
+          <a:p>
+            <a:pPr indent="0" lvl="0" marL="0" rtl="0" algn="l">
+              <a:spcBef>
+                <a:spcPts val="0"/>
+              </a:spcBef>
+              <a:spcAft>
+                <a:spcPts val="0"/>
+              </a:spcAft>
+              <a:buNone/>
+            </a:pPr>
+            <a:r>
+              <a:rPr b="1" lang="en-GB" sz="800"/>
+              <a:t>Atkārtos darbību kamēr mainīgais </a:t>
+            </a:r>
+            <a:r>
+              <a:rPr b="1" lang="en-GB" sz="800">
+                <a:highlight>
+                  <a:srgbClr val="00FF00"/>
+                </a:highlight>
+              </a:rPr>
+              <a:t>b</a:t>
+            </a:r>
+            <a:r>
+              <a:rPr b="1" lang="en-GB" sz="800">
+                <a:highlight>
+                  <a:schemeClr val="lt1"/>
+                </a:highlight>
+              </a:rPr>
+              <a:t> </a:t>
+            </a:r>
+            <a:r>
+              <a:rPr b="1" lang="en-GB" sz="800"/>
+              <a:t>būs mazāks vai vienāds ar 3</a:t>
+            </a:r>
+            <a:endParaRPr b="1" sz="800"/>
+          </a:p>
+        </p:txBody>
+      </p:sp>
+      <p:cxnSp>
+        <p:nvCxnSpPr>
+          <p:cNvPr id="206" name="Google Shape;206;p27"/>
+          <p:cNvCxnSpPr>
+            <a:endCxn id="207" idx="2"/>
+          </p:cNvCxnSpPr>
+          <p:nvPr/>
+        </p:nvCxnSpPr>
+        <p:spPr>
+          <a:xfrm>
+            <a:off x="4901438" y="3089800"/>
+            <a:ext cx="2833500" cy="94800"/>
+          </a:xfrm>
+          <a:prstGeom prst="straightConnector1">
+            <a:avLst/>
+          </a:prstGeom>
+          <a:noFill/>
+          <a:ln cap="flat" cmpd="sng" w="9525">
+            <a:solidFill>
+              <a:schemeClr val="dk2"/>
+            </a:solidFill>
+            <a:prstDash val="solid"/>
+            <a:round/>
+            <a:headEnd len="med" w="med" type="none"/>
+            <a:tailEnd len="med" w="med" type="none"/>
+          </a:ln>
+        </p:spPr>
+      </p:cxnSp>
+      <p:sp>
+        <p:nvSpPr>
+          <p:cNvPr id="207" name="Google Shape;207;p27"/>
+          <p:cNvSpPr/>
+          <p:nvPr/>
+        </p:nvSpPr>
+        <p:spPr>
+          <a:xfrm flipH="1">
+            <a:off x="6395138" y="2810200"/>
+            <a:ext cx="1339800" cy="748800"/>
+          </a:xfrm>
+          <a:prstGeom prst="ellipse">
+            <a:avLst/>
+          </a:prstGeom>
+          <a:solidFill>
+            <a:schemeClr val="lt2"/>
+          </a:solidFill>
+          <a:ln cap="flat" cmpd="sng" w="9525">
+            <a:solidFill>
+              <a:schemeClr val="dk2"/>
+            </a:solidFill>
+            <a:prstDash val="solid"/>
+            <a:round/>
+            <a:headEnd len="sm" w="sm" type="none"/>
+            <a:tailEnd len="sm" w="sm" type="none"/>
+          </a:ln>
+        </p:spPr>
+        <p:txBody>
+          <a:bodyPr anchorCtr="0" anchor="ctr" bIns="91425" lIns="91425" spcFirstLastPara="1" rIns="91425" wrap="square" tIns="91425">
+            <a:noAutofit/>
+          </a:bodyPr>
+          <a:lstStyle/>
+          <a:p>
+            <a:pPr indent="0" lvl="0" marL="0" rtl="0" algn="l">
+              <a:spcBef>
+                <a:spcPts val="0"/>
+              </a:spcBef>
+              <a:spcAft>
+                <a:spcPts val="0"/>
+              </a:spcAft>
+              <a:buNone/>
+            </a:pPr>
+            <a:r>
+              <a:rPr lang="en-GB" sz="800"/>
+              <a:t>Pieskaitīs skaitli 1 pašreizējam mainīgajam </a:t>
+            </a:r>
+            <a:r>
+              <a:rPr lang="en-GB" sz="800">
+                <a:highlight>
+                  <a:srgbClr val="00FF00"/>
+                </a:highlight>
+              </a:rPr>
+              <a:t>b</a:t>
+            </a:r>
+            <a:endParaRPr sz="800">
+              <a:highlight>
+                <a:srgbClr val="00FF00"/>
+              </a:highlight>
+            </a:endParaRPr>
+          </a:p>
+        </p:txBody>
+      </p:sp>
+      <p:sp>
+        <p:nvSpPr>
+          <p:cNvPr id="208" name="Google Shape;208;p27"/>
+          <p:cNvSpPr txBox="1"/>
+          <p:nvPr/>
+        </p:nvSpPr>
+        <p:spPr>
+          <a:xfrm>
+            <a:off x="1533450" y="-12675"/>
+            <a:ext cx="6077100" cy="1262100"/>
+          </a:xfrm>
+          <a:prstGeom prst="rect">
+            <a:avLst/>
+          </a:prstGeom>
+          <a:noFill/>
+          <a:ln>
+            <a:noFill/>
+          </a:ln>
+        </p:spPr>
+        <p:txBody>
+          <a:bodyPr anchorCtr="0" anchor="t" bIns="91425" lIns="91425" spcFirstLastPara="1" rIns="91425" wrap="square" tIns="91425">
+            <a:spAutoFit/>
+          </a:bodyPr>
+          <a:lstStyle/>
+          <a:p>
+            <a:pPr indent="0" lvl="0" marL="0" rtl="0" algn="ctr">
+              <a:spcBef>
+                <a:spcPts val="0"/>
+              </a:spcBef>
+              <a:spcAft>
+                <a:spcPts val="0"/>
+              </a:spcAft>
+              <a:buNone/>
+            </a:pPr>
+            <a:r>
+              <a:rPr lang="en-GB" sz="3500">
+                <a:solidFill>
+                  <a:schemeClr val="dk1"/>
+                </a:solidFill>
+              </a:rPr>
+              <a:t>Pecnosacījuma mazāks vai vienāds kritērija piemērs</a:t>
+            </a:r>
+            <a:endParaRPr sz="3500">
+              <a:solidFill>
+                <a:schemeClr val="dk1"/>
+              </a:solidFill>
+            </a:endParaRPr>
+          </a:p>
+        </p:txBody>
+      </p:sp>
+      <p:sp>
+        <p:nvSpPr>
+          <p:cNvPr id="209" name="Google Shape;209;p27"/>
+          <p:cNvSpPr txBox="1"/>
+          <p:nvPr/>
+        </p:nvSpPr>
+        <p:spPr>
+          <a:xfrm>
+            <a:off x="8056700" y="1572825"/>
+            <a:ext cx="6724800" cy="2955300"/>
+          </a:xfrm>
+          <a:prstGeom prst="rect">
+            <a:avLst/>
+          </a:prstGeom>
+          <a:noFill/>
+          <a:ln>
+            <a:noFill/>
+          </a:ln>
+        </p:spPr>
+        <p:txBody>
+          <a:bodyPr anchorCtr="0" anchor="t" bIns="91425" lIns="91425" spcFirstLastPara="1" rIns="91425" wrap="square" tIns="91425">
+            <a:spAutoFit/>
+          </a:bodyPr>
+          <a:lstStyle/>
+          <a:p>
+            <a:pPr indent="0" lvl="0" marL="0" marR="0" rtl="0" algn="l">
+              <a:lnSpc>
+                <a:spcPct val="100000"/>
+              </a:lnSpc>
+              <a:spcBef>
+                <a:spcPts val="0"/>
+              </a:spcBef>
+              <a:spcAft>
+                <a:spcPts val="0"/>
+              </a:spcAft>
+              <a:buNone/>
+            </a:pPr>
+            <a:r>
+              <a:rPr lang="en-GB" sz="1800">
+                <a:solidFill>
+                  <a:schemeClr val="dk2"/>
+                </a:solidFill>
+              </a:rPr>
+              <a:t>Izvade:</a:t>
+            </a:r>
+            <a:endParaRPr sz="1800">
+              <a:solidFill>
+                <a:schemeClr val="dk2"/>
+              </a:solidFill>
+            </a:endParaRPr>
+          </a:p>
+          <a:p>
+            <a:pPr indent="0" lvl="0" marL="0" marR="0" rtl="0" algn="l">
+              <a:lnSpc>
+                <a:spcPct val="100000"/>
+              </a:lnSpc>
+              <a:spcBef>
+                <a:spcPts val="0"/>
+              </a:spcBef>
+              <a:spcAft>
+                <a:spcPts val="0"/>
+              </a:spcAft>
+              <a:buNone/>
+            </a:pPr>
+            <a:r>
+              <a:rPr lang="en-GB" sz="1800">
+                <a:solidFill>
+                  <a:schemeClr val="dk2"/>
+                </a:solidFill>
+              </a:rPr>
+              <a:t>1</a:t>
+            </a:r>
+            <a:endParaRPr sz="1800">
+              <a:solidFill>
+                <a:schemeClr val="dk2"/>
+              </a:solidFill>
+            </a:endParaRPr>
+          </a:p>
+          <a:p>
+            <a:pPr indent="0" lvl="0" marL="0" marR="0" rtl="0" algn="l">
+              <a:lnSpc>
+                <a:spcPct val="100000"/>
+              </a:lnSpc>
+              <a:spcBef>
+                <a:spcPts val="0"/>
+              </a:spcBef>
+              <a:spcAft>
+                <a:spcPts val="0"/>
+              </a:spcAft>
+              <a:buNone/>
+            </a:pPr>
+            <a:r>
+              <a:rPr lang="en-GB" sz="1800">
+                <a:solidFill>
+                  <a:schemeClr val="dk2"/>
+                </a:solidFill>
+              </a:rPr>
+              <a:t>1</a:t>
+            </a:r>
+            <a:endParaRPr sz="1800">
+              <a:solidFill>
+                <a:schemeClr val="dk2"/>
+              </a:solidFill>
+            </a:endParaRPr>
+          </a:p>
+          <a:p>
+            <a:pPr indent="0" lvl="0" marL="0" marR="0" rtl="0" algn="l">
+              <a:lnSpc>
+                <a:spcPct val="100000"/>
+              </a:lnSpc>
+              <a:spcBef>
+                <a:spcPts val="0"/>
+              </a:spcBef>
+              <a:spcAft>
+                <a:spcPts val="0"/>
+              </a:spcAft>
+              <a:buNone/>
+            </a:pPr>
+            <a:r>
+              <a:rPr lang="en-GB" sz="1800">
+                <a:solidFill>
+                  <a:schemeClr val="dk2"/>
+                </a:solidFill>
+              </a:rPr>
+              <a:t>1</a:t>
+            </a:r>
+            <a:endParaRPr sz="1800">
+              <a:solidFill>
+                <a:schemeClr val="dk2"/>
+              </a:solidFill>
+            </a:endParaRPr>
+          </a:p>
+          <a:p>
+            <a:pPr indent="0" lvl="0" marL="0" marR="0" rtl="0" algn="l">
+              <a:lnSpc>
+                <a:spcPct val="100000"/>
+              </a:lnSpc>
+              <a:spcBef>
+                <a:spcPts val="0"/>
+              </a:spcBef>
+              <a:spcAft>
+                <a:spcPts val="0"/>
+              </a:spcAft>
+              <a:buNone/>
+            </a:pPr>
+            <a:r>
+              <a:rPr lang="en-GB" sz="1800">
+                <a:solidFill>
+                  <a:schemeClr val="dk2"/>
+                </a:solidFill>
+              </a:rPr>
+              <a:t>2</a:t>
+            </a:r>
+            <a:endParaRPr sz="1800">
+              <a:solidFill>
+                <a:schemeClr val="dk2"/>
+              </a:solidFill>
+            </a:endParaRPr>
+          </a:p>
+          <a:p>
+            <a:pPr indent="0" lvl="0" marL="0" marR="0" rtl="0" algn="l">
+              <a:lnSpc>
+                <a:spcPct val="100000"/>
+              </a:lnSpc>
+              <a:spcBef>
+                <a:spcPts val="0"/>
+              </a:spcBef>
+              <a:spcAft>
+                <a:spcPts val="0"/>
+              </a:spcAft>
+              <a:buNone/>
+            </a:pPr>
+            <a:r>
+              <a:rPr lang="en-GB" sz="1800">
+                <a:solidFill>
+                  <a:schemeClr val="dk2"/>
+                </a:solidFill>
+              </a:rPr>
+              <a:t>2</a:t>
+            </a:r>
+            <a:endParaRPr sz="1800">
+              <a:solidFill>
+                <a:schemeClr val="dk2"/>
+              </a:solidFill>
+            </a:endParaRPr>
+          </a:p>
+          <a:p>
+            <a:pPr indent="0" lvl="0" marL="0" marR="0" rtl="0" algn="l">
+              <a:lnSpc>
+                <a:spcPct val="100000"/>
+              </a:lnSpc>
+              <a:spcBef>
+                <a:spcPts val="0"/>
+              </a:spcBef>
+              <a:spcAft>
+                <a:spcPts val="0"/>
+              </a:spcAft>
+              <a:buNone/>
+            </a:pPr>
+            <a:r>
+              <a:rPr lang="en-GB" sz="1800">
+                <a:solidFill>
+                  <a:schemeClr val="dk2"/>
+                </a:solidFill>
+              </a:rPr>
+              <a:t>2</a:t>
+            </a:r>
+            <a:endParaRPr sz="1800">
+              <a:solidFill>
+                <a:schemeClr val="dk2"/>
+              </a:solidFill>
+            </a:endParaRPr>
+          </a:p>
+          <a:p>
+            <a:pPr indent="0" lvl="0" marL="0" marR="0" rtl="0" algn="l">
+              <a:lnSpc>
+                <a:spcPct val="100000"/>
+              </a:lnSpc>
+              <a:spcBef>
+                <a:spcPts val="0"/>
+              </a:spcBef>
+              <a:spcAft>
+                <a:spcPts val="0"/>
+              </a:spcAft>
+              <a:buNone/>
+            </a:pPr>
+            <a:r>
+              <a:rPr lang="en-GB" sz="1800">
+                <a:solidFill>
+                  <a:schemeClr val="dk2"/>
+                </a:solidFill>
+              </a:rPr>
+              <a:t>3</a:t>
+            </a:r>
+            <a:endParaRPr sz="1800">
+              <a:solidFill>
+                <a:schemeClr val="dk2"/>
+              </a:solidFill>
+            </a:endParaRPr>
+          </a:p>
+          <a:p>
+            <a:pPr indent="0" lvl="0" marL="0" marR="0" rtl="0" algn="l">
+              <a:lnSpc>
+                <a:spcPct val="100000"/>
+              </a:lnSpc>
+              <a:spcBef>
+                <a:spcPts val="0"/>
+              </a:spcBef>
+              <a:spcAft>
+                <a:spcPts val="0"/>
+              </a:spcAft>
+              <a:buNone/>
+            </a:pPr>
+            <a:r>
+              <a:rPr lang="en-GB" sz="1800">
+                <a:solidFill>
+                  <a:schemeClr val="dk2"/>
+                </a:solidFill>
+              </a:rPr>
+              <a:t>3</a:t>
+            </a:r>
+            <a:endParaRPr sz="1800">
+              <a:solidFill>
+                <a:schemeClr val="dk2"/>
+              </a:solidFill>
+            </a:endParaRPr>
+          </a:p>
+          <a:p>
+            <a:pPr indent="0" lvl="0" marL="0" marR="0" rtl="0" algn="l">
+              <a:lnSpc>
+                <a:spcPct val="100000"/>
+              </a:lnSpc>
+              <a:spcBef>
+                <a:spcPts val="0"/>
+              </a:spcBef>
+              <a:spcAft>
+                <a:spcPts val="0"/>
+              </a:spcAft>
+              <a:buNone/>
+            </a:pPr>
+            <a:r>
+              <a:rPr lang="en-GB" sz="1800">
+                <a:solidFill>
+                  <a:schemeClr val="dk2"/>
+                </a:solidFill>
+              </a:rPr>
+              <a:t>3</a:t>
+            </a:r>
+            <a:endParaRPr sz="1800">
+              <a:solidFill>
+                <a:schemeClr val="dk2"/>
+              </a:solidFill>
+            </a:endParaRPr>
+          </a:p>
+        </p:txBody>
+      </p:sp>
+      <p:cxnSp>
+        <p:nvCxnSpPr>
+          <p:cNvPr id="210" name="Google Shape;210;p27"/>
+          <p:cNvCxnSpPr/>
+          <p:nvPr/>
+        </p:nvCxnSpPr>
+        <p:spPr>
+          <a:xfrm>
+            <a:off x="7898700" y="1273825"/>
+            <a:ext cx="12600" cy="3460800"/>
+          </a:xfrm>
+          <a:prstGeom prst="straightConnector1">
+            <a:avLst/>
+          </a:prstGeom>
+          <a:noFill/>
+          <a:ln cap="flat" cmpd="sng" w="9525">
+            <a:solidFill>
+              <a:schemeClr val="dk2"/>
+            </a:solidFill>
+            <a:prstDash val="solid"/>
+            <a:round/>
+            <a:headEnd len="med" w="med" type="none"/>
+            <a:tailEnd len="med" w="med" type="none"/>
+          </a:ln>
+        </p:spPr>
+      </p:cxnSp>
+    </p:spTree>
+  </p:cSld>
+  <p:clrMapOvr>
+    <a:masterClrMapping/>
+  </p:clrMapOvr>
+</p:sld>
+</file>
+
+<file path=ppt/slides/slide8.xml><?xml version="1.0" encoding="utf-8"?>
+<p:sld xmlns:a="http://schemas.openxmlformats.org/drawingml/2006/main" xmlns:r="http://schemas.openxmlformats.org/officeDocument/2006/relationships" xmlns:mc="http://schemas.openxmlformats.org/markup-compatibility/2006" xmlns:mv="urn:schemas-microsoft-com:mac:vml" xmlns:p="http://schemas.openxmlformats.org/presentationml/2006/main" xmlns:c="http://schemas.openxmlformats.org/drawingml/2006/chart" xmlns:dgm="http://schemas.openxmlformats.org/drawingml/2006/diagram" xmlns:o="urn:schemas-microsoft-com:office:office" xmlns:v="urn:schemas-microsoft-com:vml" xmlns:pvml="urn:schemas-microsoft-com:office:powerpoint" xmlns:com="http://schemas.openxmlformats.org/drawingml/2006/compatibility" xmlns:p14="http://schemas.microsoft.com/office/powerpoint/2010/main" xmlns:p15="http://schemas.microsoft.com/office/powerpoint/2012/main" xmlns:ahyp="http://schemas.microsoft.com/office/drawing/2018/hyperlinkcolor">
+  <p:cSld>
+    <p:spTree>
+      <p:nvGrpSpPr>
+        <p:cNvPr id="214" name="Shape 214"/>
+        <p:cNvGrpSpPr/>
+        <p:nvPr/>
+      </p:nvGrpSpPr>
+      <p:grpSpPr>
+        <a:xfrm>
+          <a:off x="0" y="0"/>
+          <a:ext cx="0" cy="0"/>
+          <a:chOff x="0" y="0"/>
+          <a:chExt cx="0" cy="0"/>
+        </a:xfrm>
+      </p:grpSpPr>
+      <p:sp>
+        <p:nvSpPr>
+          <p:cNvPr id="215" name="Google Shape;215;p28"/>
+          <p:cNvSpPr/>
+          <p:nvPr/>
+        </p:nvSpPr>
+        <p:spPr>
+          <a:xfrm rot="3181171">
+            <a:off x="-699502" y="-1265664"/>
+            <a:ext cx="1398903" cy="3994087"/>
+          </a:xfrm>
+          <a:prstGeom prst="ellipse">
+            <a:avLst/>
+          </a:prstGeom>
+          <a:noFill/>
+          <a:ln cap="flat" cmpd="sng" w="9525">
+            <a:solidFill>
+              <a:schemeClr val="dk1"/>
+            </a:solidFill>
+            <a:prstDash val="solid"/>
+            <a:round/>
+            <a:headEnd len="sm" w="sm" type="none"/>
+            <a:tailEnd len="sm" w="sm" type="none"/>
+          </a:ln>
+        </p:spPr>
+        <p:txBody>
+          <a:bodyPr anchorCtr="0" anchor="ctr" bIns="91425" lIns="91425" spcFirstLastPara="1" rIns="91425" wrap="square" tIns="91425">
+            <a:noAutofit/>
+          </a:bodyPr>
+          <a:lstStyle/>
           <a:p>
             <a:pPr indent="0" lvl="0" marL="0" rtl="0" algn="l">
               <a:spcBef>
@@ -12171,6 +14310,76 @@
             </a:r>
             <a:endParaRPr/>
           </a:p>
+        </p:txBody>
+      </p:sp>
+      <p:sp>
+        <p:nvSpPr>
+          <p:cNvPr id="216" name="Google Shape;216;p28"/>
+          <p:cNvSpPr txBox="1"/>
+          <p:nvPr>
+            <p:ph idx="4294967295" type="title"/>
+          </p:nvPr>
+        </p:nvSpPr>
+        <p:spPr>
+          <a:xfrm>
+            <a:off x="713700" y="133350"/>
+            <a:ext cx="7716600" cy="572700"/>
+          </a:xfrm>
+          <a:prstGeom prst="rect">
+            <a:avLst/>
+          </a:prstGeom>
+        </p:spPr>
+        <p:txBody>
+          <a:bodyPr anchorCtr="0" anchor="t" bIns="91425" lIns="91425" spcFirstLastPara="1" rIns="91425" wrap="square" tIns="91425">
+            <a:noAutofit/>
+          </a:bodyPr>
+          <a:lstStyle/>
+          <a:p>
+            <a:pPr indent="0" lvl="0" marL="0" rtl="0" algn="ctr">
+              <a:spcBef>
+                <a:spcPts val="0"/>
+              </a:spcBef>
+              <a:spcAft>
+                <a:spcPts val="0"/>
+              </a:spcAft>
+              <a:buNone/>
+            </a:pPr>
+            <a:r>
+              <a:rPr lang="en-GB" sz="4200"/>
+              <a:t>Pēcnosacījuma c</a:t>
+            </a:r>
+            <a:r>
+              <a:rPr lang="en-GB" sz="4200"/>
+              <a:t>ikla kritēriju veidi</a:t>
+            </a:r>
+            <a:endParaRPr sz="4200"/>
+          </a:p>
+        </p:txBody>
+      </p:sp>
+      <p:sp>
+        <p:nvSpPr>
+          <p:cNvPr id="217" name="Google Shape;217;p28"/>
+          <p:cNvSpPr txBox="1"/>
+          <p:nvPr/>
+        </p:nvSpPr>
+        <p:spPr>
+          <a:xfrm>
+            <a:off x="852350" y="1858075"/>
+            <a:ext cx="6724800" cy="738900"/>
+          </a:xfrm>
+          <a:prstGeom prst="rect">
+            <a:avLst/>
+          </a:prstGeom>
+          <a:noFill/>
+          <a:ln>
+            <a:noFill/>
+          </a:ln>
+        </p:spPr>
+        <p:txBody>
+          <a:bodyPr anchorCtr="0" anchor="t" bIns="91425" lIns="91425" spcFirstLastPara="1" rIns="91425" wrap="square" tIns="91425">
+            <a:spAutoFit/>
+          </a:bodyPr>
+          <a:lstStyle/>
           <a:p>
             <a:pPr indent="0" lvl="0" marL="0" rtl="0" algn="l">
               <a:spcBef>
@@ -12182,10 +14391,197 @@
               <a:buNone/>
             </a:pPr>
             <a:r>
-              <a:rPr lang="en-GB"/>
-              <a:t>https://stackoverflow.com/questions/25233132/the-difference-between-while-and-do-while-c</a:t>
+              <a:rPr lang="en-GB" sz="1800">
+                <a:solidFill>
+                  <a:schemeClr val="dk2"/>
+                </a:solidFill>
+              </a:rPr>
+              <a:t>Lai papildinātu cikla kritērijus priekš to apturēšanas ar vairāk nekā vienu nosacījumu var izmantot šādas funkcijas:</a:t>
             </a:r>
             <a:endParaRPr/>
+          </a:p>
+        </p:txBody>
+      </p:sp>
+      <p:sp>
+        <p:nvSpPr>
+          <p:cNvPr id="218" name="Google Shape;218;p28"/>
+          <p:cNvSpPr txBox="1"/>
+          <p:nvPr/>
+        </p:nvSpPr>
+        <p:spPr>
+          <a:xfrm>
+            <a:off x="814250" y="2982025"/>
+            <a:ext cx="6724800" cy="646500"/>
+          </a:xfrm>
+          <a:prstGeom prst="rect">
+            <a:avLst/>
+          </a:prstGeom>
+          <a:noFill/>
+          <a:ln>
+            <a:noFill/>
+          </a:ln>
+        </p:spPr>
+        <p:txBody>
+          <a:bodyPr anchorCtr="0" anchor="t" bIns="91425" lIns="91425" spcFirstLastPara="1" rIns="91425" wrap="square" tIns="91425">
+            <a:spAutoFit/>
+          </a:bodyPr>
+          <a:lstStyle/>
+          <a:p>
+            <a:pPr indent="0" lvl="0" marL="0" rtl="0" algn="l">
+              <a:spcBef>
+                <a:spcPts val="0"/>
+              </a:spcBef>
+              <a:spcAft>
+                <a:spcPts val="0"/>
+              </a:spcAft>
+              <a:buNone/>
+            </a:pPr>
+            <a:r>
+              <a:rPr lang="en-GB" sz="1500">
+                <a:solidFill>
+                  <a:schemeClr val="dk2"/>
+                </a:solidFill>
+              </a:rPr>
+              <a:t>&amp;&amp; - And (un) Izmanto kad ir 2 vai vairāki nosacījumi kur visiem ir </a:t>
+            </a:r>
+            <a:r>
+              <a:rPr lang="en-GB" sz="1500">
+                <a:solidFill>
+                  <a:schemeClr val="dk2"/>
+                </a:solidFill>
+              </a:rPr>
+              <a:t>obligāti </a:t>
+            </a:r>
+            <a:r>
+              <a:rPr lang="en-GB" sz="1500">
+                <a:solidFill>
+                  <a:schemeClr val="dk2"/>
+                </a:solidFill>
+              </a:rPr>
+              <a:t>jaatbilst kritērijiem lai apturētu cikla darbību</a:t>
+            </a:r>
+            <a:endParaRPr sz="1100"/>
+          </a:p>
+        </p:txBody>
+      </p:sp>
+      <p:sp>
+        <p:nvSpPr>
+          <p:cNvPr id="219" name="Google Shape;219;p28"/>
+          <p:cNvSpPr txBox="1"/>
+          <p:nvPr/>
+        </p:nvSpPr>
+        <p:spPr>
+          <a:xfrm>
+            <a:off x="852350" y="3736675"/>
+            <a:ext cx="6724800" cy="646500"/>
+          </a:xfrm>
+          <a:prstGeom prst="rect">
+            <a:avLst/>
+          </a:prstGeom>
+          <a:noFill/>
+          <a:ln>
+            <a:noFill/>
+          </a:ln>
+        </p:spPr>
+        <p:txBody>
+          <a:bodyPr anchorCtr="0" anchor="t" bIns="91425" lIns="91425" spcFirstLastPara="1" rIns="91425" wrap="square" tIns="91425">
+            <a:spAutoFit/>
+          </a:bodyPr>
+          <a:lstStyle/>
+          <a:p>
+            <a:pPr indent="0" lvl="0" marL="0" rtl="0" algn="l">
+              <a:spcBef>
+                <a:spcPts val="0"/>
+              </a:spcBef>
+              <a:spcAft>
+                <a:spcPts val="0"/>
+              </a:spcAft>
+              <a:buNone/>
+            </a:pPr>
+            <a:r>
+              <a:rPr lang="en-GB" sz="1500">
+                <a:solidFill>
+                  <a:schemeClr val="dk2"/>
+                </a:solidFill>
+              </a:rPr>
+              <a:t>|| - Or (vai) izmanto kad ir 2 vai vairāki nosacījumi kur tikai vienam ir jaatbilst kritērijiem lai apturētu cikla darbību</a:t>
+            </a:r>
+            <a:endParaRPr sz="1100"/>
+          </a:p>
+        </p:txBody>
+      </p:sp>
+    </p:spTree>
+  </p:cSld>
+  <p:clrMapOvr>
+    <a:masterClrMapping/>
+  </p:clrMapOvr>
+</p:sld>
+</file>
+
+<file path=ppt/slides/slide9.xml><?xml version="1.0" encoding="utf-8"?>
+<p:sld xmlns:a="http://schemas.openxmlformats.org/drawingml/2006/main" xmlns:r="http://schemas.openxmlformats.org/officeDocument/2006/relationships" xmlns:mc="http://schemas.openxmlformats.org/markup-compatibility/2006" xmlns:mv="urn:schemas-microsoft-com:mac:vml" xmlns:p="http://schemas.openxmlformats.org/presentationml/2006/main" xmlns:c="http://schemas.openxmlformats.org/drawingml/2006/chart" xmlns:dgm="http://schemas.openxmlformats.org/drawingml/2006/diagram" xmlns:o="urn:schemas-microsoft-com:office:office" xmlns:v="urn:schemas-microsoft-com:vml" xmlns:pvml="urn:schemas-microsoft-com:office:powerpoint" xmlns:com="http://schemas.openxmlformats.org/drawingml/2006/compatibility" xmlns:p14="http://schemas.microsoft.com/office/powerpoint/2010/main" xmlns:p15="http://schemas.microsoft.com/office/powerpoint/2012/main" xmlns:ahyp="http://schemas.microsoft.com/office/drawing/2018/hyperlinkcolor">
+  <p:cSld>
+    <p:spTree>
+      <p:nvGrpSpPr>
+        <p:cNvPr id="223" name="Shape 223"/>
+        <p:cNvGrpSpPr/>
+        <p:nvPr/>
+      </p:nvGrpSpPr>
+      <p:grpSpPr>
+        <a:xfrm>
+          <a:off x="0" y="0"/>
+          <a:ext cx="0" cy="0"/>
+          <a:chOff x="0" y="0"/>
+          <a:chExt cx="0" cy="0"/>
+        </a:xfrm>
+      </p:grpSpPr>
+      <p:sp>
+        <p:nvSpPr>
+          <p:cNvPr id="224" name="Google Shape;224;p29"/>
+          <p:cNvSpPr txBox="1"/>
+          <p:nvPr/>
+        </p:nvSpPr>
+        <p:spPr>
+          <a:xfrm>
+            <a:off x="1552500" y="0"/>
+            <a:ext cx="6039000" cy="1262100"/>
+          </a:xfrm>
+          <a:prstGeom prst="rect">
+            <a:avLst/>
+          </a:prstGeom>
+          <a:noFill/>
+          <a:ln>
+            <a:noFill/>
+          </a:ln>
+        </p:spPr>
+        <p:txBody>
+          <a:bodyPr anchorCtr="0" anchor="t" bIns="91425" lIns="91425" spcFirstLastPara="1" rIns="91425" wrap="square" tIns="91425">
+            <a:spAutoFit/>
+          </a:bodyPr>
+          <a:lstStyle/>
+          <a:p>
+            <a:pPr indent="0" lvl="0" marL="0" rtl="0" algn="ctr">
+              <a:spcBef>
+                <a:spcPts val="0"/>
+              </a:spcBef>
+              <a:spcAft>
+                <a:spcPts val="0"/>
+              </a:spcAft>
+              <a:buNone/>
+            </a:pPr>
+            <a:r>
+              <a:rPr lang="en-GB" sz="3500">
+                <a:solidFill>
+                  <a:schemeClr val="dk1"/>
+                </a:solidFill>
+              </a:rPr>
+              <a:t>Pecnosacījuma or (vai) kritērija piemērs</a:t>
+            </a:r>
+            <a:endParaRPr sz="3500">
+              <a:solidFill>
+                <a:schemeClr val="dk1"/>
+              </a:solidFill>
+            </a:endParaRPr>
           </a:p>
         </p:txBody>
       </p:sp>
@@ -12198,6 +14594,285 @@
 </file>
 
 <file path=ppt/theme/theme1.xml><?xml version="1.0" encoding="utf-8"?>
+<a:theme xmlns:a="http://schemas.openxmlformats.org/drawingml/2006/main" xmlns:r="http://schemas.openxmlformats.org/officeDocument/2006/relationships" name="Simple Light">
+  <a:themeElements>
+    <a:clrScheme name="Simple Light">
+      <a:dk1>
+        <a:srgbClr val="000000"/>
+      </a:dk1>
+      <a:lt1>
+        <a:srgbClr val="FFFFFF"/>
+      </a:lt1>
+      <a:dk2>
+        <a:srgbClr val="595959"/>
+      </a:dk2>
+      <a:lt2>
+        <a:srgbClr val="EEEEEE"/>
+      </a:lt2>
+      <a:accent1>
+        <a:srgbClr val="4285F4"/>
+      </a:accent1>
+      <a:accent2>
+        <a:srgbClr val="212121"/>
+      </a:accent2>
+      <a:accent3>
+        <a:srgbClr val="78909C"/>
+      </a:accent3>
+      <a:accent4>
+        <a:srgbClr val="FFAB40"/>
+      </a:accent4>
+      <a:accent5>
+        <a:srgbClr val="0097A7"/>
+      </a:accent5>
+      <a:accent6>
+        <a:srgbClr val="EEFF41"/>
+      </a:accent6>
+      <a:hlink>
+        <a:srgbClr val="0097A7"/>
+      </a:hlink>
+      <a:folHlink>
+        <a:srgbClr val="0097A7"/>
+      </a:folHlink>
+    </a:clrScheme>
+    <a:fontScheme name="Office">
+      <a:majorFont>
+        <a:latin typeface="Arial"/>
+        <a:ea typeface=""/>
+        <a:cs typeface=""/>
+        <a:font script="Jpan" typeface="ＭＳ Ｐゴシック"/>
+        <a:font script="Hang" typeface="맑은 고딕"/>
+        <a:font script="Hans" typeface="宋体"/>
+        <a:font script="Hant" typeface="新細明體"/>
+        <a:font script="Arab" typeface="Times New Roman"/>
+        <a:font script="Hebr" typeface="Times New Roman"/>
+        <a:font script="Thai" typeface="Angsana New"/>
+        <a:font script="Ethi" typeface="Nyala"/>
+        <a:font script="Beng" typeface="Vrinda"/>
+        <a:font script="Gujr" typeface="Shruti"/>
+        <a:font script="Khmr" typeface="MoolBoran"/>
+        <a:font script="Knda" typeface="Tunga"/>
+        <a:font script="Guru" typeface="Raavi"/>
+        <a:font script="Cans" typeface="Euphemia"/>
+        <a:font script="Cher" typeface="Plantagenet Cherokee"/>
+        <a:font script="Yiii" typeface="Microsoft Yi Baiti"/>
+        <a:font script="Tibt" typeface="Microsoft Himalaya"/>
+        <a:font script="Thaa" typeface="MV Boli"/>
+        <a:font script="Deva" typeface="Mangal"/>
+        <a:font script="Telu" typeface="Gautami"/>
+        <a:font script="Taml" typeface="Latha"/>
+        <a:font script="Syrc" typeface="Estrangelo Edessa"/>
+        <a:font script="Orya" typeface="Kalinga"/>
+        <a:font script="Mlym" typeface="Kartika"/>
+        <a:font script="Laoo" typeface="DokChampa"/>
+        <a:font script="Sinh" typeface="Iskoola Pota"/>
+        <a:font script="Mong" typeface="Mongolian Baiti"/>
+        <a:font script="Viet" typeface="Times New Roman"/>
+        <a:font script="Uigh" typeface="Microsoft Uighur"/>
+        <a:font script="Geor" typeface="Sylfaen"/>
+      </a:majorFont>
+      <a:minorFont>
+        <a:latin typeface="Arial"/>
+        <a:ea typeface=""/>
+        <a:cs typeface=""/>
+        <a:font script="Jpan" typeface="ＭＳ Ｐゴシック"/>
+        <a:font script="Hang" typeface="맑은 고딕"/>
+        <a:font script="Hans" typeface="宋体"/>
+        <a:font script="Hant" typeface="新細明體"/>
+        <a:font script="Arab" typeface="Arial"/>
+        <a:font script="Hebr" typeface="Arial"/>
+        <a:font script="Thai" typeface="Cordia New"/>
+        <a:font script="Ethi" typeface="Nyala"/>
+        <a:font script="Beng" typeface="Vrinda"/>
+        <a:font script="Gujr" typeface="Shruti"/>
+        <a:font script="Khmr" typeface="DaunPenh"/>
+        <a:font script="Knda" typeface="Tunga"/>
+        <a:font script="Guru" typeface="Raavi"/>
+        <a:font script="Cans" typeface="Euphemia"/>
+        <a:font script="Cher" typeface="Plantagenet Cherokee"/>
+        <a:font script="Yiii" typeface="Microsoft Yi Baiti"/>
+        <a:font script="Tibt" typeface="Microsoft Himalaya"/>
+        <a:font script="Thaa" typeface="MV Boli"/>
+        <a:font script="Deva" typeface="Mangal"/>
+        <a:font script="Telu" typeface="Gautami"/>
+        <a:font script="Taml" typeface="Latha"/>
+        <a:font script="Syrc" typeface="Estrangelo Edessa"/>
+        <a:font script="Orya" typeface="Kalinga"/>
+        <a:font script="Mlym" typeface="Kartika"/>
+        <a:font script="Laoo" typeface="DokChampa"/>
+        <a:font script="Sinh" typeface="Iskoola Pota"/>
+        <a:font script="Mong" typeface="Mongolian Baiti"/>
+        <a:font script="Viet" typeface="Arial"/>
+        <a:font script="Uigh" typeface="Microsoft Uighur"/>
+        <a:font script="Geor" typeface="Sylfaen"/>
+      </a:minorFont>
+    </a:fontScheme>
+    <a:fmtScheme name="Office">
+      <a:fillStyleLst>
+        <a:solidFill>
+          <a:schemeClr val="phClr"/>
+        </a:solidFill>
+        <a:gradFill rotWithShape="1">
+          <a:gsLst>
+            <a:gs pos="0">
+              <a:schemeClr val="phClr">
+                <a:tint val="50000"/>
+                <a:satMod val="300000"/>
+              </a:schemeClr>
+            </a:gs>
+            <a:gs pos="35000">
+              <a:schemeClr val="phClr">
+                <a:tint val="37000"/>
+                <a:satMod val="300000"/>
+              </a:schemeClr>
+            </a:gs>
+            <a:gs pos="100000">
+              <a:schemeClr val="phClr">
+                <a:tint val="15000"/>
+                <a:satMod val="350000"/>
+              </a:schemeClr>
+            </a:gs>
+          </a:gsLst>
+          <a:lin ang="16200000" scaled="1"/>
+        </a:gradFill>
+        <a:gradFill rotWithShape="1">
+          <a:gsLst>
+            <a:gs pos="0">
+              <a:schemeClr val="phClr">
+                <a:tint val="100000"/>
+                <a:shade val="100000"/>
+                <a:satMod val="130000"/>
+              </a:schemeClr>
+            </a:gs>
+            <a:gs pos="100000">
+              <a:schemeClr val="phClr">
+                <a:tint val="50000"/>
+                <a:shade val="100000"/>
+                <a:satMod val="350000"/>
+              </a:schemeClr>
+            </a:gs>
+          </a:gsLst>
+          <a:lin ang="16200000" scaled="0"/>
+        </a:gradFill>
+      </a:fillStyleLst>
+      <a:lnStyleLst>
+        <a:ln w="9525" cap="flat" cmpd="sng" algn="ctr">
+          <a:solidFill>
+            <a:schemeClr val="phClr">
+              <a:shade val="95000"/>
+              <a:satMod val="105000"/>
+            </a:schemeClr>
+          </a:solidFill>
+          <a:prstDash val="solid"/>
+        </a:ln>
+        <a:ln w="25400" cap="flat" cmpd="sng" algn="ctr">
+          <a:solidFill>
+            <a:schemeClr val="phClr"/>
+          </a:solidFill>
+          <a:prstDash val="solid"/>
+        </a:ln>
+        <a:ln w="38100" cap="flat" cmpd="sng" algn="ctr">
+          <a:solidFill>
+            <a:schemeClr val="phClr"/>
+          </a:solidFill>
+          <a:prstDash val="solid"/>
+        </a:ln>
+      </a:lnStyleLst>
+      <a:effectStyleLst>
+        <a:effectStyle>
+          <a:effectLst>
+            <a:outerShdw blurRad="40000" dist="20000" dir="5400000" rotWithShape="0">
+              <a:srgbClr val="000000">
+                <a:alpha val="38000"/>
+              </a:srgbClr>
+            </a:outerShdw>
+          </a:effectLst>
+        </a:effectStyle>
+        <a:effectStyle>
+          <a:effectLst>
+            <a:outerShdw blurRad="40000" dist="23000" dir="5400000" rotWithShape="0">
+              <a:srgbClr val="000000">
+                <a:alpha val="35000"/>
+              </a:srgbClr>
+            </a:outerShdw>
+          </a:effectLst>
+        </a:effectStyle>
+        <a:effectStyle>
+          <a:effectLst>
+            <a:outerShdw blurRad="40000" dist="23000" dir="5400000" rotWithShape="0">
+              <a:srgbClr val="000000">
+                <a:alpha val="35000"/>
+              </a:srgbClr>
+            </a:outerShdw>
+          </a:effectLst>
+          <a:scene3d>
+            <a:camera prst="orthographicFront">
+              <a:rot lat="0" lon="0" rev="0"/>
+            </a:camera>
+            <a:lightRig rig="threePt" dir="t">
+              <a:rot lat="0" lon="0" rev="1200000"/>
+            </a:lightRig>
+          </a:scene3d>
+          <a:sp3d>
+            <a:bevelT w="63500" h="25400"/>
+          </a:sp3d>
+        </a:effectStyle>
+      </a:effectStyleLst>
+      <a:bgFillStyleLst>
+        <a:solidFill>
+          <a:schemeClr val="phClr"/>
+        </a:solidFill>
+        <a:gradFill rotWithShape="1">
+          <a:gsLst>
+            <a:gs pos="0">
+              <a:schemeClr val="phClr">
+                <a:tint val="40000"/>
+                <a:satMod val="350000"/>
+              </a:schemeClr>
+            </a:gs>
+            <a:gs pos="40000">
+              <a:schemeClr val="phClr">
+                <a:tint val="45000"/>
+                <a:shade val="99000"/>
+                <a:satMod val="350000"/>
+              </a:schemeClr>
+            </a:gs>
+            <a:gs pos="100000">
+              <a:schemeClr val="phClr">
+                <a:shade val="20000"/>
+                <a:satMod val="255000"/>
+              </a:schemeClr>
+            </a:gs>
+          </a:gsLst>
+          <a:path path="circle">
+            <a:fillToRect l="50000" t="-80000" r="50000" b="180000"/>
+          </a:path>
+        </a:gradFill>
+        <a:gradFill rotWithShape="1">
+          <a:gsLst>
+            <a:gs pos="0">
+              <a:schemeClr val="phClr">
+                <a:tint val="80000"/>
+                <a:satMod val="300000"/>
+              </a:schemeClr>
+            </a:gs>
+            <a:gs pos="100000">
+              <a:schemeClr val="phClr">
+                <a:shade val="30000"/>
+                <a:satMod val="200000"/>
+              </a:schemeClr>
+            </a:gs>
+          </a:gsLst>
+          <a:path path="circle">
+            <a:fillToRect l="50000" t="50000" r="50000" b="50000"/>
+          </a:path>
+        </a:gradFill>
+      </a:bgFillStyleLst>
+    </a:fmtScheme>
+  </a:themeElements>
+</a:theme>
+</file>
+
+<file path=ppt/theme/theme2.xml><?xml version="1.0" encoding="utf-8"?>
 <a:theme xmlns:a="http://schemas.openxmlformats.org/drawingml/2006/main" xmlns:r="http://schemas.openxmlformats.org/officeDocument/2006/relationships">
   <a:themeElements>
     <a:clrScheme name="Default">
@@ -12474,283 +15149,4 @@
     </a:fmtScheme>
   </a:themeElements>
 </a:theme>
-</file>
-
-<file path=ppt/theme/theme2.xml><?xml version="1.0" encoding="utf-8"?>
-<a:theme xmlns:a="http://schemas.openxmlformats.org/drawingml/2006/main" xmlns:r="http://schemas.openxmlformats.org/officeDocument/2006/relationships" name="Simple Light">
-  <a:themeElements>
-    <a:clrScheme name="Simple Light">
-      <a:dk1>
-        <a:srgbClr val="000000"/>
-      </a:dk1>
-      <a:lt1>
-        <a:srgbClr val="FFFFFF"/>
-      </a:lt1>
-      <a:dk2>
-        <a:srgbClr val="595959"/>
-      </a:dk2>
-      <a:lt2>
-        <a:srgbClr val="EEEEEE"/>
-      </a:lt2>
-      <a:accent1>
-        <a:srgbClr val="4285F4"/>
-      </a:accent1>
-      <a:accent2>
-        <a:srgbClr val="212121"/>
-      </a:accent2>
-      <a:accent3>
-        <a:srgbClr val="78909C"/>
-      </a:accent3>
-      <a:accent4>
-        <a:srgbClr val="FFAB40"/>
-      </a:accent4>
-      <a:accent5>
-        <a:srgbClr val="0097A7"/>
-      </a:accent5>
-      <a:accent6>
-        <a:srgbClr val="EEFF41"/>
-      </a:accent6>
-      <a:hlink>
-        <a:srgbClr val="0097A7"/>
-      </a:hlink>
-      <a:folHlink>
-        <a:srgbClr val="0097A7"/>
-      </a:folHlink>
-    </a:clrScheme>
-    <a:fontScheme name="Office">
-      <a:majorFont>
-        <a:latin typeface="Arial"/>
-        <a:ea typeface=""/>
-        <a:cs typeface=""/>
-        <a:font script="Jpan" typeface="ＭＳ Ｐゴシック"/>
-        <a:font script="Hang" typeface="맑은 고딕"/>
-        <a:font script="Hans" typeface="宋体"/>
-        <a:font script="Hant" typeface="新細明體"/>
-        <a:font script="Arab" typeface="Times New Roman"/>
-        <a:font script="Hebr" typeface="Times New Roman"/>
-        <a:font script="Thai" typeface="Angsana New"/>
-        <a:font script="Ethi" typeface="Nyala"/>
-        <a:font script="Beng" typeface="Vrinda"/>
-        <a:font script="Gujr" typeface="Shruti"/>
-        <a:font script="Khmr" typeface="MoolBoran"/>
-        <a:font script="Knda" typeface="Tunga"/>
-        <a:font script="Guru" typeface="Raavi"/>
-        <a:font script="Cans" typeface="Euphemia"/>
-        <a:font script="Cher" typeface="Plantagenet Cherokee"/>
-        <a:font script="Yiii" typeface="Microsoft Yi Baiti"/>
-        <a:font script="Tibt" typeface="Microsoft Himalaya"/>
-        <a:font script="Thaa" typeface="MV Boli"/>
-        <a:font script="Deva" typeface="Mangal"/>
-        <a:font script="Telu" typeface="Gautami"/>
-        <a:font script="Taml" typeface="Latha"/>
-        <a:font script="Syrc" typeface="Estrangelo Edessa"/>
-        <a:font script="Orya" typeface="Kalinga"/>
-        <a:font script="Mlym" typeface="Kartika"/>
-        <a:font script="Laoo" typeface="DokChampa"/>
-        <a:font script="Sinh" typeface="Iskoola Pota"/>
-        <a:font script="Mong" typeface="Mongolian Baiti"/>
-        <a:font script="Viet" typeface="Times New Roman"/>
-        <a:font script="Uigh" typeface="Microsoft Uighur"/>
-        <a:font script="Geor" typeface="Sylfaen"/>
-      </a:majorFont>
-      <a:minorFont>
-        <a:latin typeface="Arial"/>
-        <a:ea typeface=""/>
-        <a:cs typeface=""/>
-        <a:font script="Jpan" typeface="ＭＳ Ｐゴシック"/>
-        <a:font script="Hang" typeface="맑은 고딕"/>
-        <a:font script="Hans" typeface="宋体"/>
-        <a:font script="Hant" typeface="新細明體"/>
-        <a:font script="Arab" typeface="Arial"/>
-        <a:font script="Hebr" typeface="Arial"/>
-        <a:font script="Thai" typeface="Cordia New"/>
-        <a:font script="Ethi" typeface="Nyala"/>
-        <a:font script="Beng" typeface="Vrinda"/>
-        <a:font script="Gujr" typeface="Shruti"/>
-        <a:font script="Khmr" typeface="DaunPenh"/>
-        <a:font script="Knda" typeface="Tunga"/>
-        <a:font script="Guru" typeface="Raavi"/>
-        <a:font script="Cans" typeface="Euphemia"/>
-        <a:font script="Cher" typeface="Plantagenet Cherokee"/>
-        <a:font script="Yiii" typeface="Microsoft Yi Baiti"/>
-        <a:font script="Tibt" typeface="Microsoft Himalaya"/>
-        <a:font script="Thaa" typeface="MV Boli"/>
-        <a:font script="Deva" typeface="Mangal"/>
-        <a:font script="Telu" typeface="Gautami"/>
-        <a:font script="Taml" typeface="Latha"/>
-        <a:font script="Syrc" typeface="Estrangelo Edessa"/>
-        <a:font script="Orya" typeface="Kalinga"/>
-        <a:font script="Mlym" typeface="Kartika"/>
-        <a:font script="Laoo" typeface="DokChampa"/>
-        <a:font script="Sinh" typeface="Iskoola Pota"/>
-        <a:font script="Mong" typeface="Mongolian Baiti"/>
-        <a:font script="Viet" typeface="Arial"/>
-        <a:font script="Uigh" typeface="Microsoft Uighur"/>
-        <a:font script="Geor" typeface="Sylfaen"/>
-      </a:minorFont>
-    </a:fontScheme>
-    <a:fmtScheme name="Office">
-      <a:fillStyleLst>
-        <a:solidFill>
-          <a:schemeClr val="phClr"/>
-        </a:solidFill>
-        <a:gradFill rotWithShape="1">
-          <a:gsLst>
-            <a:gs pos="0">
-              <a:schemeClr val="phClr">
-                <a:tint val="50000"/>
-                <a:satMod val="300000"/>
-              </a:schemeClr>
-            </a:gs>
-            <a:gs pos="35000">
-              <a:schemeClr val="phClr">
-                <a:tint val="37000"/>
-                <a:satMod val="300000"/>
-              </a:schemeClr>
-            </a:gs>
-            <a:gs pos="100000">
-              <a:schemeClr val="phClr">
-                <a:tint val="15000"/>
-                <a:satMod val="350000"/>
-              </a:schemeClr>
-            </a:gs>
-          </a:gsLst>
-          <a:lin ang="16200000" scaled="1"/>
-        </a:gradFill>
-        <a:gradFill rotWithShape="1">
-          <a:gsLst>
-            <a:gs pos="0">
-              <a:schemeClr val="phClr">
-                <a:tint val="100000"/>
-                <a:shade val="100000"/>
-                <a:satMod val="130000"/>
-              </a:schemeClr>
-            </a:gs>
-            <a:gs pos="100000">
-              <a:schemeClr val="phClr">
-                <a:tint val="50000"/>
-                <a:shade val="100000"/>
-                <a:satMod val="350000"/>
-              </a:schemeClr>
-            </a:gs>
-          </a:gsLst>
-          <a:lin ang="16200000" scaled="0"/>
-        </a:gradFill>
-      </a:fillStyleLst>
-      <a:lnStyleLst>
-        <a:ln w="9525" cap="flat" cmpd="sng" algn="ctr">
-          <a:solidFill>
-            <a:schemeClr val="phClr">
-              <a:shade val="95000"/>
-              <a:satMod val="105000"/>
-            </a:schemeClr>
-          </a:solidFill>
-          <a:prstDash val="solid"/>
-        </a:ln>
-        <a:ln w="25400" cap="flat" cmpd="sng" algn="ctr">
-          <a:solidFill>
-            <a:schemeClr val="phClr"/>
-          </a:solidFill>
-          <a:prstDash val="solid"/>
-        </a:ln>
-        <a:ln w="38100" cap="flat" cmpd="sng" algn="ctr">
-          <a:solidFill>
-            <a:schemeClr val="phClr"/>
-          </a:solidFill>
-          <a:prstDash val="solid"/>
-        </a:ln>
-      </a:lnStyleLst>
-      <a:effectStyleLst>
-        <a:effectStyle>
-          <a:effectLst>
-            <a:outerShdw blurRad="40000" dist="20000" dir="5400000" rotWithShape="0">
-              <a:srgbClr val="000000">
-                <a:alpha val="38000"/>
-              </a:srgbClr>
-            </a:outerShdw>
-          </a:effectLst>
-        </a:effectStyle>
-        <a:effectStyle>
-          <a:effectLst>
-            <a:outerShdw blurRad="40000" dist="23000" dir="5400000" rotWithShape="0">
-              <a:srgbClr val="000000">
-                <a:alpha val="35000"/>
-              </a:srgbClr>
-            </a:outerShdw>
-          </a:effectLst>
-        </a:effectStyle>
-        <a:effectStyle>
-          <a:effectLst>
-            <a:outerShdw blurRad="40000" dist="23000" dir="5400000" rotWithShape="0">
-              <a:srgbClr val="000000">
-                <a:alpha val="35000"/>
-              </a:srgbClr>
-            </a:outerShdw>
-          </a:effectLst>
-          <a:scene3d>
-            <a:camera prst="orthographicFront">
-              <a:rot lat="0" lon="0" rev="0"/>
-            </a:camera>
-            <a:lightRig rig="threePt" dir="t">
-              <a:rot lat="0" lon="0" rev="1200000"/>
-            </a:lightRig>
-          </a:scene3d>
-          <a:sp3d>
-            <a:bevelT w="63500" h="25400"/>
-          </a:sp3d>
-        </a:effectStyle>
-      </a:effectStyleLst>
-      <a:bgFillStyleLst>
-        <a:solidFill>
-          <a:schemeClr val="phClr"/>
-        </a:solidFill>
-        <a:gradFill rotWithShape="1">
-          <a:gsLst>
-            <a:gs pos="0">
-              <a:schemeClr val="phClr">
-                <a:tint val="40000"/>
-                <a:satMod val="350000"/>
-              </a:schemeClr>
-            </a:gs>
-            <a:gs pos="40000">
-              <a:schemeClr val="phClr">
-                <a:tint val="45000"/>
-                <a:shade val="99000"/>
-                <a:satMod val="350000"/>
-              </a:schemeClr>
-            </a:gs>
-            <a:gs pos="100000">
-              <a:schemeClr val="phClr">
-                <a:shade val="20000"/>
-                <a:satMod val="255000"/>
-              </a:schemeClr>
-            </a:gs>
-          </a:gsLst>
-          <a:path path="circle">
-            <a:fillToRect l="50000" t="-80000" r="50000" b="180000"/>
-          </a:path>
-        </a:gradFill>
-        <a:gradFill rotWithShape="1">
-          <a:gsLst>
-            <a:gs pos="0">
-              <a:schemeClr val="phClr">
-                <a:tint val="80000"/>
-                <a:satMod val="300000"/>
-              </a:schemeClr>
-            </a:gs>
-            <a:gs pos="100000">
-              <a:schemeClr val="phClr">
-                <a:shade val="30000"/>
-                <a:satMod val="200000"/>
-              </a:schemeClr>
-            </a:gs>
-          </a:gsLst>
-          <a:path path="circle">
-            <a:fillToRect l="50000" t="50000" r="50000" b="50000"/>
-          </a:path>
-        </a:gradFill>
-      </a:bgFillStyleLst>
-    </a:fmtScheme>
-  </a:themeElements>
-</a:theme>
 </file>
</xml_diff>

<commit_message>
Testa kodam pievienoti jautājumi kā arī viņu atbildes, atlicis salabot kodu un mācību materiālā nelielas izmaiņas
</commit_message>
<xml_diff>
--- a/Pecnosacījumu_MācībuMaterials.pptx
+++ b/Pecnosacījumu_MācībuMaterials.pptx
@@ -11666,7 +11666,7 @@
         </p:nvSpPr>
         <p:spPr>
           <a:xfrm>
-            <a:off x="2531372" y="3058000"/>
+            <a:off x="2506222" y="2449050"/>
             <a:ext cx="6381000" cy="1576500"/>
           </a:xfrm>
           <a:prstGeom prst="rect">
@@ -11675,7 +11675,7 @@
         </p:spPr>
         <p:txBody>
           <a:bodyPr anchorCtr="0" anchor="t" bIns="91425" lIns="91425" spcFirstLastPara="1" rIns="91425" wrap="square" tIns="91425">
-            <a:normAutofit/>
+            <a:normAutofit fontScale="85000"/>
           </a:bodyPr>
           <a:lstStyle/>
           <a:p>
@@ -11684,13 +11684,44 @@
                 <a:spcPts val="0"/>
               </a:spcBef>
               <a:spcAft>
-                <a:spcPts val="1200"/>
+                <a:spcPts val="0"/>
               </a:spcAft>
               <a:buNone/>
             </a:pPr>
             <a:r>
               <a:rPr lang="en-GB"/>
               <a:t>Pecnosacījuma ciklu izmanto, ja vēlas izpildīt tā darbības vismaz vienu vai vairākas reizes</a:t>
+            </a:r>
+            <a:endParaRPr/>
+          </a:p>
+          <a:p>
+            <a:pPr indent="0" lvl="0" marL="0" rtl="0" algn="l">
+              <a:spcBef>
+                <a:spcPts val="1200"/>
+              </a:spcBef>
+              <a:spcAft>
+                <a:spcPts val="0"/>
+              </a:spcAft>
+              <a:buNone/>
+            </a:pPr>
+            <a:r>
+              <a:t/>
+            </a:r>
+            <a:endParaRPr/>
+          </a:p>
+          <a:p>
+            <a:pPr indent="0" lvl="0" marL="0" rtl="0" algn="l">
+              <a:spcBef>
+                <a:spcPts val="1200"/>
+              </a:spcBef>
+              <a:spcAft>
+                <a:spcPts val="1200"/>
+              </a:spcAft>
+              <a:buNone/>
+            </a:pPr>
+            <a:r>
+              <a:rPr lang="en-GB"/>
+              <a:t>Pēcnosacījuma var izmantot int,string,char,double,bool,float datu tipus</a:t>
             </a:r>
             <a:endParaRPr/>
           </a:p>
@@ -15411,6 +15442,285 @@
 </file>
 
 <file path=ppt/theme/theme1.xml><?xml version="1.0" encoding="utf-8"?>
+<a:theme xmlns:a="http://schemas.openxmlformats.org/drawingml/2006/main" xmlns:r="http://schemas.openxmlformats.org/officeDocument/2006/relationships" name="Simple Light">
+  <a:themeElements>
+    <a:clrScheme name="Simple Light">
+      <a:dk1>
+        <a:srgbClr val="000000"/>
+      </a:dk1>
+      <a:lt1>
+        <a:srgbClr val="FFFFFF"/>
+      </a:lt1>
+      <a:dk2>
+        <a:srgbClr val="595959"/>
+      </a:dk2>
+      <a:lt2>
+        <a:srgbClr val="EEEEEE"/>
+      </a:lt2>
+      <a:accent1>
+        <a:srgbClr val="4285F4"/>
+      </a:accent1>
+      <a:accent2>
+        <a:srgbClr val="212121"/>
+      </a:accent2>
+      <a:accent3>
+        <a:srgbClr val="78909C"/>
+      </a:accent3>
+      <a:accent4>
+        <a:srgbClr val="FFAB40"/>
+      </a:accent4>
+      <a:accent5>
+        <a:srgbClr val="0097A7"/>
+      </a:accent5>
+      <a:accent6>
+        <a:srgbClr val="EEFF41"/>
+      </a:accent6>
+      <a:hlink>
+        <a:srgbClr val="0097A7"/>
+      </a:hlink>
+      <a:folHlink>
+        <a:srgbClr val="0097A7"/>
+      </a:folHlink>
+    </a:clrScheme>
+    <a:fontScheme name="Office">
+      <a:majorFont>
+        <a:latin typeface="Arial"/>
+        <a:ea typeface=""/>
+        <a:cs typeface=""/>
+        <a:font script="Jpan" typeface="ＭＳ Ｐゴシック"/>
+        <a:font script="Hang" typeface="맑은 고딕"/>
+        <a:font script="Hans" typeface="宋体"/>
+        <a:font script="Hant" typeface="新細明體"/>
+        <a:font script="Arab" typeface="Times New Roman"/>
+        <a:font script="Hebr" typeface="Times New Roman"/>
+        <a:font script="Thai" typeface="Angsana New"/>
+        <a:font script="Ethi" typeface="Nyala"/>
+        <a:font script="Beng" typeface="Vrinda"/>
+        <a:font script="Gujr" typeface="Shruti"/>
+        <a:font script="Khmr" typeface="MoolBoran"/>
+        <a:font script="Knda" typeface="Tunga"/>
+        <a:font script="Guru" typeface="Raavi"/>
+        <a:font script="Cans" typeface="Euphemia"/>
+        <a:font script="Cher" typeface="Plantagenet Cherokee"/>
+        <a:font script="Yiii" typeface="Microsoft Yi Baiti"/>
+        <a:font script="Tibt" typeface="Microsoft Himalaya"/>
+        <a:font script="Thaa" typeface="MV Boli"/>
+        <a:font script="Deva" typeface="Mangal"/>
+        <a:font script="Telu" typeface="Gautami"/>
+        <a:font script="Taml" typeface="Latha"/>
+        <a:font script="Syrc" typeface="Estrangelo Edessa"/>
+        <a:font script="Orya" typeface="Kalinga"/>
+        <a:font script="Mlym" typeface="Kartika"/>
+        <a:font script="Laoo" typeface="DokChampa"/>
+        <a:font script="Sinh" typeface="Iskoola Pota"/>
+        <a:font script="Mong" typeface="Mongolian Baiti"/>
+        <a:font script="Viet" typeface="Times New Roman"/>
+        <a:font script="Uigh" typeface="Microsoft Uighur"/>
+        <a:font script="Geor" typeface="Sylfaen"/>
+      </a:majorFont>
+      <a:minorFont>
+        <a:latin typeface="Arial"/>
+        <a:ea typeface=""/>
+        <a:cs typeface=""/>
+        <a:font script="Jpan" typeface="ＭＳ Ｐゴシック"/>
+        <a:font script="Hang" typeface="맑은 고딕"/>
+        <a:font script="Hans" typeface="宋体"/>
+        <a:font script="Hant" typeface="新細明體"/>
+        <a:font script="Arab" typeface="Arial"/>
+        <a:font script="Hebr" typeface="Arial"/>
+        <a:font script="Thai" typeface="Cordia New"/>
+        <a:font script="Ethi" typeface="Nyala"/>
+        <a:font script="Beng" typeface="Vrinda"/>
+        <a:font script="Gujr" typeface="Shruti"/>
+        <a:font script="Khmr" typeface="DaunPenh"/>
+        <a:font script="Knda" typeface="Tunga"/>
+        <a:font script="Guru" typeface="Raavi"/>
+        <a:font script="Cans" typeface="Euphemia"/>
+        <a:font script="Cher" typeface="Plantagenet Cherokee"/>
+        <a:font script="Yiii" typeface="Microsoft Yi Baiti"/>
+        <a:font script="Tibt" typeface="Microsoft Himalaya"/>
+        <a:font script="Thaa" typeface="MV Boli"/>
+        <a:font script="Deva" typeface="Mangal"/>
+        <a:font script="Telu" typeface="Gautami"/>
+        <a:font script="Taml" typeface="Latha"/>
+        <a:font script="Syrc" typeface="Estrangelo Edessa"/>
+        <a:font script="Orya" typeface="Kalinga"/>
+        <a:font script="Mlym" typeface="Kartika"/>
+        <a:font script="Laoo" typeface="DokChampa"/>
+        <a:font script="Sinh" typeface="Iskoola Pota"/>
+        <a:font script="Mong" typeface="Mongolian Baiti"/>
+        <a:font script="Viet" typeface="Arial"/>
+        <a:font script="Uigh" typeface="Microsoft Uighur"/>
+        <a:font script="Geor" typeface="Sylfaen"/>
+      </a:minorFont>
+    </a:fontScheme>
+    <a:fmtScheme name="Office">
+      <a:fillStyleLst>
+        <a:solidFill>
+          <a:schemeClr val="phClr"/>
+        </a:solidFill>
+        <a:gradFill rotWithShape="1">
+          <a:gsLst>
+            <a:gs pos="0">
+              <a:schemeClr val="phClr">
+                <a:tint val="50000"/>
+                <a:satMod val="300000"/>
+              </a:schemeClr>
+            </a:gs>
+            <a:gs pos="35000">
+              <a:schemeClr val="phClr">
+                <a:tint val="37000"/>
+                <a:satMod val="300000"/>
+              </a:schemeClr>
+            </a:gs>
+            <a:gs pos="100000">
+              <a:schemeClr val="phClr">
+                <a:tint val="15000"/>
+                <a:satMod val="350000"/>
+              </a:schemeClr>
+            </a:gs>
+          </a:gsLst>
+          <a:lin ang="16200000" scaled="1"/>
+        </a:gradFill>
+        <a:gradFill rotWithShape="1">
+          <a:gsLst>
+            <a:gs pos="0">
+              <a:schemeClr val="phClr">
+                <a:tint val="100000"/>
+                <a:shade val="100000"/>
+                <a:satMod val="130000"/>
+              </a:schemeClr>
+            </a:gs>
+            <a:gs pos="100000">
+              <a:schemeClr val="phClr">
+                <a:tint val="50000"/>
+                <a:shade val="100000"/>
+                <a:satMod val="350000"/>
+              </a:schemeClr>
+            </a:gs>
+          </a:gsLst>
+          <a:lin ang="16200000" scaled="0"/>
+        </a:gradFill>
+      </a:fillStyleLst>
+      <a:lnStyleLst>
+        <a:ln w="9525" cap="flat" cmpd="sng" algn="ctr">
+          <a:solidFill>
+            <a:schemeClr val="phClr">
+              <a:shade val="95000"/>
+              <a:satMod val="105000"/>
+            </a:schemeClr>
+          </a:solidFill>
+          <a:prstDash val="solid"/>
+        </a:ln>
+        <a:ln w="25400" cap="flat" cmpd="sng" algn="ctr">
+          <a:solidFill>
+            <a:schemeClr val="phClr"/>
+          </a:solidFill>
+          <a:prstDash val="solid"/>
+        </a:ln>
+        <a:ln w="38100" cap="flat" cmpd="sng" algn="ctr">
+          <a:solidFill>
+            <a:schemeClr val="phClr"/>
+          </a:solidFill>
+          <a:prstDash val="solid"/>
+        </a:ln>
+      </a:lnStyleLst>
+      <a:effectStyleLst>
+        <a:effectStyle>
+          <a:effectLst>
+            <a:outerShdw blurRad="40000" dist="20000" dir="5400000" rotWithShape="0">
+              <a:srgbClr val="000000">
+                <a:alpha val="38000"/>
+              </a:srgbClr>
+            </a:outerShdw>
+          </a:effectLst>
+        </a:effectStyle>
+        <a:effectStyle>
+          <a:effectLst>
+            <a:outerShdw blurRad="40000" dist="23000" dir="5400000" rotWithShape="0">
+              <a:srgbClr val="000000">
+                <a:alpha val="35000"/>
+              </a:srgbClr>
+            </a:outerShdw>
+          </a:effectLst>
+        </a:effectStyle>
+        <a:effectStyle>
+          <a:effectLst>
+            <a:outerShdw blurRad="40000" dist="23000" dir="5400000" rotWithShape="0">
+              <a:srgbClr val="000000">
+                <a:alpha val="35000"/>
+              </a:srgbClr>
+            </a:outerShdw>
+          </a:effectLst>
+          <a:scene3d>
+            <a:camera prst="orthographicFront">
+              <a:rot lat="0" lon="0" rev="0"/>
+            </a:camera>
+            <a:lightRig rig="threePt" dir="t">
+              <a:rot lat="0" lon="0" rev="1200000"/>
+            </a:lightRig>
+          </a:scene3d>
+          <a:sp3d>
+            <a:bevelT w="63500" h="25400"/>
+          </a:sp3d>
+        </a:effectStyle>
+      </a:effectStyleLst>
+      <a:bgFillStyleLst>
+        <a:solidFill>
+          <a:schemeClr val="phClr"/>
+        </a:solidFill>
+        <a:gradFill rotWithShape="1">
+          <a:gsLst>
+            <a:gs pos="0">
+              <a:schemeClr val="phClr">
+                <a:tint val="40000"/>
+                <a:satMod val="350000"/>
+              </a:schemeClr>
+            </a:gs>
+            <a:gs pos="40000">
+              <a:schemeClr val="phClr">
+                <a:tint val="45000"/>
+                <a:shade val="99000"/>
+                <a:satMod val="350000"/>
+              </a:schemeClr>
+            </a:gs>
+            <a:gs pos="100000">
+              <a:schemeClr val="phClr">
+                <a:shade val="20000"/>
+                <a:satMod val="255000"/>
+              </a:schemeClr>
+            </a:gs>
+          </a:gsLst>
+          <a:path path="circle">
+            <a:fillToRect l="50000" t="-80000" r="50000" b="180000"/>
+          </a:path>
+        </a:gradFill>
+        <a:gradFill rotWithShape="1">
+          <a:gsLst>
+            <a:gs pos="0">
+              <a:schemeClr val="phClr">
+                <a:tint val="80000"/>
+                <a:satMod val="300000"/>
+              </a:schemeClr>
+            </a:gs>
+            <a:gs pos="100000">
+              <a:schemeClr val="phClr">
+                <a:shade val="30000"/>
+                <a:satMod val="200000"/>
+              </a:schemeClr>
+            </a:gs>
+          </a:gsLst>
+          <a:path path="circle">
+            <a:fillToRect l="50000" t="50000" r="50000" b="50000"/>
+          </a:path>
+        </a:gradFill>
+      </a:bgFillStyleLst>
+    </a:fmtScheme>
+  </a:themeElements>
+</a:theme>
+</file>
+
+<file path=ppt/theme/theme2.xml><?xml version="1.0" encoding="utf-8"?>
 <a:theme xmlns:a="http://schemas.openxmlformats.org/drawingml/2006/main" xmlns:r="http://schemas.openxmlformats.org/officeDocument/2006/relationships">
   <a:themeElements>
     <a:clrScheme name="Default">
@@ -15687,283 +15997,4 @@
     </a:fmtScheme>
   </a:themeElements>
 </a:theme>
-</file>
-
-<file path=ppt/theme/theme2.xml><?xml version="1.0" encoding="utf-8"?>
-<a:theme xmlns:a="http://schemas.openxmlformats.org/drawingml/2006/main" xmlns:r="http://schemas.openxmlformats.org/officeDocument/2006/relationships" name="Simple Light">
-  <a:themeElements>
-    <a:clrScheme name="Simple Light">
-      <a:dk1>
-        <a:srgbClr val="000000"/>
-      </a:dk1>
-      <a:lt1>
-        <a:srgbClr val="FFFFFF"/>
-      </a:lt1>
-      <a:dk2>
-        <a:srgbClr val="595959"/>
-      </a:dk2>
-      <a:lt2>
-        <a:srgbClr val="EEEEEE"/>
-      </a:lt2>
-      <a:accent1>
-        <a:srgbClr val="4285F4"/>
-      </a:accent1>
-      <a:accent2>
-        <a:srgbClr val="212121"/>
-      </a:accent2>
-      <a:accent3>
-        <a:srgbClr val="78909C"/>
-      </a:accent3>
-      <a:accent4>
-        <a:srgbClr val="FFAB40"/>
-      </a:accent4>
-      <a:accent5>
-        <a:srgbClr val="0097A7"/>
-      </a:accent5>
-      <a:accent6>
-        <a:srgbClr val="EEFF41"/>
-      </a:accent6>
-      <a:hlink>
-        <a:srgbClr val="0097A7"/>
-      </a:hlink>
-      <a:folHlink>
-        <a:srgbClr val="0097A7"/>
-      </a:folHlink>
-    </a:clrScheme>
-    <a:fontScheme name="Office">
-      <a:majorFont>
-        <a:latin typeface="Arial"/>
-        <a:ea typeface=""/>
-        <a:cs typeface=""/>
-        <a:font script="Jpan" typeface="ＭＳ Ｐゴシック"/>
-        <a:font script="Hang" typeface="맑은 고딕"/>
-        <a:font script="Hans" typeface="宋体"/>
-        <a:font script="Hant" typeface="新細明體"/>
-        <a:font script="Arab" typeface="Times New Roman"/>
-        <a:font script="Hebr" typeface="Times New Roman"/>
-        <a:font script="Thai" typeface="Angsana New"/>
-        <a:font script="Ethi" typeface="Nyala"/>
-        <a:font script="Beng" typeface="Vrinda"/>
-        <a:font script="Gujr" typeface="Shruti"/>
-        <a:font script="Khmr" typeface="MoolBoran"/>
-        <a:font script="Knda" typeface="Tunga"/>
-        <a:font script="Guru" typeface="Raavi"/>
-        <a:font script="Cans" typeface="Euphemia"/>
-        <a:font script="Cher" typeface="Plantagenet Cherokee"/>
-        <a:font script="Yiii" typeface="Microsoft Yi Baiti"/>
-        <a:font script="Tibt" typeface="Microsoft Himalaya"/>
-        <a:font script="Thaa" typeface="MV Boli"/>
-        <a:font script="Deva" typeface="Mangal"/>
-        <a:font script="Telu" typeface="Gautami"/>
-        <a:font script="Taml" typeface="Latha"/>
-        <a:font script="Syrc" typeface="Estrangelo Edessa"/>
-        <a:font script="Orya" typeface="Kalinga"/>
-        <a:font script="Mlym" typeface="Kartika"/>
-        <a:font script="Laoo" typeface="DokChampa"/>
-        <a:font script="Sinh" typeface="Iskoola Pota"/>
-        <a:font script="Mong" typeface="Mongolian Baiti"/>
-        <a:font script="Viet" typeface="Times New Roman"/>
-        <a:font script="Uigh" typeface="Microsoft Uighur"/>
-        <a:font script="Geor" typeface="Sylfaen"/>
-      </a:majorFont>
-      <a:minorFont>
-        <a:latin typeface="Arial"/>
-        <a:ea typeface=""/>
-        <a:cs typeface=""/>
-        <a:font script="Jpan" typeface="ＭＳ Ｐゴシック"/>
-        <a:font script="Hang" typeface="맑은 고딕"/>
-        <a:font script="Hans" typeface="宋体"/>
-        <a:font script="Hant" typeface="新細明體"/>
-        <a:font script="Arab" typeface="Arial"/>
-        <a:font script="Hebr" typeface="Arial"/>
-        <a:font script="Thai" typeface="Cordia New"/>
-        <a:font script="Ethi" typeface="Nyala"/>
-        <a:font script="Beng" typeface="Vrinda"/>
-        <a:font script="Gujr" typeface="Shruti"/>
-        <a:font script="Khmr" typeface="DaunPenh"/>
-        <a:font script="Knda" typeface="Tunga"/>
-        <a:font script="Guru" typeface="Raavi"/>
-        <a:font script="Cans" typeface="Euphemia"/>
-        <a:font script="Cher" typeface="Plantagenet Cherokee"/>
-        <a:font script="Yiii" typeface="Microsoft Yi Baiti"/>
-        <a:font script="Tibt" typeface="Microsoft Himalaya"/>
-        <a:font script="Thaa" typeface="MV Boli"/>
-        <a:font script="Deva" typeface="Mangal"/>
-        <a:font script="Telu" typeface="Gautami"/>
-        <a:font script="Taml" typeface="Latha"/>
-        <a:font script="Syrc" typeface="Estrangelo Edessa"/>
-        <a:font script="Orya" typeface="Kalinga"/>
-        <a:font script="Mlym" typeface="Kartika"/>
-        <a:font script="Laoo" typeface="DokChampa"/>
-        <a:font script="Sinh" typeface="Iskoola Pota"/>
-        <a:font script="Mong" typeface="Mongolian Baiti"/>
-        <a:font script="Viet" typeface="Arial"/>
-        <a:font script="Uigh" typeface="Microsoft Uighur"/>
-        <a:font script="Geor" typeface="Sylfaen"/>
-      </a:minorFont>
-    </a:fontScheme>
-    <a:fmtScheme name="Office">
-      <a:fillStyleLst>
-        <a:solidFill>
-          <a:schemeClr val="phClr"/>
-        </a:solidFill>
-        <a:gradFill rotWithShape="1">
-          <a:gsLst>
-            <a:gs pos="0">
-              <a:schemeClr val="phClr">
-                <a:tint val="50000"/>
-                <a:satMod val="300000"/>
-              </a:schemeClr>
-            </a:gs>
-            <a:gs pos="35000">
-              <a:schemeClr val="phClr">
-                <a:tint val="37000"/>
-                <a:satMod val="300000"/>
-              </a:schemeClr>
-            </a:gs>
-            <a:gs pos="100000">
-              <a:schemeClr val="phClr">
-                <a:tint val="15000"/>
-                <a:satMod val="350000"/>
-              </a:schemeClr>
-            </a:gs>
-          </a:gsLst>
-          <a:lin ang="16200000" scaled="1"/>
-        </a:gradFill>
-        <a:gradFill rotWithShape="1">
-          <a:gsLst>
-            <a:gs pos="0">
-              <a:schemeClr val="phClr">
-                <a:tint val="100000"/>
-                <a:shade val="100000"/>
-                <a:satMod val="130000"/>
-              </a:schemeClr>
-            </a:gs>
-            <a:gs pos="100000">
-              <a:schemeClr val="phClr">
-                <a:tint val="50000"/>
-                <a:shade val="100000"/>
-                <a:satMod val="350000"/>
-              </a:schemeClr>
-            </a:gs>
-          </a:gsLst>
-          <a:lin ang="16200000" scaled="0"/>
-        </a:gradFill>
-      </a:fillStyleLst>
-      <a:lnStyleLst>
-        <a:ln w="9525" cap="flat" cmpd="sng" algn="ctr">
-          <a:solidFill>
-            <a:schemeClr val="phClr">
-              <a:shade val="95000"/>
-              <a:satMod val="105000"/>
-            </a:schemeClr>
-          </a:solidFill>
-          <a:prstDash val="solid"/>
-        </a:ln>
-        <a:ln w="25400" cap="flat" cmpd="sng" algn="ctr">
-          <a:solidFill>
-            <a:schemeClr val="phClr"/>
-          </a:solidFill>
-          <a:prstDash val="solid"/>
-        </a:ln>
-        <a:ln w="38100" cap="flat" cmpd="sng" algn="ctr">
-          <a:solidFill>
-            <a:schemeClr val="phClr"/>
-          </a:solidFill>
-          <a:prstDash val="solid"/>
-        </a:ln>
-      </a:lnStyleLst>
-      <a:effectStyleLst>
-        <a:effectStyle>
-          <a:effectLst>
-            <a:outerShdw blurRad="40000" dist="20000" dir="5400000" rotWithShape="0">
-              <a:srgbClr val="000000">
-                <a:alpha val="38000"/>
-              </a:srgbClr>
-            </a:outerShdw>
-          </a:effectLst>
-        </a:effectStyle>
-        <a:effectStyle>
-          <a:effectLst>
-            <a:outerShdw blurRad="40000" dist="23000" dir="5400000" rotWithShape="0">
-              <a:srgbClr val="000000">
-                <a:alpha val="35000"/>
-              </a:srgbClr>
-            </a:outerShdw>
-          </a:effectLst>
-        </a:effectStyle>
-        <a:effectStyle>
-          <a:effectLst>
-            <a:outerShdw blurRad="40000" dist="23000" dir="5400000" rotWithShape="0">
-              <a:srgbClr val="000000">
-                <a:alpha val="35000"/>
-              </a:srgbClr>
-            </a:outerShdw>
-          </a:effectLst>
-          <a:scene3d>
-            <a:camera prst="orthographicFront">
-              <a:rot lat="0" lon="0" rev="0"/>
-            </a:camera>
-            <a:lightRig rig="threePt" dir="t">
-              <a:rot lat="0" lon="0" rev="1200000"/>
-            </a:lightRig>
-          </a:scene3d>
-          <a:sp3d>
-            <a:bevelT w="63500" h="25400"/>
-          </a:sp3d>
-        </a:effectStyle>
-      </a:effectStyleLst>
-      <a:bgFillStyleLst>
-        <a:solidFill>
-          <a:schemeClr val="phClr"/>
-        </a:solidFill>
-        <a:gradFill rotWithShape="1">
-          <a:gsLst>
-            <a:gs pos="0">
-              <a:schemeClr val="phClr">
-                <a:tint val="40000"/>
-                <a:satMod val="350000"/>
-              </a:schemeClr>
-            </a:gs>
-            <a:gs pos="40000">
-              <a:schemeClr val="phClr">
-                <a:tint val="45000"/>
-                <a:shade val="99000"/>
-                <a:satMod val="350000"/>
-              </a:schemeClr>
-            </a:gs>
-            <a:gs pos="100000">
-              <a:schemeClr val="phClr">
-                <a:shade val="20000"/>
-                <a:satMod val="255000"/>
-              </a:schemeClr>
-            </a:gs>
-          </a:gsLst>
-          <a:path path="circle">
-            <a:fillToRect l="50000" t="-80000" r="50000" b="180000"/>
-          </a:path>
-        </a:gradFill>
-        <a:gradFill rotWithShape="1">
-          <a:gsLst>
-            <a:gs pos="0">
-              <a:schemeClr val="phClr">
-                <a:tint val="80000"/>
-                <a:satMod val="300000"/>
-              </a:schemeClr>
-            </a:gs>
-            <a:gs pos="100000">
-              <a:schemeClr val="phClr">
-                <a:shade val="30000"/>
-                <a:satMod val="200000"/>
-              </a:schemeClr>
-            </a:gs>
-          </a:gsLst>
-          <a:path path="circle">
-            <a:fillToRect l="50000" t="50000" r="50000" b="50000"/>
-          </a:path>
-        </a:gradFill>
-      </a:bgFillStyleLst>
-    </a:fmtScheme>
-  </a:themeElements>
-</a:theme>
 </file>
</xml_diff>